<commit_message>
Documentation: update USB documentation
</commit_message>
<xml_diff>
--- a/Documentation/Doxygen/USB/src/USB_New_Style.pptx
+++ b/Documentation/Doxygen/USB/src/USB_New_Style.pptx
@@ -270,7 +270,7 @@
             <a:fld id="{E72D30EF-8F20-0B47-8B5D-39A8BC29E860}" type="datetimeFigureOut">
               <a:rPr lang="en-US" smtClean="0"/>
               <a:pPr/>
-              <a:t>2018-09-21</a:t>
+              <a:t>20-May-24</a:t>
             </a:fld>
             <a:endParaRPr lang="en-US"/>
           </a:p>
@@ -438,7 +438,7 @@
             <a:fld id="{77EDD36E-1E02-F241-9611-1F1D9EAAD326}" type="datetimeFigureOut">
               <a:rPr lang="en-US" smtClean="0"/>
               <a:pPr/>
-              <a:t>2018-09-21</a:t>
+              <a:t>20-May-24</a:t>
             </a:fld>
             <a:endParaRPr lang="en-US"/>
           </a:p>
@@ -754,7 +754,7 @@
           <a:bodyPr/>
           <a:lstStyle/>
           <a:p>
-            <a:endParaRPr lang="en-GB" dirty="0"/>
+            <a:endParaRPr lang="en-GB"/>
           </a:p>
         </p:txBody>
       </p:sp>
@@ -1069,7 +1069,7 @@
           </a:bodyPr>
           <a:lstStyle/>
           <a:p>
-            <a:endParaRPr lang="en-US" dirty="0"/>
+            <a:endParaRPr lang="en-US"/>
           </a:p>
         </p:txBody>
       </p:sp>
@@ -1527,7 +1527,7 @@
           </a:bodyPr>
           <a:lstStyle/>
           <a:p>
-            <a:endParaRPr lang="en-US" dirty="0"/>
+            <a:endParaRPr lang="en-US"/>
           </a:p>
         </p:txBody>
       </p:sp>
@@ -1717,7 +1717,7 @@
           </a:bodyPr>
           <a:lstStyle/>
           <a:p>
-            <a:endParaRPr lang="en-US" dirty="0"/>
+            <a:endParaRPr lang="en-US"/>
           </a:p>
         </p:txBody>
       </p:sp>
@@ -1967,7 +1967,7 @@
               <a:tabLst/>
             </a:pPr>
             <a:r>
-              <a:rPr kumimoji="0" lang="en-US" sz="1000" b="1" i="0" u="none" strike="noStrike" cap="none" normalizeH="0" baseline="0" dirty="0">
+              <a:rPr kumimoji="0" lang="en-US" sz="1000" b="1" i="0" u="none" strike="noStrike" cap="none" normalizeH="0" baseline="0">
                 <a:ln>
                   <a:noFill/>
                 </a:ln>
@@ -1981,7 +1981,7 @@
               <a:t>Approximate</a:t>
             </a:r>
             <a:r>
-              <a:rPr kumimoji="0" lang="en-US" sz="1000" b="1" i="0" u="none" strike="noStrike" cap="none" normalizeH="0" dirty="0">
+              <a:rPr kumimoji="0" lang="en-US" sz="1000" b="1" i="0" u="none" strike="noStrike" cap="none" normalizeH="0">
                 <a:ln>
                   <a:noFill/>
                 </a:ln>
@@ -1994,7 +1994,7 @@
               </a:rPr>
               <a:t> clearance</a:t>
             </a:r>
-            <a:endParaRPr kumimoji="0" lang="en-US" sz="1000" b="1" i="0" u="none" strike="noStrike" cap="none" normalizeH="0" baseline="0" dirty="0">
+            <a:endParaRPr kumimoji="0" lang="en-US" sz="1000" b="1" i="0" u="none" strike="noStrike" cap="none" normalizeH="0" baseline="0">
               <a:ln>
                 <a:noFill/>
               </a:ln>
@@ -2053,7 +2053,7 @@
               </a:spcAft>
             </a:pPr>
             <a:r>
-              <a:rPr lang="en-US" sz="1000" b="1" dirty="0">
+              <a:rPr lang="en-US" sz="1000" b="1">
                 <a:solidFill>
                   <a:srgbClr val="FFFFFF"/>
                 </a:solidFill>
@@ -2118,7 +2118,7 @@
               <a:tabLst/>
             </a:pPr>
             <a:r>
-              <a:rPr kumimoji="0" lang="en-US" sz="1000" b="1" i="0" u="none" strike="noStrike" cap="none" normalizeH="0" baseline="0" dirty="0">
+              <a:rPr kumimoji="0" lang="en-US" sz="1000" b="1" i="0" u="none" strike="noStrike" cap="none" normalizeH="0" baseline="0">
                 <a:ln>
                   <a:noFill/>
                 </a:ln>
@@ -2132,7 +2132,7 @@
               <a:t>Approximate</a:t>
             </a:r>
             <a:r>
-              <a:rPr kumimoji="0" lang="en-US" sz="1000" b="1" i="0" u="none" strike="noStrike" cap="none" normalizeH="0" dirty="0">
+              <a:rPr kumimoji="0" lang="en-US" sz="1000" b="1" i="0" u="none" strike="noStrike" cap="none" normalizeH="0">
                 <a:ln>
                   <a:noFill/>
                 </a:ln>
@@ -2145,7 +2145,7 @@
               </a:rPr>
               <a:t> clearance</a:t>
             </a:r>
-            <a:endParaRPr kumimoji="0" lang="en-US" sz="1000" b="1" i="0" u="none" strike="noStrike" cap="none" normalizeH="0" baseline="0" dirty="0">
+            <a:endParaRPr kumimoji="0" lang="en-US" sz="1000" b="1" i="0" u="none" strike="noStrike" cap="none" normalizeH="0" baseline="0">
               <a:ln>
                 <a:noFill/>
               </a:ln>
@@ -2204,7 +2204,7 @@
               </a:spcAft>
             </a:pPr>
             <a:r>
-              <a:rPr lang="en-US" sz="1000" b="1" dirty="0">
+              <a:rPr lang="en-US" sz="1000" b="1">
                 <a:solidFill>
                   <a:srgbClr val="FFFFFF"/>
                 </a:solidFill>
@@ -2383,7 +2383,7 @@
               <a:tabLst/>
             </a:pPr>
             <a:r>
-              <a:rPr kumimoji="0" lang="en-US" sz="1000" b="1" i="0" u="none" strike="noStrike" cap="none" normalizeH="0" baseline="0" dirty="0">
+              <a:rPr kumimoji="0" lang="en-US" sz="1000" b="1" i="0" u="none" strike="noStrike" cap="none" normalizeH="0" baseline="0">
                 <a:ln>
                   <a:noFill/>
                 </a:ln>
@@ -2397,7 +2397,7 @@
               <a:t>Approximate</a:t>
             </a:r>
             <a:r>
-              <a:rPr kumimoji="0" lang="en-US" sz="1000" b="1" i="0" u="none" strike="noStrike" cap="none" normalizeH="0" dirty="0">
+              <a:rPr kumimoji="0" lang="en-US" sz="1000" b="1" i="0" u="none" strike="noStrike" cap="none" normalizeH="0">
                 <a:ln>
                   <a:noFill/>
                 </a:ln>
@@ -2410,7 +2410,7 @@
               </a:rPr>
               <a:t> clearance</a:t>
             </a:r>
-            <a:endParaRPr kumimoji="0" lang="en-US" sz="1000" b="1" i="0" u="none" strike="noStrike" cap="none" normalizeH="0" baseline="0" dirty="0">
+            <a:endParaRPr kumimoji="0" lang="en-US" sz="1000" b="1" i="0" u="none" strike="noStrike" cap="none" normalizeH="0" baseline="0">
               <a:ln>
                 <a:noFill/>
               </a:ln>
@@ -2469,7 +2469,7 @@
               </a:spcAft>
             </a:pPr>
             <a:r>
-              <a:rPr lang="en-US" sz="1000" b="1" dirty="0">
+              <a:rPr lang="en-US" sz="1000" b="1">
                 <a:solidFill>
                   <a:srgbClr val="FFFFFF"/>
                 </a:solidFill>
@@ -2719,7 +2719,7 @@
               <a:tabLst/>
             </a:pPr>
             <a:r>
-              <a:rPr kumimoji="0" lang="en-US" sz="1000" b="1" i="0" u="none" strike="noStrike" cap="none" normalizeH="0" baseline="0" dirty="0">
+              <a:rPr kumimoji="0" lang="en-US" sz="1000" b="1" i="0" u="none" strike="noStrike" cap="none" normalizeH="0" baseline="0">
                 <a:ln>
                   <a:noFill/>
                 </a:ln>
@@ -2733,7 +2733,7 @@
               <a:t>Approximate</a:t>
             </a:r>
             <a:r>
-              <a:rPr kumimoji="0" lang="en-US" sz="1000" b="1" i="0" u="none" strike="noStrike" cap="none" normalizeH="0" dirty="0">
+              <a:rPr kumimoji="0" lang="en-US" sz="1000" b="1" i="0" u="none" strike="noStrike" cap="none" normalizeH="0">
                 <a:ln>
                   <a:noFill/>
                 </a:ln>
@@ -2746,7 +2746,7 @@
               </a:rPr>
               <a:t> clearance</a:t>
             </a:r>
-            <a:endParaRPr kumimoji="0" lang="en-US" sz="1000" b="1" i="0" u="none" strike="noStrike" cap="none" normalizeH="0" baseline="0" dirty="0">
+            <a:endParaRPr kumimoji="0" lang="en-US" sz="1000" b="1" i="0" u="none" strike="noStrike" cap="none" normalizeH="0" baseline="0">
               <a:ln>
                 <a:noFill/>
               </a:ln>
@@ -2805,7 +2805,7 @@
               </a:spcAft>
             </a:pPr>
             <a:r>
-              <a:rPr lang="en-US" sz="1000" b="1" dirty="0">
+              <a:rPr lang="en-US" sz="1000" b="1">
                 <a:solidFill>
                   <a:srgbClr val="FFFFFF"/>
                 </a:solidFill>
@@ -3062,7 +3062,7 @@
           </a:bodyPr>
           <a:lstStyle/>
           <a:p>
-            <a:endParaRPr lang="en-US" dirty="0"/>
+            <a:endParaRPr lang="en-US"/>
           </a:p>
         </p:txBody>
       </p:sp>
@@ -3427,10 +3427,10 @@
               </a:pPr>
               <a:t>‹#›</a:t>
             </a:fld>
-            <a:endParaRPr lang="en-US" dirty="0"/>
-          </a:p>
-          <a:p>
-            <a:endParaRPr lang="en-US" b="0" dirty="0"/>
+            <a:endParaRPr lang="en-US"/>
+          </a:p>
+          <a:p>
+            <a:endParaRPr lang="en-US" b="0"/>
           </a:p>
         </p:txBody>
       </p:sp>
@@ -3813,14 +3813,14 @@
           <a:p>
             <a:pPr algn="ctr"/>
             <a:r>
-              <a:rPr lang="en-US" sz="2000" b="1" dirty="0">
+              <a:rPr lang="en-US" sz="2000" b="1">
                 <a:solidFill>
                   <a:schemeClr val="tx1"/>
                 </a:solidFill>
               </a:rPr>
               <a:t>    CMSIS-Driver</a:t>
             </a:r>
-            <a:endParaRPr lang="en-GB" sz="3200" b="1" dirty="0">
+            <a:endParaRPr lang="en-GB" sz="3200" b="1">
               <a:solidFill>
                 <a:schemeClr val="tx1"/>
               </a:solidFill>
@@ -3872,14 +3872,14 @@
           <a:p>
             <a:pPr algn="ctr"/>
             <a:r>
-              <a:rPr lang="en-US" sz="2000" b="1" dirty="0">
+              <a:rPr lang="en-US" sz="2000" b="1">
                 <a:solidFill>
                   <a:schemeClr val="tx1"/>
                 </a:solidFill>
               </a:rPr>
               <a:t>    USB Component</a:t>
             </a:r>
-            <a:endParaRPr lang="en-GB" sz="3200" b="1" dirty="0">
+            <a:endParaRPr lang="en-GB" sz="3200" b="1">
               <a:solidFill>
                 <a:schemeClr val="tx1"/>
               </a:solidFill>
@@ -3905,7 +3905,7 @@
           <a:lstStyle/>
           <a:p>
             <a:r>
-              <a:rPr lang="en-US" dirty="0"/>
+              <a:rPr lang="en-US"/>
               <a:t>USB Component</a:t>
             </a:r>
           </a:p>
@@ -3913,22 +3913,20 @@
       </p:sp>
       <p:sp>
         <p:nvSpPr>
-          <p:cNvPr id="22" name="Rectangle 21"/>
+          <p:cNvPr id="61" name="Rectangle 60"/>
           <p:cNvSpPr/>
           <p:nvPr/>
         </p:nvSpPr>
         <p:spPr>
           <a:xfrm>
-            <a:off x="736600" y="1487488"/>
-            <a:ext cx="8460000" cy="1512000"/>
+            <a:off x="1200858" y="5368690"/>
+            <a:ext cx="3852000" cy="540000"/>
           </a:xfrm>
           <a:prstGeom prst="rect">
             <a:avLst/>
           </a:prstGeom>
           <a:solidFill>
-            <a:srgbClr val="808082">
-              <a:alpha val="40000"/>
-            </a:srgbClr>
+            <a:srgbClr val="58595B"/>
           </a:solidFill>
           <a:ln>
             <a:noFill/>
@@ -3950,19 +3948,549 @@
           </a:fontRef>
         </p:style>
         <p:txBody>
+          <a:bodyPr rtlCol="0" anchor="ctr"/>
+          <a:lstStyle/>
+          <a:p>
+            <a:pPr algn="ctr"/>
+            <a:r>
+              <a:rPr lang="en-US" sz="1600" b="1"/>
+              <a:t>USB Device</a:t>
+            </a:r>
+          </a:p>
+        </p:txBody>
+      </p:sp>
+      <p:sp>
+        <p:nvSpPr>
+          <p:cNvPr id="68" name="Rectangle 67"/>
+          <p:cNvSpPr/>
+          <p:nvPr/>
+        </p:nvSpPr>
+        <p:spPr>
+          <a:xfrm>
+            <a:off x="5196474" y="5368690"/>
+            <a:ext cx="3852000" cy="540000"/>
+          </a:xfrm>
+          <a:prstGeom prst="rect">
+            <a:avLst/>
+          </a:prstGeom>
+          <a:solidFill>
+            <a:srgbClr val="58595B"/>
+          </a:solidFill>
+          <a:ln>
+            <a:noFill/>
+          </a:ln>
+          <a:effectLst/>
+        </p:spPr>
+        <p:style>
+          <a:lnRef idx="1">
+            <a:schemeClr val="accent1"/>
+          </a:lnRef>
+          <a:fillRef idx="3">
+            <a:schemeClr val="accent1"/>
+          </a:fillRef>
+          <a:effectRef idx="2">
+            <a:schemeClr val="accent1"/>
+          </a:effectRef>
+          <a:fontRef idx="minor">
+            <a:schemeClr val="lt1"/>
+          </a:fontRef>
+        </p:style>
+        <p:txBody>
+          <a:bodyPr rtlCol="0" anchor="ctr"/>
+          <a:lstStyle/>
+          <a:p>
+            <a:pPr algn="ctr"/>
+            <a:r>
+              <a:rPr lang="en-US" sz="1600" b="1"/>
+              <a:t>USB Host</a:t>
+            </a:r>
+          </a:p>
+        </p:txBody>
+      </p:sp>
+      <p:sp>
+        <p:nvSpPr>
+          <p:cNvPr id="3" name="Rectangle 2">
+            <a:extLst>
+              <a:ext uri="{FF2B5EF4-FFF2-40B4-BE49-F238E27FC236}">
+                <a16:creationId xmlns:a16="http://schemas.microsoft.com/office/drawing/2014/main" id="{DDC17653-7747-2D16-72ED-F80FDBA4D369}"/>
+              </a:ext>
+            </a:extLst>
+          </p:cNvPr>
+          <p:cNvSpPr/>
+          <p:nvPr/>
+        </p:nvSpPr>
+        <p:spPr>
+          <a:xfrm>
+            <a:off x="736600" y="1561533"/>
+            <a:ext cx="8460000" cy="1512000"/>
+          </a:xfrm>
+          <a:prstGeom prst="rect">
+            <a:avLst/>
+          </a:prstGeom>
+          <a:solidFill>
+            <a:srgbClr val="808082">
+              <a:alpha val="40000"/>
+            </a:srgbClr>
+          </a:solidFill>
+          <a:ln>
+            <a:noFill/>
+          </a:ln>
+          <a:effectLst/>
+        </p:spPr>
+        <p:style>
+          <a:lnRef idx="1">
+            <a:schemeClr val="accent1"/>
+          </a:lnRef>
+          <a:fillRef idx="3">
+            <a:schemeClr val="accent1"/>
+          </a:fillRef>
+          <a:effectRef idx="2">
+            <a:schemeClr val="accent1"/>
+          </a:effectRef>
+          <a:fontRef idx="minor">
+            <a:schemeClr val="lt1"/>
+          </a:fontRef>
+        </p:style>
+        <p:txBody>
           <a:bodyPr vert="vert270" rtlCol="0" anchor="t"/>
           <a:lstStyle/>
           <a:p>
             <a:pPr algn="ctr"/>
             <a:r>
-              <a:rPr lang="en-US" b="1" dirty="0">
+              <a:rPr lang="en-US" b="1">
+                <a:solidFill>
+                  <a:schemeClr val="tx1"/>
+                </a:solidFill>
+              </a:rPr>
+              <a:t>USB Device</a:t>
+            </a:r>
+            <a:endParaRPr lang="en-GB" sz="2800" b="1">
+              <a:solidFill>
+                <a:schemeClr val="tx1"/>
+              </a:solidFill>
+            </a:endParaRPr>
+          </a:p>
+        </p:txBody>
+      </p:sp>
+      <p:sp>
+        <p:nvSpPr>
+          <p:cNvPr id="4" name="Rectangle 3">
+            <a:extLst>
+              <a:ext uri="{FF2B5EF4-FFF2-40B4-BE49-F238E27FC236}">
+                <a16:creationId xmlns:a16="http://schemas.microsoft.com/office/drawing/2014/main" id="{9EC34E2F-B93A-FE33-88BA-265804DE334C}"/>
+              </a:ext>
+            </a:extLst>
+          </p:cNvPr>
+          <p:cNvSpPr/>
+          <p:nvPr/>
+        </p:nvSpPr>
+        <p:spPr>
+          <a:xfrm>
+            <a:off x="1197735" y="1711796"/>
+            <a:ext cx="2520000" cy="540000"/>
+          </a:xfrm>
+          <a:prstGeom prst="rect">
+            <a:avLst/>
+          </a:prstGeom>
+          <a:solidFill>
+            <a:srgbClr val="128CAB"/>
+          </a:solidFill>
+          <a:ln>
+            <a:noFill/>
+          </a:ln>
+          <a:effectLst/>
+        </p:spPr>
+        <p:style>
+          <a:lnRef idx="1">
+            <a:schemeClr val="accent1"/>
+          </a:lnRef>
+          <a:fillRef idx="3">
+            <a:schemeClr val="accent1"/>
+          </a:fillRef>
+          <a:effectRef idx="2">
+            <a:schemeClr val="accent1"/>
+          </a:effectRef>
+          <a:fontRef idx="minor">
+            <a:schemeClr val="lt1"/>
+          </a:fontRef>
+        </p:style>
+        <p:txBody>
+          <a:bodyPr rtlCol="0" anchor="ctr"/>
+          <a:lstStyle/>
+          <a:p>
+            <a:pPr algn="ctr"/>
+            <a:r>
+              <a:rPr lang="en-US" sz="1600" b="1"/>
+              <a:t>HID</a:t>
+            </a:r>
+          </a:p>
+          <a:p>
+            <a:pPr algn="ctr"/>
+            <a:r>
+              <a:rPr lang="en-US" sz="1600" b="1"/>
+              <a:t>Human Interface Device</a:t>
+            </a:r>
+          </a:p>
+        </p:txBody>
+      </p:sp>
+      <p:sp>
+        <p:nvSpPr>
+          <p:cNvPr id="5" name="Rectangle 4">
+            <a:extLst>
+              <a:ext uri="{FF2B5EF4-FFF2-40B4-BE49-F238E27FC236}">
+                <a16:creationId xmlns:a16="http://schemas.microsoft.com/office/drawing/2014/main" id="{9A862DA9-5509-F171-EE7F-9B645E48A240}"/>
+              </a:ext>
+            </a:extLst>
+          </p:cNvPr>
+          <p:cNvSpPr/>
+          <p:nvPr/>
+        </p:nvSpPr>
+        <p:spPr>
+          <a:xfrm>
+            <a:off x="6528474" y="1711796"/>
+            <a:ext cx="2520000" cy="540000"/>
+          </a:xfrm>
+          <a:prstGeom prst="rect">
+            <a:avLst/>
+          </a:prstGeom>
+          <a:solidFill>
+            <a:srgbClr val="765F97"/>
+          </a:solidFill>
+          <a:ln>
+            <a:noFill/>
+          </a:ln>
+          <a:effectLst/>
+        </p:spPr>
+        <p:style>
+          <a:lnRef idx="1">
+            <a:schemeClr val="accent1"/>
+          </a:lnRef>
+          <a:fillRef idx="3">
+            <a:schemeClr val="accent1"/>
+          </a:fillRef>
+          <a:effectRef idx="2">
+            <a:schemeClr val="accent1"/>
+          </a:effectRef>
+          <a:fontRef idx="minor">
+            <a:schemeClr val="lt1"/>
+          </a:fontRef>
+        </p:style>
+        <p:txBody>
+          <a:bodyPr rtlCol="0" anchor="ctr"/>
+          <a:lstStyle/>
+          <a:p>
+            <a:pPr algn="ctr"/>
+            <a:r>
+              <a:rPr lang="en-US" b="1"/>
+              <a:t>USB Device Core</a:t>
+            </a:r>
+          </a:p>
+        </p:txBody>
+      </p:sp>
+      <p:sp>
+        <p:nvSpPr>
+          <p:cNvPr id="6" name="Rectangle 5">
+            <a:extLst>
+              <a:ext uri="{FF2B5EF4-FFF2-40B4-BE49-F238E27FC236}">
+                <a16:creationId xmlns:a16="http://schemas.microsoft.com/office/drawing/2014/main" id="{8FCC1425-2EE7-9B79-8C61-11C90810857B}"/>
+              </a:ext>
+            </a:extLst>
+          </p:cNvPr>
+          <p:cNvSpPr/>
+          <p:nvPr/>
+        </p:nvSpPr>
+        <p:spPr>
+          <a:xfrm>
+            <a:off x="3849914" y="2394866"/>
+            <a:ext cx="2520000" cy="540000"/>
+          </a:xfrm>
+          <a:prstGeom prst="rect">
+            <a:avLst/>
+          </a:prstGeom>
+          <a:solidFill>
+            <a:srgbClr val="D77B00"/>
+          </a:solidFill>
+          <a:ln>
+            <a:noFill/>
+          </a:ln>
+          <a:effectLst/>
+        </p:spPr>
+        <p:style>
+          <a:lnRef idx="1">
+            <a:schemeClr val="accent1"/>
+          </a:lnRef>
+          <a:fillRef idx="3">
+            <a:schemeClr val="accent1"/>
+          </a:fillRef>
+          <a:effectRef idx="2">
+            <a:schemeClr val="accent1"/>
+          </a:effectRef>
+          <a:fontRef idx="minor">
+            <a:schemeClr val="lt1"/>
+          </a:fontRef>
+        </p:style>
+        <p:txBody>
+          <a:bodyPr rtlCol="0" anchor="ctr"/>
+          <a:lstStyle/>
+          <a:p>
+            <a:pPr algn="ctr"/>
+            <a:r>
+              <a:rPr lang="en-US" sz="1600" b="1"/>
+              <a:t>Custom</a:t>
+            </a:r>
+          </a:p>
+          <a:p>
+            <a:pPr algn="ctr"/>
+            <a:r>
+              <a:rPr lang="en-US" sz="1600" b="1"/>
+              <a:t>Custom Device Class</a:t>
+            </a:r>
+          </a:p>
+        </p:txBody>
+      </p:sp>
+      <p:sp>
+        <p:nvSpPr>
+          <p:cNvPr id="7" name="Rectangle 6">
+            <a:extLst>
+              <a:ext uri="{FF2B5EF4-FFF2-40B4-BE49-F238E27FC236}">
+                <a16:creationId xmlns:a16="http://schemas.microsoft.com/office/drawing/2014/main" id="{77575ABB-9782-EF18-E8D8-E6CF6DC0C1E3}"/>
+              </a:ext>
+            </a:extLst>
+          </p:cNvPr>
+          <p:cNvSpPr/>
+          <p:nvPr/>
+        </p:nvSpPr>
+        <p:spPr>
+          <a:xfrm>
+            <a:off x="3849914" y="1711796"/>
+            <a:ext cx="2520000" cy="540000"/>
+          </a:xfrm>
+          <a:prstGeom prst="rect">
+            <a:avLst/>
+          </a:prstGeom>
+          <a:solidFill>
+            <a:srgbClr val="CF364A"/>
+          </a:solidFill>
+          <a:ln>
+            <a:noFill/>
+          </a:ln>
+          <a:effectLst/>
+        </p:spPr>
+        <p:style>
+          <a:lnRef idx="1">
+            <a:schemeClr val="accent1"/>
+          </a:lnRef>
+          <a:fillRef idx="3">
+            <a:schemeClr val="accent1"/>
+          </a:fillRef>
+          <a:effectRef idx="2">
+            <a:schemeClr val="accent1"/>
+          </a:effectRef>
+          <a:fontRef idx="minor">
+            <a:schemeClr val="lt1"/>
+          </a:fontRef>
+        </p:style>
+        <p:txBody>
+          <a:bodyPr rtlCol="0" anchor="ctr"/>
+          <a:lstStyle/>
+          <a:p>
+            <a:pPr algn="ctr"/>
+            <a:r>
+              <a:rPr lang="en-US" sz="1600" b="1"/>
+              <a:t>CDC</a:t>
+            </a:r>
+          </a:p>
+          <a:p>
+            <a:pPr algn="ctr"/>
+            <a:r>
+              <a:rPr lang="en-US" sz="1600" b="1"/>
+              <a:t>Communications Device</a:t>
+            </a:r>
+          </a:p>
+        </p:txBody>
+      </p:sp>
+      <p:sp>
+        <p:nvSpPr>
+          <p:cNvPr id="8" name="Rectangle 7">
+            <a:extLst>
+              <a:ext uri="{FF2B5EF4-FFF2-40B4-BE49-F238E27FC236}">
+                <a16:creationId xmlns:a16="http://schemas.microsoft.com/office/drawing/2014/main" id="{E82EB195-8F96-2F3A-2DAD-E723A4D48636}"/>
+              </a:ext>
+            </a:extLst>
+          </p:cNvPr>
+          <p:cNvSpPr/>
+          <p:nvPr/>
+        </p:nvSpPr>
+        <p:spPr>
+          <a:xfrm>
+            <a:off x="1197735" y="2394866"/>
+            <a:ext cx="2520000" cy="540000"/>
+          </a:xfrm>
+          <a:prstGeom prst="rect">
+            <a:avLst/>
+          </a:prstGeom>
+          <a:solidFill>
+            <a:srgbClr val="00A960"/>
+          </a:solidFill>
+          <a:ln>
+            <a:noFill/>
+          </a:ln>
+          <a:effectLst/>
+        </p:spPr>
+        <p:style>
+          <a:lnRef idx="1">
+            <a:schemeClr val="accent1"/>
+          </a:lnRef>
+          <a:fillRef idx="3">
+            <a:schemeClr val="accent1"/>
+          </a:fillRef>
+          <a:effectRef idx="2">
+            <a:schemeClr val="accent1"/>
+          </a:effectRef>
+          <a:fontRef idx="minor">
+            <a:schemeClr val="lt1"/>
+          </a:fontRef>
+        </p:style>
+        <p:txBody>
+          <a:bodyPr rtlCol="0" anchor="ctr"/>
+          <a:lstStyle/>
+          <a:p>
+            <a:pPr algn="ctr"/>
+            <a:r>
+              <a:rPr lang="en-US" sz="1600" b="1"/>
+              <a:t>MSC</a:t>
+            </a:r>
+          </a:p>
+          <a:p>
+            <a:pPr algn="ctr"/>
+            <a:r>
+              <a:rPr lang="en-US" sz="1600" b="1"/>
+              <a:t>Mass Storage Class</a:t>
+            </a:r>
+          </a:p>
+        </p:txBody>
+      </p:sp>
+      <p:sp>
+        <p:nvSpPr>
+          <p:cNvPr id="9" name="Rectangle 8">
+            <a:extLst>
+              <a:ext uri="{FF2B5EF4-FFF2-40B4-BE49-F238E27FC236}">
+                <a16:creationId xmlns:a16="http://schemas.microsoft.com/office/drawing/2014/main" id="{CC903C07-4A15-AF99-90DE-191AF2002423}"/>
+              </a:ext>
+            </a:extLst>
+          </p:cNvPr>
+          <p:cNvSpPr/>
+          <p:nvPr/>
+        </p:nvSpPr>
+        <p:spPr>
+          <a:xfrm>
+            <a:off x="6528474" y="2394866"/>
+            <a:ext cx="2520000" cy="540000"/>
+          </a:xfrm>
+          <a:prstGeom prst="rect">
+            <a:avLst/>
+          </a:prstGeom>
+          <a:solidFill>
+            <a:srgbClr val="00C3DC"/>
+          </a:solidFill>
+          <a:ln>
+            <a:noFill/>
+          </a:ln>
+          <a:effectLst/>
+        </p:spPr>
+        <p:style>
+          <a:lnRef idx="1">
+            <a:schemeClr val="accent1"/>
+          </a:lnRef>
+          <a:fillRef idx="3">
+            <a:schemeClr val="accent1"/>
+          </a:fillRef>
+          <a:effectRef idx="2">
+            <a:schemeClr val="accent1"/>
+          </a:effectRef>
+          <a:fontRef idx="minor">
+            <a:schemeClr val="lt1"/>
+          </a:fontRef>
+        </p:style>
+        <p:txBody>
+          <a:bodyPr rtlCol="0" anchor="ctr"/>
+          <a:lstStyle/>
+          <a:p>
+            <a:pPr algn="ctr"/>
+            <a:r>
+              <a:rPr lang="en-US" sz="1600" b="1">
+                <a:solidFill>
+                  <a:schemeClr val="bg1"/>
+                </a:solidFill>
+              </a:rPr>
+              <a:t>ADC</a:t>
+            </a:r>
+          </a:p>
+          <a:p>
+            <a:pPr algn="ctr"/>
+            <a:r>
+              <a:rPr lang="en-US" sz="1600" b="1">
+                <a:solidFill>
+                  <a:schemeClr val="bg1"/>
+                </a:solidFill>
+              </a:rPr>
+              <a:t>Audio Device Class</a:t>
+            </a:r>
+          </a:p>
+        </p:txBody>
+      </p:sp>
+      <p:sp>
+        <p:nvSpPr>
+          <p:cNvPr id="10" name="Rectangle 9"/>
+          <p:cNvSpPr/>
+          <p:nvPr/>
+        </p:nvSpPr>
+        <p:spPr>
+          <a:xfrm>
+            <a:off x="736600" y="3208902"/>
+            <a:ext cx="8460000" cy="1512000"/>
+          </a:xfrm>
+          <a:prstGeom prst="rect">
+            <a:avLst/>
+          </a:prstGeom>
+          <a:solidFill>
+            <a:srgbClr val="808082">
+              <a:alpha val="40000"/>
+            </a:srgbClr>
+          </a:solidFill>
+          <a:ln>
+            <a:noFill/>
+          </a:ln>
+          <a:effectLst/>
+        </p:spPr>
+        <p:style>
+          <a:lnRef idx="1">
+            <a:schemeClr val="accent1"/>
+          </a:lnRef>
+          <a:fillRef idx="3">
+            <a:schemeClr val="accent1"/>
+          </a:fillRef>
+          <a:effectRef idx="2">
+            <a:schemeClr val="accent1"/>
+          </a:effectRef>
+          <a:fontRef idx="minor">
+            <a:schemeClr val="lt1"/>
+          </a:fontRef>
+        </p:style>
+        <p:txBody>
+          <a:bodyPr vert="vert270" rtlCol="0" anchor="t"/>
+          <a:lstStyle/>
+          <a:p>
+            <a:pPr algn="ctr"/>
+            <a:r>
+              <a:rPr lang="en-US" b="1">
                 <a:solidFill>
                   <a:schemeClr val="tx1"/>
                 </a:solidFill>
               </a:rPr>
               <a:t>USB Host</a:t>
             </a:r>
-            <a:endParaRPr lang="en-GB" sz="2800" b="1" dirty="0">
+            <a:endParaRPr lang="en-GB" sz="2800" b="1">
               <a:solidFill>
                 <a:schemeClr val="tx1"/>
               </a:solidFill>
@@ -3972,13 +4500,13 @@
       </p:sp>
       <p:sp>
         <p:nvSpPr>
-          <p:cNvPr id="29" name="Rectangle 28"/>
+          <p:cNvPr id="11" name="Rectangle 10"/>
           <p:cNvSpPr/>
           <p:nvPr/>
         </p:nvSpPr>
         <p:spPr>
           <a:xfrm>
-            <a:off x="1197735" y="1637751"/>
+            <a:off x="1197735" y="3359165"/>
             <a:ext cx="2520000" cy="540000"/>
           </a:xfrm>
           <a:prstGeom prst="rect">
@@ -4012,14 +4540,14 @@
           <a:p>
             <a:pPr algn="ctr"/>
             <a:r>
-              <a:rPr lang="en-US" sz="1600" b="1" dirty="0"/>
+              <a:rPr lang="en-US" sz="1600" b="1"/>
               <a:t>HID</a:t>
             </a:r>
           </a:p>
           <a:p>
             <a:pPr algn="ctr"/>
             <a:r>
-              <a:rPr lang="en-US" sz="1600" b="1" dirty="0"/>
+              <a:rPr lang="en-US" sz="1600" b="1"/>
               <a:t>Human Interface Device</a:t>
             </a:r>
           </a:p>
@@ -4027,13 +4555,13 @@
       </p:sp>
       <p:sp>
         <p:nvSpPr>
-          <p:cNvPr id="45" name="Rectangle 44"/>
+          <p:cNvPr id="12" name="Rectangle 11"/>
           <p:cNvSpPr/>
           <p:nvPr/>
         </p:nvSpPr>
         <p:spPr>
           <a:xfrm>
-            <a:off x="6528474" y="1637751"/>
+            <a:off x="6528474" y="3359165"/>
             <a:ext cx="2520000" cy="540000"/>
           </a:xfrm>
           <a:prstGeom prst="rect">
@@ -4067,7 +4595,7 @@
           <a:p>
             <a:pPr algn="ctr"/>
             <a:r>
-              <a:rPr lang="en-US" b="1" dirty="0"/>
+              <a:rPr lang="en-US" b="1"/>
               <a:t>USB Host Core</a:t>
             </a:r>
           </a:p>
@@ -4075,13 +4603,13 @@
       </p:sp>
       <p:sp>
         <p:nvSpPr>
-          <p:cNvPr id="47" name="Rectangle 46"/>
+          <p:cNvPr id="13" name="Rectangle 12"/>
           <p:cNvSpPr/>
           <p:nvPr/>
         </p:nvSpPr>
         <p:spPr>
           <a:xfrm>
-            <a:off x="3849914" y="2320821"/>
+            <a:off x="3849914" y="4042235"/>
             <a:ext cx="2520000" cy="540000"/>
           </a:xfrm>
           <a:prstGeom prst="rect">
@@ -4115,14 +4643,14 @@
           <a:p>
             <a:pPr algn="ctr"/>
             <a:r>
-              <a:rPr lang="en-US" sz="1600" b="1" dirty="0"/>
+              <a:rPr lang="en-US" sz="1600" b="1"/>
               <a:t>Custom</a:t>
             </a:r>
           </a:p>
           <a:p>
             <a:pPr algn="ctr"/>
             <a:r>
-              <a:rPr lang="en-US" sz="1600" b="1" dirty="0"/>
+              <a:rPr lang="en-US" sz="1600" b="1"/>
               <a:t>Custom Device Class</a:t>
             </a:r>
           </a:p>
@@ -4130,13 +4658,13 @@
       </p:sp>
       <p:sp>
         <p:nvSpPr>
-          <p:cNvPr id="48" name="Rectangle 47"/>
+          <p:cNvPr id="14" name="Rectangle 13"/>
           <p:cNvSpPr/>
           <p:nvPr/>
         </p:nvSpPr>
         <p:spPr>
           <a:xfrm>
-            <a:off x="3849914" y="1637751"/>
+            <a:off x="3849914" y="3359165"/>
             <a:ext cx="2520000" cy="540000"/>
           </a:xfrm>
           <a:prstGeom prst="rect">
@@ -4170,14 +4698,14 @@
           <a:p>
             <a:pPr algn="ctr"/>
             <a:r>
-              <a:rPr lang="en-US" sz="1600" b="1" dirty="0"/>
+              <a:rPr lang="en-US" sz="1600" b="1"/>
               <a:t>CDC</a:t>
             </a:r>
           </a:p>
           <a:p>
             <a:pPr algn="ctr"/>
             <a:r>
-              <a:rPr lang="en-US" sz="1600" b="1" dirty="0"/>
+              <a:rPr lang="en-US" sz="1600" b="1"/>
               <a:t>Communications Device</a:t>
             </a:r>
           </a:p>
@@ -4185,13 +4713,13 @@
       </p:sp>
       <p:sp>
         <p:nvSpPr>
-          <p:cNvPr id="49" name="Rectangle 48"/>
+          <p:cNvPr id="15" name="Rectangle 14"/>
           <p:cNvSpPr/>
           <p:nvPr/>
         </p:nvSpPr>
         <p:spPr>
           <a:xfrm>
-            <a:off x="1197735" y="2320821"/>
+            <a:off x="1197735" y="4042235"/>
             <a:ext cx="2520000" cy="540000"/>
           </a:xfrm>
           <a:prstGeom prst="rect">
@@ -4225,501 +4753,15 @@
           <a:p>
             <a:pPr algn="ctr"/>
             <a:r>
-              <a:rPr lang="en-US" sz="1600" b="1" dirty="0"/>
+              <a:rPr lang="en-US" sz="1600" b="1"/>
               <a:t>MSC</a:t>
             </a:r>
           </a:p>
           <a:p>
             <a:pPr algn="ctr"/>
             <a:r>
-              <a:rPr lang="en-US" sz="1600" b="1" dirty="0"/>
+              <a:rPr lang="en-US" sz="1600" b="1"/>
               <a:t>Mass Storage Class</a:t>
-            </a:r>
-          </a:p>
-        </p:txBody>
-      </p:sp>
-      <p:sp>
-        <p:nvSpPr>
-          <p:cNvPr id="61" name="Rectangle 60"/>
-          <p:cNvSpPr/>
-          <p:nvPr/>
-        </p:nvSpPr>
-        <p:spPr>
-          <a:xfrm>
-            <a:off x="1200858" y="5368690"/>
-            <a:ext cx="3852000" cy="540000"/>
-          </a:xfrm>
-          <a:prstGeom prst="rect">
-            <a:avLst/>
-          </a:prstGeom>
-          <a:solidFill>
-            <a:srgbClr val="58595B"/>
-          </a:solidFill>
-          <a:ln>
-            <a:noFill/>
-          </a:ln>
-          <a:effectLst/>
-        </p:spPr>
-        <p:style>
-          <a:lnRef idx="1">
-            <a:schemeClr val="accent1"/>
-          </a:lnRef>
-          <a:fillRef idx="3">
-            <a:schemeClr val="accent1"/>
-          </a:fillRef>
-          <a:effectRef idx="2">
-            <a:schemeClr val="accent1"/>
-          </a:effectRef>
-          <a:fontRef idx="minor">
-            <a:schemeClr val="lt1"/>
-          </a:fontRef>
-        </p:style>
-        <p:txBody>
-          <a:bodyPr rtlCol="0" anchor="ctr"/>
-          <a:lstStyle/>
-          <a:p>
-            <a:pPr algn="ctr"/>
-            <a:r>
-              <a:rPr lang="en-US" sz="1600" b="1" dirty="0"/>
-              <a:t>USB Host</a:t>
-            </a:r>
-          </a:p>
-        </p:txBody>
-      </p:sp>
-      <p:sp>
-        <p:nvSpPr>
-          <p:cNvPr id="62" name="Rectangle 61"/>
-          <p:cNvSpPr/>
-          <p:nvPr/>
-        </p:nvSpPr>
-        <p:spPr>
-          <a:xfrm>
-            <a:off x="736600" y="3175177"/>
-            <a:ext cx="8460000" cy="1512000"/>
-          </a:xfrm>
-          <a:prstGeom prst="rect">
-            <a:avLst/>
-          </a:prstGeom>
-          <a:solidFill>
-            <a:srgbClr val="808082">
-              <a:alpha val="40000"/>
-            </a:srgbClr>
-          </a:solidFill>
-          <a:ln>
-            <a:noFill/>
-          </a:ln>
-          <a:effectLst/>
-        </p:spPr>
-        <p:style>
-          <a:lnRef idx="1">
-            <a:schemeClr val="accent1"/>
-          </a:lnRef>
-          <a:fillRef idx="3">
-            <a:schemeClr val="accent1"/>
-          </a:fillRef>
-          <a:effectRef idx="2">
-            <a:schemeClr val="accent1"/>
-          </a:effectRef>
-          <a:fontRef idx="minor">
-            <a:schemeClr val="lt1"/>
-          </a:fontRef>
-        </p:style>
-        <p:txBody>
-          <a:bodyPr vert="vert270" rtlCol="0" anchor="t"/>
-          <a:lstStyle/>
-          <a:p>
-            <a:pPr algn="ctr"/>
-            <a:r>
-              <a:rPr lang="en-US" b="1" dirty="0">
-                <a:solidFill>
-                  <a:schemeClr val="tx1"/>
-                </a:solidFill>
-              </a:rPr>
-              <a:t>USB Device</a:t>
-            </a:r>
-            <a:endParaRPr lang="en-GB" sz="2800" b="1" dirty="0">
-              <a:solidFill>
-                <a:schemeClr val="tx1"/>
-              </a:solidFill>
-            </a:endParaRPr>
-          </a:p>
-        </p:txBody>
-      </p:sp>
-      <p:sp>
-        <p:nvSpPr>
-          <p:cNvPr id="63" name="Rectangle 62"/>
-          <p:cNvSpPr/>
-          <p:nvPr/>
-        </p:nvSpPr>
-        <p:spPr>
-          <a:xfrm>
-            <a:off x="1197735" y="3325440"/>
-            <a:ext cx="2520000" cy="540000"/>
-          </a:xfrm>
-          <a:prstGeom prst="rect">
-            <a:avLst/>
-          </a:prstGeom>
-          <a:solidFill>
-            <a:srgbClr val="128CAB"/>
-          </a:solidFill>
-          <a:ln>
-            <a:noFill/>
-          </a:ln>
-          <a:effectLst/>
-        </p:spPr>
-        <p:style>
-          <a:lnRef idx="1">
-            <a:schemeClr val="accent1"/>
-          </a:lnRef>
-          <a:fillRef idx="3">
-            <a:schemeClr val="accent1"/>
-          </a:fillRef>
-          <a:effectRef idx="2">
-            <a:schemeClr val="accent1"/>
-          </a:effectRef>
-          <a:fontRef idx="minor">
-            <a:schemeClr val="lt1"/>
-          </a:fontRef>
-        </p:style>
-        <p:txBody>
-          <a:bodyPr rtlCol="0" anchor="ctr"/>
-          <a:lstStyle/>
-          <a:p>
-            <a:pPr algn="ctr"/>
-            <a:r>
-              <a:rPr lang="en-US" sz="1600" b="1" dirty="0"/>
-              <a:t>HID</a:t>
-            </a:r>
-          </a:p>
-          <a:p>
-            <a:pPr algn="ctr"/>
-            <a:r>
-              <a:rPr lang="en-US" sz="1600" b="1" dirty="0"/>
-              <a:t>Human Interface Device</a:t>
-            </a:r>
-          </a:p>
-        </p:txBody>
-      </p:sp>
-      <p:sp>
-        <p:nvSpPr>
-          <p:cNvPr id="64" name="Rectangle 63"/>
-          <p:cNvSpPr/>
-          <p:nvPr/>
-        </p:nvSpPr>
-        <p:spPr>
-          <a:xfrm>
-            <a:off x="6528474" y="3325440"/>
-            <a:ext cx="2520000" cy="540000"/>
-          </a:xfrm>
-          <a:prstGeom prst="rect">
-            <a:avLst/>
-          </a:prstGeom>
-          <a:solidFill>
-            <a:srgbClr val="765F97"/>
-          </a:solidFill>
-          <a:ln>
-            <a:noFill/>
-          </a:ln>
-          <a:effectLst/>
-        </p:spPr>
-        <p:style>
-          <a:lnRef idx="1">
-            <a:schemeClr val="accent1"/>
-          </a:lnRef>
-          <a:fillRef idx="3">
-            <a:schemeClr val="accent1"/>
-          </a:fillRef>
-          <a:effectRef idx="2">
-            <a:schemeClr val="accent1"/>
-          </a:effectRef>
-          <a:fontRef idx="minor">
-            <a:schemeClr val="lt1"/>
-          </a:fontRef>
-        </p:style>
-        <p:txBody>
-          <a:bodyPr rtlCol="0" anchor="ctr"/>
-          <a:lstStyle/>
-          <a:p>
-            <a:pPr algn="ctr"/>
-            <a:r>
-              <a:rPr lang="en-US" b="1" dirty="0"/>
-              <a:t>USB Device Core</a:t>
-            </a:r>
-          </a:p>
-        </p:txBody>
-      </p:sp>
-      <p:sp>
-        <p:nvSpPr>
-          <p:cNvPr id="65" name="Rectangle 64"/>
-          <p:cNvSpPr/>
-          <p:nvPr/>
-        </p:nvSpPr>
-        <p:spPr>
-          <a:xfrm>
-            <a:off x="3849914" y="4008510"/>
-            <a:ext cx="2520000" cy="540000"/>
-          </a:xfrm>
-          <a:prstGeom prst="rect">
-            <a:avLst/>
-          </a:prstGeom>
-          <a:solidFill>
-            <a:srgbClr val="D77B00"/>
-          </a:solidFill>
-          <a:ln>
-            <a:noFill/>
-          </a:ln>
-          <a:effectLst/>
-        </p:spPr>
-        <p:style>
-          <a:lnRef idx="1">
-            <a:schemeClr val="accent1"/>
-          </a:lnRef>
-          <a:fillRef idx="3">
-            <a:schemeClr val="accent1"/>
-          </a:fillRef>
-          <a:effectRef idx="2">
-            <a:schemeClr val="accent1"/>
-          </a:effectRef>
-          <a:fontRef idx="minor">
-            <a:schemeClr val="lt1"/>
-          </a:fontRef>
-        </p:style>
-        <p:txBody>
-          <a:bodyPr rtlCol="0" anchor="ctr"/>
-          <a:lstStyle/>
-          <a:p>
-            <a:pPr algn="ctr"/>
-            <a:r>
-              <a:rPr lang="en-US" sz="1600" b="1" dirty="0"/>
-              <a:t>Custom</a:t>
-            </a:r>
-          </a:p>
-          <a:p>
-            <a:pPr algn="ctr"/>
-            <a:r>
-              <a:rPr lang="en-US" sz="1600" b="1" dirty="0"/>
-              <a:t>Custom Device Class</a:t>
-            </a:r>
-          </a:p>
-        </p:txBody>
-      </p:sp>
-      <p:sp>
-        <p:nvSpPr>
-          <p:cNvPr id="66" name="Rectangle 65"/>
-          <p:cNvSpPr/>
-          <p:nvPr/>
-        </p:nvSpPr>
-        <p:spPr>
-          <a:xfrm>
-            <a:off x="3849914" y="3325440"/>
-            <a:ext cx="2520000" cy="540000"/>
-          </a:xfrm>
-          <a:prstGeom prst="rect">
-            <a:avLst/>
-          </a:prstGeom>
-          <a:solidFill>
-            <a:srgbClr val="CF364A"/>
-          </a:solidFill>
-          <a:ln>
-            <a:noFill/>
-          </a:ln>
-          <a:effectLst/>
-        </p:spPr>
-        <p:style>
-          <a:lnRef idx="1">
-            <a:schemeClr val="accent1"/>
-          </a:lnRef>
-          <a:fillRef idx="3">
-            <a:schemeClr val="accent1"/>
-          </a:fillRef>
-          <a:effectRef idx="2">
-            <a:schemeClr val="accent1"/>
-          </a:effectRef>
-          <a:fontRef idx="minor">
-            <a:schemeClr val="lt1"/>
-          </a:fontRef>
-        </p:style>
-        <p:txBody>
-          <a:bodyPr rtlCol="0" anchor="ctr"/>
-          <a:lstStyle/>
-          <a:p>
-            <a:pPr algn="ctr"/>
-            <a:r>
-              <a:rPr lang="en-US" sz="1600" b="1" dirty="0"/>
-              <a:t>CDC</a:t>
-            </a:r>
-          </a:p>
-          <a:p>
-            <a:pPr algn="ctr"/>
-            <a:r>
-              <a:rPr lang="en-US" sz="1600" b="1" dirty="0"/>
-              <a:t>Communications Device</a:t>
-            </a:r>
-          </a:p>
-        </p:txBody>
-      </p:sp>
-      <p:sp>
-        <p:nvSpPr>
-          <p:cNvPr id="67" name="Rectangle 66"/>
-          <p:cNvSpPr/>
-          <p:nvPr/>
-        </p:nvSpPr>
-        <p:spPr>
-          <a:xfrm>
-            <a:off x="1197735" y="4008510"/>
-            <a:ext cx="2520000" cy="540000"/>
-          </a:xfrm>
-          <a:prstGeom prst="rect">
-            <a:avLst/>
-          </a:prstGeom>
-          <a:solidFill>
-            <a:srgbClr val="00A960"/>
-          </a:solidFill>
-          <a:ln>
-            <a:noFill/>
-          </a:ln>
-          <a:effectLst/>
-        </p:spPr>
-        <p:style>
-          <a:lnRef idx="1">
-            <a:schemeClr val="accent1"/>
-          </a:lnRef>
-          <a:fillRef idx="3">
-            <a:schemeClr val="accent1"/>
-          </a:fillRef>
-          <a:effectRef idx="2">
-            <a:schemeClr val="accent1"/>
-          </a:effectRef>
-          <a:fontRef idx="minor">
-            <a:schemeClr val="lt1"/>
-          </a:fontRef>
-        </p:style>
-        <p:txBody>
-          <a:bodyPr rtlCol="0" anchor="ctr"/>
-          <a:lstStyle/>
-          <a:p>
-            <a:pPr algn="ctr"/>
-            <a:r>
-              <a:rPr lang="en-US" sz="1600" b="1" dirty="0"/>
-              <a:t>MSC</a:t>
-            </a:r>
-          </a:p>
-          <a:p>
-            <a:pPr algn="ctr"/>
-            <a:r>
-              <a:rPr lang="en-US" sz="1600" b="1" dirty="0"/>
-              <a:t>Mass Storage Class</a:t>
-            </a:r>
-          </a:p>
-        </p:txBody>
-      </p:sp>
-      <p:sp>
-        <p:nvSpPr>
-          <p:cNvPr id="27" name="Rectangle 26"/>
-          <p:cNvSpPr/>
-          <p:nvPr/>
-        </p:nvSpPr>
-        <p:spPr>
-          <a:xfrm>
-            <a:off x="6528474" y="4008510"/>
-            <a:ext cx="2520000" cy="540000"/>
-          </a:xfrm>
-          <a:prstGeom prst="rect">
-            <a:avLst/>
-          </a:prstGeom>
-          <a:solidFill>
-            <a:srgbClr val="00C3DC"/>
-          </a:solidFill>
-          <a:ln>
-            <a:noFill/>
-          </a:ln>
-          <a:effectLst/>
-        </p:spPr>
-        <p:style>
-          <a:lnRef idx="1">
-            <a:schemeClr val="accent1"/>
-          </a:lnRef>
-          <a:fillRef idx="3">
-            <a:schemeClr val="accent1"/>
-          </a:fillRef>
-          <a:effectRef idx="2">
-            <a:schemeClr val="accent1"/>
-          </a:effectRef>
-          <a:fontRef idx="minor">
-            <a:schemeClr val="lt1"/>
-          </a:fontRef>
-        </p:style>
-        <p:txBody>
-          <a:bodyPr rtlCol="0" anchor="ctr"/>
-          <a:lstStyle/>
-          <a:p>
-            <a:pPr algn="ctr"/>
-            <a:r>
-              <a:rPr lang="en-US" sz="1600" b="1" dirty="0">
-                <a:solidFill>
-                  <a:schemeClr val="bg1"/>
-                </a:solidFill>
-              </a:rPr>
-              <a:t>ADC</a:t>
-            </a:r>
-          </a:p>
-          <a:p>
-            <a:pPr algn="ctr"/>
-            <a:r>
-              <a:rPr lang="en-US" sz="1600" b="1" dirty="0">
-                <a:solidFill>
-                  <a:schemeClr val="bg1"/>
-                </a:solidFill>
-              </a:rPr>
-              <a:t>Audio Device Class</a:t>
-            </a:r>
-          </a:p>
-        </p:txBody>
-      </p:sp>
-      <p:sp>
-        <p:nvSpPr>
-          <p:cNvPr id="68" name="Rectangle 67"/>
-          <p:cNvSpPr/>
-          <p:nvPr/>
-        </p:nvSpPr>
-        <p:spPr>
-          <a:xfrm>
-            <a:off x="5196474" y="5368690"/>
-            <a:ext cx="3852000" cy="540000"/>
-          </a:xfrm>
-          <a:prstGeom prst="rect">
-            <a:avLst/>
-          </a:prstGeom>
-          <a:solidFill>
-            <a:srgbClr val="58595B"/>
-          </a:solidFill>
-          <a:ln>
-            <a:noFill/>
-          </a:ln>
-          <a:effectLst/>
-        </p:spPr>
-        <p:style>
-          <a:lnRef idx="1">
-            <a:schemeClr val="accent1"/>
-          </a:lnRef>
-          <a:fillRef idx="3">
-            <a:schemeClr val="accent1"/>
-          </a:fillRef>
-          <a:effectRef idx="2">
-            <a:schemeClr val="accent1"/>
-          </a:effectRef>
-          <a:fontRef idx="minor">
-            <a:schemeClr val="lt1"/>
-          </a:fontRef>
-        </p:style>
-        <p:txBody>
-          <a:bodyPr rtlCol="0" anchor="ctr"/>
-          <a:lstStyle/>
-          <a:p>
-            <a:pPr algn="ctr"/>
-            <a:r>
-              <a:rPr lang="en-US" sz="1600" b="1" dirty="0"/>
-              <a:t>USB Device</a:t>
             </a:r>
           </a:p>
         </p:txBody>
@@ -4796,7 +4838,7 @@
           <a:p>
             <a:pPr algn="ctr"/>
             <a:r>
-              <a:rPr lang="en-US" sz="2200" b="1" dirty="0">
+              <a:rPr lang="en-US" sz="2200" b="1">
                 <a:latin typeface="Gill Sans MT" panose="020B0502020104020203" pitchFamily="34" charset="0"/>
               </a:rPr>
               <a:t>File System</a:t>
@@ -4846,7 +4888,7 @@
           <a:p>
             <a:pPr algn="ctr"/>
             <a:r>
-              <a:rPr lang="en-US" sz="2200" b="1" dirty="0">
+              <a:rPr lang="en-US" sz="2200" b="1">
                 <a:latin typeface="Gill Sans MT" panose="020B0502020104020203" pitchFamily="34" charset="0"/>
               </a:rPr>
               <a:t>CMSIS-Driver USB Host</a:t>
@@ -4896,12 +4938,12 @@
           <a:p>
             <a:pPr algn="ctr"/>
             <a:r>
-              <a:rPr lang="en-US" sz="2200" b="1" dirty="0">
+              <a:rPr lang="en-US" sz="2200" b="1">
                 <a:latin typeface="Gill Sans MT" panose="020B0502020104020203" pitchFamily="34" charset="0"/>
               </a:rPr>
               <a:t>USB Host</a:t>
             </a:r>
-            <a:endParaRPr lang="en-US" sz="2200" dirty="0">
+            <a:endParaRPr lang="en-US" sz="2200">
               <a:latin typeface="Gill Sans MT" panose="020B0502020104020203" pitchFamily="34" charset="0"/>
             </a:endParaRPr>
           </a:p>
@@ -4949,12 +4991,12 @@
           <a:p>
             <a:pPr algn="ctr"/>
             <a:r>
-              <a:rPr lang="en-US" sz="2200" b="1" dirty="0">
+              <a:rPr lang="en-US" sz="2200" b="1">
                 <a:latin typeface="Gill Sans MT" panose="020B0502020104020203" pitchFamily="34" charset="0"/>
               </a:rPr>
               <a:t>USB Host MSC Driver</a:t>
             </a:r>
-            <a:endParaRPr lang="en-US" sz="2200" dirty="0">
+            <a:endParaRPr lang="en-US" sz="2200">
               <a:latin typeface="Gill Sans MT" panose="020B0502020104020203" pitchFamily="34" charset="0"/>
             </a:endParaRPr>
           </a:p>
@@ -4983,7 +5025,7 @@
           <a:lstStyle/>
           <a:p>
             <a:r>
-              <a:rPr lang="en-US" sz="1400" b="1" dirty="0">
+              <a:rPr lang="en-US" sz="1400" b="1">
                 <a:latin typeface="Courier New" panose="02070309020205020404" pitchFamily="49" charset="0"/>
                 <a:cs typeface="Courier New" panose="02070309020205020404" pitchFamily="49" charset="0"/>
               </a:rPr>
@@ -5015,13 +5057,13 @@
           <a:lstStyle/>
           <a:p>
             <a:r>
-              <a:rPr lang="en-US" sz="1400" b="1" dirty="0" err="1">
+              <a:rPr lang="en-US" sz="1400" b="1" err="1">
                 <a:latin typeface="Courier New" panose="02070309020205020404" pitchFamily="49" charset="0"/>
                 <a:cs typeface="Courier New" panose="02070309020205020404" pitchFamily="49" charset="0"/>
               </a:rPr>
               <a:t>USBH_MSC_GetDeviceStatus</a:t>
             </a:r>
-            <a:endParaRPr lang="en-US" sz="1400" b="1" dirty="0">
+            <a:endParaRPr lang="en-US" sz="1400" b="1">
               <a:latin typeface="Courier New" panose="02070309020205020404" pitchFamily="49" charset="0"/>
               <a:cs typeface="Courier New" panose="02070309020205020404" pitchFamily="49" charset="0"/>
             </a:endParaRPr>
@@ -5051,26 +5093,26 @@
           <a:lstStyle/>
           <a:p>
             <a:r>
-              <a:rPr lang="en-US" sz="1400" b="1" dirty="0" err="1">
+              <a:rPr lang="en-US" sz="1400" b="1" err="1">
                 <a:latin typeface="Courier New" panose="02070309020205020404" pitchFamily="49" charset="0"/>
                 <a:cs typeface="Courier New" panose="02070309020205020404" pitchFamily="49" charset="0"/>
               </a:rPr>
               <a:t>USBH_Initialize</a:t>
             </a:r>
-            <a:endParaRPr lang="en-US" sz="1400" b="1" dirty="0">
+            <a:endParaRPr lang="en-US" sz="1400" b="1">
               <a:latin typeface="Courier New" panose="02070309020205020404" pitchFamily="49" charset="0"/>
               <a:cs typeface="Courier New" panose="02070309020205020404" pitchFamily="49" charset="0"/>
             </a:endParaRPr>
           </a:p>
           <a:p>
             <a:r>
-              <a:rPr lang="en-US" sz="1400" b="1" dirty="0" err="1">
+              <a:rPr lang="en-US" sz="1400" b="1" err="1">
                 <a:latin typeface="Courier New" panose="02070309020205020404" pitchFamily="49" charset="0"/>
                 <a:cs typeface="Courier New" panose="02070309020205020404" pitchFamily="49" charset="0"/>
               </a:rPr>
               <a:t>USBH_Uninitialize</a:t>
             </a:r>
-            <a:endParaRPr lang="en-US" sz="1400" b="1" dirty="0">
+            <a:endParaRPr lang="en-US" sz="1400" b="1">
               <a:latin typeface="Courier New" panose="02070309020205020404" pitchFamily="49" charset="0"/>
               <a:cs typeface="Courier New" panose="02070309020205020404" pitchFamily="49" charset="0"/>
             </a:endParaRPr>
@@ -5245,7 +5287,7 @@
           <a:p>
             <a:pPr algn="ctr"/>
             <a:r>
-              <a:rPr lang="en-US" sz="2200" b="1" dirty="0">
+              <a:rPr lang="en-US" sz="2200" b="1">
                 <a:latin typeface="Gill Sans MT" panose="020B0502020104020203" pitchFamily="34" charset="0"/>
               </a:rPr>
               <a:t>File System</a:t>
@@ -5295,7 +5337,7 @@
           <a:p>
             <a:pPr algn="ctr"/>
             <a:r>
-              <a:rPr lang="en-US" sz="2200" b="1" dirty="0">
+              <a:rPr lang="en-US" sz="2200" b="1">
                 <a:latin typeface="Gill Sans MT" panose="020B0502020104020203" pitchFamily="34" charset="0"/>
               </a:rPr>
               <a:t>User Application</a:t>
@@ -5345,12 +5387,12 @@
           <a:p>
             <a:pPr algn="ctr"/>
             <a:r>
-              <a:rPr lang="en-US" sz="2200" b="1" dirty="0">
+              <a:rPr lang="en-US" sz="2200" b="1">
                 <a:latin typeface="Gill Sans MT" panose="020B0502020104020203" pitchFamily="34" charset="0"/>
               </a:rPr>
               <a:t>USB Device</a:t>
             </a:r>
-            <a:endParaRPr lang="en-US" sz="2200" dirty="0">
+            <a:endParaRPr lang="en-US" sz="2200">
               <a:latin typeface="Gill Sans MT" panose="020B0502020104020203" pitchFamily="34" charset="0"/>
             </a:endParaRPr>
           </a:p>
@@ -5552,7 +5594,7 @@
           <a:p>
             <a:pPr algn="ctr"/>
             <a:r>
-              <a:rPr lang="en-US" sz="2200" b="1" dirty="0">
+              <a:rPr lang="en-US" sz="2200" b="1">
                 <a:latin typeface="Gill Sans MT" panose="020B0502020104020203" pitchFamily="34" charset="0"/>
               </a:rPr>
               <a:t>Storage Media</a:t>
@@ -5697,14 +5739,14 @@
           <a:p>
             <a:pPr algn="ctr"/>
             <a:r>
-              <a:rPr lang="en-US" sz="2000" b="1" dirty="0">
+              <a:rPr lang="en-US" sz="2000" b="1">
                 <a:solidFill>
                   <a:schemeClr val="tx1"/>
                 </a:solidFill>
               </a:rPr>
               <a:t>Pipe</a:t>
             </a:r>
-            <a:endParaRPr lang="en-GB" sz="3200" b="1" dirty="0">
+            <a:endParaRPr lang="en-GB" sz="3200" b="1">
               <a:solidFill>
                 <a:schemeClr val="tx1"/>
               </a:solidFill>
@@ -5756,14 +5798,14 @@
           <a:p>
             <a:pPr algn="ctr"/>
             <a:r>
-              <a:rPr lang="en-US" b="1" dirty="0">
+              <a:rPr lang="en-US" b="1">
                 <a:solidFill>
                   <a:schemeClr val="tx1"/>
                 </a:solidFill>
               </a:rPr>
               <a:t>Transfer</a:t>
             </a:r>
-            <a:endParaRPr lang="en-GB" sz="2800" b="1" dirty="0">
+            <a:endParaRPr lang="en-GB" sz="2800" b="1">
               <a:solidFill>
                 <a:schemeClr val="tx1"/>
               </a:solidFill>
@@ -5815,14 +5857,14 @@
           <a:p>
             <a:pPr algn="ctr"/>
             <a:r>
-              <a:rPr lang="en-US" b="1" dirty="0">
+              <a:rPr lang="en-US" b="1">
                 <a:solidFill>
                   <a:schemeClr val="tx1"/>
                 </a:solidFill>
               </a:rPr>
               <a:t>Transaction</a:t>
             </a:r>
-            <a:endParaRPr lang="en-GB" sz="2800" b="1" dirty="0">
+            <a:endParaRPr lang="en-GB" sz="2800" b="1">
               <a:solidFill>
                 <a:schemeClr val="tx1"/>
               </a:solidFill>
@@ -5872,14 +5914,14 @@
           <a:p>
             <a:pPr algn="ctr"/>
             <a:r>
-              <a:rPr lang="en-US" sz="1600" b="1" dirty="0"/>
+              <a:rPr lang="en-US" sz="1600" b="1"/>
               <a:t>Token</a:t>
             </a:r>
           </a:p>
           <a:p>
             <a:pPr algn="ctr"/>
             <a:r>
-              <a:rPr lang="en-US" sz="1600" b="1" dirty="0"/>
+              <a:rPr lang="en-US" sz="1600" b="1"/>
               <a:t>Packet</a:t>
             </a:r>
           </a:p>
@@ -5927,14 +5969,14 @@
           <a:p>
             <a:pPr algn="ctr"/>
             <a:r>
-              <a:rPr lang="en-US" sz="1600" b="1" dirty="0"/>
+              <a:rPr lang="en-US" sz="1600" b="1"/>
               <a:t>Data</a:t>
             </a:r>
           </a:p>
           <a:p>
             <a:pPr algn="ctr"/>
             <a:r>
-              <a:rPr lang="en-US" sz="1600" b="1" dirty="0"/>
+              <a:rPr lang="en-US" sz="1600" b="1"/>
               <a:t>Packet</a:t>
             </a:r>
           </a:p>
@@ -5982,14 +6024,14 @@
           <a:p>
             <a:pPr algn="ctr"/>
             <a:r>
-              <a:rPr lang="en-US" sz="1600" b="1" dirty="0"/>
+              <a:rPr lang="en-US" sz="1600" b="1"/>
               <a:t>Status</a:t>
             </a:r>
           </a:p>
           <a:p>
             <a:pPr algn="ctr"/>
             <a:r>
-              <a:rPr lang="en-US" sz="1600" b="1" dirty="0"/>
+              <a:rPr lang="en-US" sz="1600" b="1"/>
               <a:t>Packet</a:t>
             </a:r>
           </a:p>
@@ -6038,7 +6080,7 @@
           <a:lstStyle/>
           <a:p>
             <a:pPr algn="ctr"/>
-            <a:endParaRPr lang="en-GB" sz="2800" b="1" dirty="0">
+            <a:endParaRPr lang="en-GB" sz="2800" b="1">
               <a:solidFill>
                 <a:schemeClr val="tx1"/>
               </a:solidFill>
@@ -6089,7 +6131,7 @@
           <a:lstStyle/>
           <a:p>
             <a:pPr algn="ctr"/>
-            <a:endParaRPr lang="en-GB" sz="2800" b="1" dirty="0">
+            <a:endParaRPr lang="en-GB" sz="2800" b="1">
               <a:solidFill>
                 <a:schemeClr val="tx1"/>
               </a:solidFill>
@@ -6140,7 +6182,7 @@
           <a:lstStyle/>
           <a:p>
             <a:pPr algn="ctr"/>
-            <a:endParaRPr lang="en-GB" sz="2800" b="1" dirty="0">
+            <a:endParaRPr lang="en-GB" sz="2800" b="1">
               <a:solidFill>
                 <a:schemeClr val="tx1"/>
               </a:solidFill>
@@ -6191,7 +6233,7 @@
           <a:lstStyle/>
           <a:p>
             <a:pPr algn="ctr"/>
-            <a:endParaRPr lang="en-GB" sz="2800" b="1" dirty="0">
+            <a:endParaRPr lang="en-GB" sz="2800" b="1">
               <a:solidFill>
                 <a:schemeClr val="tx1"/>
               </a:solidFill>
@@ -6242,7 +6284,7 @@
           <a:lstStyle/>
           <a:p>
             <a:pPr algn="ctr"/>
-            <a:endParaRPr lang="en-GB" sz="2800" b="1" dirty="0">
+            <a:endParaRPr lang="en-GB" sz="2800" b="1">
               <a:solidFill>
                 <a:schemeClr val="tx1"/>
               </a:solidFill>
@@ -6293,7 +6335,7 @@
           <a:lstStyle/>
           <a:p>
             <a:pPr algn="ctr"/>
-            <a:endParaRPr lang="en-GB" sz="2800" b="1" dirty="0">
+            <a:endParaRPr lang="en-GB" sz="2800" b="1">
               <a:solidFill>
                 <a:schemeClr val="tx1"/>
               </a:solidFill>
@@ -6344,7 +6386,7 @@
           <a:lstStyle/>
           <a:p>
             <a:pPr algn="ctr"/>
-            <a:endParaRPr lang="en-GB" sz="2800" b="1" dirty="0">
+            <a:endParaRPr lang="en-GB" sz="2800" b="1">
               <a:solidFill>
                 <a:schemeClr val="tx1"/>
               </a:solidFill>
@@ -6395,7 +6437,7 @@
           <a:lstStyle/>
           <a:p>
             <a:pPr algn="ctr"/>
-            <a:endParaRPr lang="en-GB" sz="2800" b="1" dirty="0">
+            <a:endParaRPr lang="en-GB" sz="2800" b="1">
               <a:solidFill>
                 <a:schemeClr val="tx1"/>
               </a:solidFill>
@@ -6475,7 +6517,7 @@
           <a:p>
             <a:pPr algn="ctr"/>
             <a:r>
-              <a:rPr lang="en-US" sz="1600" b="1" dirty="0"/>
+              <a:rPr lang="en-US" sz="1600" b="1"/>
               <a:t>Packet Structure</a:t>
             </a:r>
           </a:p>
@@ -6523,7 +6565,7 @@
           <a:p>
             <a:pPr algn="ctr"/>
             <a:r>
-              <a:rPr lang="en-US" sz="1600" b="1" dirty="0"/>
+              <a:rPr lang="en-US" sz="1600" b="1"/>
               <a:t>Sync</a:t>
             </a:r>
           </a:p>
@@ -6571,7 +6613,7 @@
           <a:p>
             <a:pPr algn="ctr"/>
             <a:r>
-              <a:rPr lang="en-US" sz="1600" b="1" dirty="0"/>
+              <a:rPr lang="en-US" sz="1600" b="1"/>
               <a:t>Data Bytes</a:t>
             </a:r>
           </a:p>
@@ -6619,7 +6661,7 @@
           <a:p>
             <a:pPr algn="ctr"/>
             <a:r>
-              <a:rPr lang="en-US" sz="1600" b="1" dirty="0"/>
+              <a:rPr lang="en-US" sz="1600" b="1"/>
               <a:t>EOP</a:t>
             </a:r>
           </a:p>
@@ -6807,7 +6849,6 @@
           <a:ln>
             <a:noFill/>
           </a:ln>
-          <a:extLst/>
         </p:spPr>
         <p:txBody>
           <a:bodyPr rot="0" vert="horz" wrap="square" lIns="91440" tIns="45720" rIns="91440" bIns="45720" anchor="t" anchorCtr="0" upright="1">
@@ -6824,7 +6865,7 @@
               </a:spcAft>
             </a:pPr>
             <a:r>
-              <a:rPr lang="en-GB" sz="1100" b="1" i="1" dirty="0">
+              <a:rPr lang="en-GB" sz="1100" b="1" i="1">
                 <a:effectLst/>
                 <a:latin typeface="Arial"/>
                 <a:ea typeface="Calibri"/>
@@ -6832,7 +6873,7 @@
               </a:rPr>
               <a:t>USB</a:t>
             </a:r>
-            <a:endParaRPr lang="en-GB" sz="1100" dirty="0">
+            <a:endParaRPr lang="en-GB" sz="1100">
               <a:effectLst/>
               <a:latin typeface="Calibri"/>
               <a:ea typeface="Calibri"/>
@@ -6983,7 +7024,6 @@
           <a:ln>
             <a:noFill/>
           </a:ln>
-          <a:extLst/>
         </p:spPr>
         <p:txBody>
           <a:bodyPr rot="0" vert="horz" wrap="square" lIns="91440" tIns="45720" rIns="91440" bIns="45720" anchor="t" anchorCtr="0" upright="1">
@@ -7000,7 +7040,7 @@
               </a:spcAft>
             </a:pPr>
             <a:r>
-              <a:rPr lang="en-GB" sz="1100" b="1" i="1" dirty="0">
+              <a:rPr lang="en-GB" sz="1100" b="1" i="1">
                 <a:effectLst/>
                 <a:latin typeface="Arial"/>
                 <a:ea typeface="Calibri"/>
@@ -7008,7 +7048,7 @@
               </a:rPr>
               <a:t>USB</a:t>
             </a:r>
-            <a:endParaRPr lang="en-GB" sz="1100" dirty="0">
+            <a:endParaRPr lang="en-GB" sz="1100">
               <a:effectLst/>
               <a:latin typeface="Calibri"/>
               <a:ea typeface="Calibri"/>
@@ -7088,7 +7128,6 @@
           <a:ln>
             <a:noFill/>
           </a:ln>
-          <a:extLst/>
         </p:spPr>
         <p:txBody>
           <a:bodyPr rot="0" vert="horz" wrap="square" lIns="91440" tIns="45720" rIns="91440" bIns="45720" anchor="t" anchorCtr="0" upright="1">
@@ -7105,7 +7144,7 @@
               </a:spcAft>
             </a:pPr>
             <a:r>
-              <a:rPr lang="en-GB" sz="1100" b="1" i="1" dirty="0">
+              <a:rPr lang="en-GB" sz="1100" b="1" i="1">
                 <a:effectLst/>
                 <a:latin typeface="Arial"/>
                 <a:ea typeface="Calibri"/>
@@ -7113,7 +7152,7 @@
               </a:rPr>
               <a:t>To Network</a:t>
             </a:r>
-            <a:endParaRPr lang="en-GB" sz="1100" dirty="0">
+            <a:endParaRPr lang="en-GB" sz="1100">
               <a:effectLst/>
               <a:latin typeface="Calibri"/>
               <a:ea typeface="Calibri"/>
@@ -7399,7 +7438,6 @@
           <a:ln>
             <a:noFill/>
           </a:ln>
-          <a:extLst/>
         </p:spPr>
         <p:txBody>
           <a:bodyPr rot="0" vert="horz" wrap="square" lIns="91440" tIns="45720" rIns="91440" bIns="45720" anchor="t" anchorCtr="0" upright="1">
@@ -7416,7 +7454,7 @@
               </a:spcAft>
             </a:pPr>
             <a:r>
-              <a:rPr lang="en-GB" sz="1100" b="1" i="1" dirty="0">
+              <a:rPr lang="en-GB" sz="1100" b="1" i="1">
                 <a:effectLst/>
                 <a:latin typeface="Arial"/>
                 <a:ea typeface="Calibri"/>
@@ -7424,7 +7462,7 @@
               </a:rPr>
               <a:t>USB</a:t>
             </a:r>
-            <a:endParaRPr lang="en-GB" sz="1100" dirty="0">
+            <a:endParaRPr lang="en-GB" sz="1100">
               <a:effectLst/>
               <a:latin typeface="Calibri"/>
               <a:ea typeface="Calibri"/>
@@ -7575,7 +7613,6 @@
           <a:ln>
             <a:noFill/>
           </a:ln>
-          <a:extLst/>
         </p:spPr>
         <p:txBody>
           <a:bodyPr rot="0" vert="horz" wrap="square" lIns="91440" tIns="45720" rIns="91440" bIns="45720" anchor="t" anchorCtr="0" upright="1">
@@ -7592,7 +7629,7 @@
               </a:spcAft>
             </a:pPr>
             <a:r>
-              <a:rPr lang="en-GB" sz="1100" b="1" i="1" dirty="0">
+              <a:rPr lang="en-GB" sz="1100" b="1" i="1">
                 <a:effectLst/>
                 <a:latin typeface="Arial"/>
                 <a:ea typeface="Calibri"/>
@@ -7600,7 +7637,7 @@
               </a:rPr>
               <a:t>USB</a:t>
             </a:r>
-            <a:endParaRPr lang="en-GB" sz="1100" dirty="0">
+            <a:endParaRPr lang="en-GB" sz="1100">
               <a:effectLst/>
               <a:latin typeface="Calibri"/>
               <a:ea typeface="Calibri"/>
@@ -7680,7 +7717,6 @@
           <a:ln>
             <a:noFill/>
           </a:ln>
-          <a:extLst/>
         </p:spPr>
         <p:txBody>
           <a:bodyPr rot="0" vert="horz" wrap="square" lIns="91440" tIns="45720" rIns="91440" bIns="45720" anchor="t" anchorCtr="0" upright="1">
@@ -7697,7 +7733,7 @@
               </a:spcAft>
             </a:pPr>
             <a:r>
-              <a:rPr lang="en-GB" sz="1100" b="1" i="1" dirty="0">
+              <a:rPr lang="en-GB" sz="1100" b="1" i="1">
                 <a:effectLst/>
                 <a:latin typeface="Arial"/>
                 <a:ea typeface="Calibri"/>
@@ -7705,7 +7741,7 @@
               </a:rPr>
               <a:t>To Network</a:t>
             </a:r>
-            <a:endParaRPr lang="en-GB" sz="1100" dirty="0">
+            <a:endParaRPr lang="en-GB" sz="1100">
               <a:effectLst/>
               <a:latin typeface="Calibri"/>
               <a:ea typeface="Calibri"/>
@@ -7821,7 +7857,7 @@
               </a:spcAft>
             </a:pPr>
             <a:r>
-              <a:rPr lang="de-DE" sz="1100" b="1" dirty="0">
+              <a:rPr lang="de-DE" sz="1100" b="1">
                 <a:solidFill>
                   <a:srgbClr val="000000"/>
                 </a:solidFill>
@@ -7830,7 +7866,7 @@
               </a:rPr>
               <a:t>RTE Components</a:t>
             </a:r>
-            <a:endParaRPr lang="en-GB" sz="1100" b="1" dirty="0">
+            <a:endParaRPr lang="en-GB" sz="1100" b="1">
               <a:solidFill>
                 <a:srgbClr val="000000"/>
               </a:solidFill>
@@ -7905,7 +7941,7 @@
               </a:spcAft>
             </a:pPr>
             <a:r>
-              <a:rPr lang="de-DE" sz="1400" b="1" dirty="0">
+              <a:rPr lang="de-DE" sz="1400" b="1">
                 <a:solidFill>
                   <a:srgbClr val="FFFFFF"/>
                 </a:solidFill>
@@ -7967,7 +8003,7 @@
               </a:spcAft>
             </a:pPr>
             <a:r>
-              <a:rPr lang="de-DE" sz="1600" b="1" dirty="0">
+              <a:rPr lang="de-DE" sz="1600" b="1">
                 <a:solidFill>
                   <a:schemeClr val="bg1"/>
                 </a:solidFill>
@@ -8041,7 +8077,7 @@
               </a:spcAft>
             </a:pPr>
             <a:r>
-              <a:rPr lang="de-DE" sz="1600" b="1" dirty="0">
+              <a:rPr lang="de-DE" sz="1600" b="1">
                 <a:solidFill>
                   <a:schemeClr val="bg1"/>
                 </a:solidFill>
@@ -8049,7 +8085,7 @@
               </a:rPr>
               <a:t>USB Controller 0</a:t>
             </a:r>
-            <a:endParaRPr lang="en-GB" sz="1600" b="1" dirty="0">
+            <a:endParaRPr lang="en-GB" sz="1600" b="1">
               <a:solidFill>
                 <a:schemeClr val="bg1"/>
               </a:solidFill>
@@ -8123,7 +8159,7 @@
               </a:spcAft>
             </a:pPr>
             <a:r>
-              <a:rPr lang="de-DE" sz="1400" b="1" dirty="0">
+              <a:rPr lang="de-DE" sz="1400" b="1">
                 <a:solidFill>
                   <a:srgbClr val="FFFFFF"/>
                 </a:solidFill>
@@ -8189,7 +8225,7 @@
               <a:tabLst/>
             </a:pPr>
             <a:r>
-              <a:rPr kumimoji="0" lang="de-DE" sz="1100" b="1" i="0" u="none" strike="noStrike" cap="none" normalizeH="0" baseline="0" dirty="0">
+              <a:rPr kumimoji="0" lang="de-DE" sz="1100" b="1" i="0" u="none" strike="noStrike" cap="none" normalizeH="0" baseline="0">
                 <a:ln>
                   <a:noFill/>
                 </a:ln>
@@ -8229,12 +8265,12 @@
           <a:lstStyle/>
           <a:p>
             <a:r>
-              <a:rPr lang="de-DE" sz="1400" b="1" dirty="0">
+              <a:rPr lang="de-DE" sz="1400" b="1">
                 <a:latin typeface="+mj-lt"/>
               </a:rPr>
               <a:t>USB Device Class</a:t>
             </a:r>
-            <a:endParaRPr lang="en-GB" sz="1400" b="1" dirty="0">
+            <a:endParaRPr lang="en-GB" sz="1400" b="1">
               <a:latin typeface="+mj-lt"/>
             </a:endParaRPr>
           </a:p>
@@ -8263,12 +8299,12 @@
           <a:lstStyle/>
           <a:p>
             <a:r>
-              <a:rPr lang="de-DE" sz="1400" b="1" dirty="0">
+              <a:rPr lang="de-DE" sz="1400" b="1">
                 <a:latin typeface="+mj-lt"/>
               </a:rPr>
               <a:t>USB Device Driver</a:t>
             </a:r>
-            <a:endParaRPr lang="en-GB" sz="1400" b="1" dirty="0">
+            <a:endParaRPr lang="en-GB" sz="1400" b="1">
               <a:latin typeface="+mj-lt"/>
             </a:endParaRPr>
           </a:p>
@@ -8297,12 +8333,12 @@
           <a:lstStyle/>
           <a:p>
             <a:r>
-              <a:rPr lang="de-DE" sz="1400" b="1" dirty="0">
+              <a:rPr lang="de-DE" sz="1400" b="1">
                 <a:latin typeface="+mj-lt"/>
               </a:rPr>
               <a:t>MCU Hardware</a:t>
             </a:r>
-            <a:endParaRPr lang="en-GB" sz="1400" b="1" dirty="0">
+            <a:endParaRPr lang="en-GB" sz="1400" b="1">
               <a:latin typeface="+mj-lt"/>
             </a:endParaRPr>
           </a:p>
@@ -8480,7 +8516,7 @@
               </a:spcAft>
             </a:pPr>
             <a:r>
-              <a:rPr kumimoji="0" lang="de-DE" sz="1100" b="1" i="0" u="none" strike="noStrike" cap="none" normalizeH="0" baseline="0" dirty="0">
+              <a:rPr kumimoji="0" lang="de-DE" sz="1100" b="1" i="0" u="none" strike="noStrike" cap="none" normalizeH="0" baseline="0">
                 <a:ln>
                   <a:noFill/>
                 </a:ln>
@@ -8492,7 +8528,7 @@
                 <a:ea typeface="ＭＳ Ｐゴシック" pitchFamily="34" charset="-128"/>
                 <a:cs typeface="Courier New" pitchFamily="49" charset="0"/>
               </a:rPr>
-              <a:t>RTE_Device.h</a:t>
+              <a:t>Driver Configuration File</a:t>
             </a:r>
           </a:p>
         </p:txBody>
@@ -8551,7 +8587,7 @@
               <a:tabLst/>
             </a:pPr>
             <a:r>
-              <a:rPr kumimoji="0" lang="de-DE" sz="1100" b="1" i="0" u="none" strike="noStrike" cap="none" normalizeH="0" baseline="0" dirty="0">
+              <a:rPr kumimoji="0" lang="de-DE" sz="1100" b="1" i="0" u="none" strike="noStrike" cap="none" normalizeH="0" baseline="0">
                 <a:ln>
                   <a:noFill/>
                 </a:ln>
@@ -8625,7 +8661,7 @@
               <a:tabLst/>
             </a:pPr>
             <a:r>
-              <a:rPr kumimoji="0" lang="de-DE" sz="1100" b="1" i="0" u="none" strike="noStrike" cap="none" normalizeH="0" baseline="0" dirty="0">
+              <a:rPr kumimoji="0" lang="de-DE" sz="1100" b="1" i="0" u="none" strike="noStrike" cap="none" normalizeH="0" baseline="0">
                 <a:ln>
                   <a:noFill/>
                 </a:ln>
@@ -8765,7 +8801,7 @@
                 <a:spcPct val="0"/>
               </a:spcAft>
             </a:pPr>
-            <a:endParaRPr lang="en-GB" sz="1600" b="1" dirty="0">
+            <a:endParaRPr lang="en-GB" sz="1600" b="1">
               <a:solidFill>
                 <a:srgbClr val="000000"/>
               </a:solidFill>
@@ -8872,7 +8908,7 @@
               </a:spcAft>
             </a:pPr>
             <a:r>
-              <a:rPr lang="de-DE" sz="1400" b="1" dirty="0">
+              <a:rPr lang="de-DE" sz="1400" b="1">
                 <a:solidFill>
                   <a:srgbClr val="FFFFFF"/>
                 </a:solidFill>
@@ -8949,7 +8985,7 @@
               </a:spcAft>
             </a:pPr>
             <a:r>
-              <a:rPr lang="de-DE" sz="1600" b="1" dirty="0">
+              <a:rPr lang="de-DE" sz="1600" b="1">
                 <a:solidFill>
                   <a:srgbClr val="FFFFFF"/>
                 </a:solidFill>
@@ -8984,12 +9020,12 @@
           <a:lstStyle/>
           <a:p>
             <a:r>
-              <a:rPr lang="de-DE" sz="1400" b="1" dirty="0">
+              <a:rPr lang="de-DE" sz="1400" b="1">
                 <a:latin typeface="+mj-lt"/>
               </a:rPr>
               <a:t>USB Device</a:t>
             </a:r>
-            <a:endParaRPr lang="en-GB" sz="1400" b="1" dirty="0">
+            <a:endParaRPr lang="en-GB" sz="1400" b="1">
               <a:latin typeface="+mj-lt"/>
             </a:endParaRPr>
           </a:p>
@@ -9045,7 +9081,7 @@
               </a:spcAft>
             </a:pPr>
             <a:r>
-              <a:rPr lang="de-DE" sz="1600" b="1" dirty="0">
+              <a:rPr lang="de-DE" sz="1600" b="1">
                 <a:solidFill>
                   <a:schemeClr val="bg1"/>
                 </a:solidFill>
@@ -9153,7 +9189,7 @@
               </a:spcAft>
             </a:pPr>
             <a:r>
-              <a:rPr lang="de-DE" sz="1400" b="1" dirty="0">
+              <a:rPr lang="de-DE" sz="1400" b="1">
                 <a:solidFill>
                   <a:srgbClr val="FFFFFF"/>
                 </a:solidFill>
@@ -9230,7 +9266,7 @@
               </a:spcAft>
             </a:pPr>
             <a:r>
-              <a:rPr lang="de-DE" sz="1600" b="1" dirty="0">
+              <a:rPr lang="de-DE" sz="1600" b="1">
                 <a:solidFill>
                   <a:srgbClr val="FFFFFF"/>
                 </a:solidFill>
@@ -9287,7 +9323,7 @@
                 <a:spcPct val="0"/>
               </a:spcAft>
             </a:pPr>
-            <a:endParaRPr lang="en-GB" sz="1100" b="1" dirty="0">
+            <a:endParaRPr lang="en-GB" sz="1100" b="1">
               <a:solidFill>
                 <a:srgbClr val="000000"/>
               </a:solidFill>
@@ -9322,7 +9358,7 @@
           <a:p>
             <a:pPr algn="ctr"/>
             <a:r>
-              <a:rPr lang="de-DE" sz="900" b="1" dirty="0">
+              <a:rPr lang="de-DE" sz="900" b="1">
                 <a:solidFill>
                   <a:srgbClr val="000000"/>
                 </a:solidFill>
@@ -9336,7 +9372,7 @@
           <a:p>
             <a:pPr algn="ctr"/>
             <a:r>
-              <a:rPr lang="de-DE" sz="900" b="1" dirty="0">
+              <a:rPr lang="de-DE" sz="900" b="1">
                 <a:solidFill>
                   <a:srgbClr val="000000"/>
                 </a:solidFill>
@@ -9346,7 +9382,7 @@
               </a:rPr>
               <a:t>File</a:t>
             </a:r>
-            <a:endParaRPr lang="en-GB" sz="900" dirty="0">
+            <a:endParaRPr lang="en-GB" sz="900">
               <a:latin typeface="+mj-lt"/>
             </a:endParaRPr>
           </a:p>
@@ -9408,7 +9444,7 @@
               <a:buNone/>
               <a:tabLst/>
             </a:pPr>
-            <a:endParaRPr kumimoji="0" lang="en-GB" sz="1100" b="1" i="0" u="none" strike="noStrike" cap="none" normalizeH="0" baseline="0" dirty="0">
+            <a:endParaRPr kumimoji="0" lang="en-GB" sz="1100" b="1" i="0" u="none" strike="noStrike" cap="none" normalizeH="0" baseline="0">
               <a:ln>
                 <a:noFill/>
               </a:ln>
@@ -9447,7 +9483,7 @@
           <a:p>
             <a:pPr algn="ctr"/>
             <a:r>
-              <a:rPr lang="de-DE" sz="900" b="1" dirty="0">
+              <a:rPr lang="de-DE" sz="900" b="1">
                 <a:solidFill>
                   <a:srgbClr val="000000"/>
                 </a:solidFill>
@@ -9461,7 +9497,7 @@
           <a:p>
             <a:pPr algn="ctr"/>
             <a:r>
-              <a:rPr lang="de-DE" sz="900" b="1" dirty="0">
+              <a:rPr lang="de-DE" sz="900" b="1">
                 <a:solidFill>
                   <a:srgbClr val="000000"/>
                 </a:solidFill>
@@ -9471,7 +9507,7 @@
               </a:rPr>
               <a:t>Template</a:t>
             </a:r>
-            <a:endParaRPr lang="en-GB" sz="900" dirty="0">
+            <a:endParaRPr lang="en-GB" sz="900">
               <a:latin typeface="+mj-lt"/>
             </a:endParaRPr>
           </a:p>
@@ -9534,7 +9570,7 @@
               <a:tabLst/>
             </a:pPr>
             <a:r>
-              <a:rPr kumimoji="0" lang="de-DE" sz="1000" b="1" i="0" u="none" strike="noStrike" cap="none" normalizeH="0" baseline="0" dirty="0">
+              <a:rPr kumimoji="0" lang="de-DE" sz="1000" b="1" i="0" u="none" strike="noStrike" cap="none" normalizeH="0" baseline="0">
                 <a:ln>
                   <a:noFill/>
                 </a:ln>
@@ -9645,7 +9681,7 @@
               </a:spcAft>
             </a:pPr>
             <a:r>
-              <a:rPr lang="de-DE" sz="1600" b="1" dirty="0">
+              <a:rPr lang="de-DE" sz="1600" b="1">
                 <a:solidFill>
                   <a:schemeClr val="bg1"/>
                 </a:solidFill>
@@ -9653,7 +9689,7 @@
               </a:rPr>
               <a:t>USB Controller 1</a:t>
             </a:r>
-            <a:endParaRPr lang="en-GB" sz="1600" b="1" dirty="0">
+            <a:endParaRPr lang="en-GB" sz="1600" b="1">
               <a:solidFill>
                 <a:schemeClr val="bg1"/>
               </a:solidFill>
@@ -9720,7 +9756,7 @@
               </a:lnSpc>
             </a:pPr>
             <a:r>
-              <a:rPr lang="de-DE" sz="1100" b="1" dirty="0">
+              <a:rPr lang="de-DE" sz="1100" b="1">
                 <a:latin typeface="+mj-lt"/>
               </a:rPr>
               <a:t>VBUS</a:t>
@@ -9733,7 +9769,7 @@
               </a:lnSpc>
             </a:pPr>
             <a:r>
-              <a:rPr lang="de-DE" sz="1100" b="1" dirty="0">
+              <a:rPr lang="de-DE" sz="1100" b="1">
                 <a:latin typeface="+mj-lt"/>
               </a:rPr>
               <a:t>DP</a:t>
@@ -9746,7 +9782,7 @@
               </a:lnSpc>
             </a:pPr>
             <a:r>
-              <a:rPr lang="de-DE" sz="1100" b="1" dirty="0">
+              <a:rPr lang="de-DE" sz="1100" b="1">
                 <a:latin typeface="+mj-lt"/>
               </a:rPr>
               <a:t>DM</a:t>
@@ -9759,12 +9795,12 @@
               </a:lnSpc>
             </a:pPr>
             <a:r>
-              <a:rPr lang="de-DE" sz="1100" b="1" dirty="0">
+              <a:rPr lang="de-DE" sz="1100" b="1">
                 <a:latin typeface="+mj-lt"/>
               </a:rPr>
               <a:t>ID</a:t>
             </a:r>
-            <a:endParaRPr lang="en-GB" sz="1100" b="1" dirty="0">
+            <a:endParaRPr lang="en-GB" sz="1100" b="1">
               <a:latin typeface="+mj-lt"/>
             </a:endParaRPr>
           </a:p>
@@ -9832,7 +9868,7 @@
               </a:spcAft>
             </a:pPr>
             <a:r>
-              <a:rPr lang="de-DE" sz="1600" b="1" dirty="0">
+              <a:rPr lang="de-DE" sz="1600" b="1">
                 <a:solidFill>
                   <a:schemeClr val="bg1"/>
                 </a:solidFill>
@@ -9840,7 +9876,7 @@
               </a:rPr>
               <a:t>USB Controller</a:t>
             </a:r>
-            <a:endParaRPr lang="en-GB" sz="1600" b="1" dirty="0">
+            <a:endParaRPr lang="en-GB" sz="1600" b="1">
               <a:solidFill>
                 <a:schemeClr val="bg1"/>
               </a:solidFill>
@@ -9914,7 +9950,7 @@
               </a:spcAft>
             </a:pPr>
             <a:r>
-              <a:rPr lang="de-DE" sz="1600" b="1" dirty="0">
+              <a:rPr lang="de-DE" sz="1600" b="1">
                 <a:solidFill>
                   <a:srgbClr val="FFFFFF"/>
                 </a:solidFill>
@@ -9991,7 +10027,7 @@
               </a:spcAft>
             </a:pPr>
             <a:r>
-              <a:rPr lang="de-DE" sz="1400" b="1" dirty="0">
+              <a:rPr lang="de-DE" sz="1400" b="1">
                 <a:solidFill>
                   <a:srgbClr val="FFFFFF"/>
                 </a:solidFill>
@@ -10149,7 +10185,7 @@
               </a:lnSpc>
             </a:pPr>
             <a:r>
-              <a:rPr lang="de-DE" sz="1100" b="1" dirty="0">
+              <a:rPr lang="de-DE" sz="1100" b="1">
                 <a:latin typeface="+mj-lt"/>
               </a:rPr>
               <a:t>VBUS</a:t>
@@ -10162,7 +10198,7 @@
               </a:lnSpc>
             </a:pPr>
             <a:r>
-              <a:rPr lang="de-DE" sz="1100" b="1" dirty="0">
+              <a:rPr lang="de-DE" sz="1100" b="1">
                 <a:latin typeface="+mj-lt"/>
               </a:rPr>
               <a:t>DP</a:t>
@@ -10175,7 +10211,7 @@
               </a:lnSpc>
             </a:pPr>
             <a:r>
-              <a:rPr lang="de-DE" sz="1100" b="1" dirty="0">
+              <a:rPr lang="de-DE" sz="1100" b="1">
                 <a:latin typeface="+mj-lt"/>
               </a:rPr>
               <a:t>DM</a:t>
@@ -10188,12 +10224,12 @@
               </a:lnSpc>
             </a:pPr>
             <a:r>
-              <a:rPr lang="de-DE" sz="1100" b="1" dirty="0">
+              <a:rPr lang="de-DE" sz="1100" b="1">
                 <a:latin typeface="+mj-lt"/>
               </a:rPr>
               <a:t>ID</a:t>
             </a:r>
-            <a:endParaRPr lang="en-GB" sz="1100" b="1" dirty="0">
+            <a:endParaRPr lang="en-GB" sz="1100" b="1">
               <a:latin typeface="+mj-lt"/>
             </a:endParaRPr>
           </a:p>
@@ -10264,7 +10300,7 @@
               </a:spcAft>
             </a:pPr>
             <a:r>
-              <a:rPr lang="de-DE" sz="1600" b="1" dirty="0">
+              <a:rPr lang="de-DE" sz="1600" b="1">
                 <a:solidFill>
                   <a:srgbClr val="FFFFFF"/>
                 </a:solidFill>
@@ -10341,7 +10377,7 @@
               </a:spcAft>
             </a:pPr>
             <a:r>
-              <a:rPr lang="de-DE" sz="1400" b="1" dirty="0">
+              <a:rPr lang="de-DE" sz="1400" b="1">
                 <a:solidFill>
                   <a:srgbClr val="FFFFFF"/>
                 </a:solidFill>
@@ -10533,7 +10569,7 @@
               </a:spcAft>
             </a:pPr>
             <a:r>
-              <a:rPr lang="de-DE" sz="1600" b="1" dirty="0">
+              <a:rPr lang="de-DE" sz="1600" b="1">
                 <a:solidFill>
                   <a:schemeClr val="bg1"/>
                 </a:solidFill>
@@ -10541,7 +10577,7 @@
               </a:rPr>
               <a:t>USB Controller</a:t>
             </a:r>
-            <a:endParaRPr lang="en-GB" sz="1600" b="1" dirty="0">
+            <a:endParaRPr lang="en-GB" sz="1600" b="1">
               <a:solidFill>
                 <a:schemeClr val="bg1"/>
               </a:solidFill>
@@ -10578,12 +10614,12 @@
               </a:lnSpc>
             </a:pPr>
             <a:r>
-              <a:rPr lang="de-DE" sz="1100" b="1" dirty="0">
+              <a:rPr lang="de-DE" sz="1100" b="1">
                 <a:latin typeface="+mj-lt"/>
               </a:rPr>
               <a:t>ULPI-I/F</a:t>
             </a:r>
-            <a:endParaRPr lang="en-GB" sz="1100" b="1" dirty="0">
+            <a:endParaRPr lang="en-GB" sz="1100" b="1">
               <a:latin typeface="+mj-lt"/>
             </a:endParaRPr>
           </a:p>
@@ -10697,7 +10733,7 @@
               </a:spcAft>
             </a:pPr>
             <a:r>
-              <a:rPr lang="de-DE" sz="1100" b="1" dirty="0">
+              <a:rPr lang="de-DE" sz="1100" b="1">
                 <a:solidFill>
                   <a:srgbClr val="000000"/>
                 </a:solidFill>
@@ -10706,7 +10742,7 @@
               </a:rPr>
               <a:t>RTE Components</a:t>
             </a:r>
-            <a:endParaRPr lang="en-GB" sz="1100" b="1" dirty="0">
+            <a:endParaRPr lang="en-GB" sz="1100" b="1">
               <a:solidFill>
                 <a:srgbClr val="000000"/>
               </a:solidFill>
@@ -10766,7 +10802,7 @@
               </a:spcAft>
             </a:pPr>
             <a:r>
-              <a:rPr lang="de-DE" sz="1600" b="1" dirty="0">
+              <a:rPr lang="de-DE" sz="1600" b="1">
                 <a:solidFill>
                   <a:schemeClr val="bg1"/>
                 </a:solidFill>
@@ -10840,7 +10876,7 @@
               </a:spcAft>
             </a:pPr>
             <a:r>
-              <a:rPr lang="de-DE" sz="1600" b="1" dirty="0">
+              <a:rPr lang="de-DE" sz="1600" b="1">
                 <a:solidFill>
                   <a:schemeClr val="bg1"/>
                 </a:solidFill>
@@ -10848,7 +10884,7 @@
               </a:rPr>
               <a:t>USB Controller 0</a:t>
             </a:r>
-            <a:endParaRPr lang="en-GB" sz="1600" b="1" dirty="0">
+            <a:endParaRPr lang="en-GB" sz="1600" b="1">
               <a:solidFill>
                 <a:schemeClr val="bg1"/>
               </a:solidFill>
@@ -10911,7 +10947,7 @@
               <a:tabLst/>
             </a:pPr>
             <a:r>
-              <a:rPr kumimoji="0" lang="de-DE" sz="1100" b="1" i="0" u="none" strike="noStrike" cap="none" normalizeH="0" baseline="0" dirty="0">
+              <a:rPr kumimoji="0" lang="de-DE" sz="1100" b="1" i="0" u="none" strike="noStrike" cap="none" normalizeH="0" baseline="0">
                 <a:ln>
                   <a:noFill/>
                 </a:ln>
@@ -10951,12 +10987,12 @@
           <a:lstStyle/>
           <a:p>
             <a:r>
-              <a:rPr lang="de-DE" sz="1400" b="1" dirty="0">
+              <a:rPr lang="de-DE" sz="1400" b="1">
                 <a:latin typeface="+mj-lt"/>
               </a:rPr>
               <a:t>Supported USB Device Class</a:t>
             </a:r>
-            <a:endParaRPr lang="en-GB" sz="1400" b="1" dirty="0">
+            <a:endParaRPr lang="en-GB" sz="1400" b="1">
               <a:latin typeface="+mj-lt"/>
             </a:endParaRPr>
           </a:p>
@@ -10985,12 +11021,12 @@
           <a:lstStyle/>
           <a:p>
             <a:r>
-              <a:rPr lang="de-DE" sz="1400" b="1" dirty="0">
+              <a:rPr lang="de-DE" sz="1400" b="1">
                 <a:latin typeface="+mj-lt"/>
               </a:rPr>
               <a:t>USB Host Driver</a:t>
             </a:r>
-            <a:endParaRPr lang="en-GB" sz="1400" b="1" dirty="0">
+            <a:endParaRPr lang="en-GB" sz="1400" b="1">
               <a:latin typeface="+mj-lt"/>
             </a:endParaRPr>
           </a:p>
@@ -11019,12 +11055,12 @@
           <a:lstStyle/>
           <a:p>
             <a:r>
-              <a:rPr lang="de-DE" sz="1400" b="1" dirty="0">
+              <a:rPr lang="de-DE" sz="1400" b="1">
                 <a:latin typeface="+mj-lt"/>
               </a:rPr>
               <a:t>MCU Hardware</a:t>
             </a:r>
-            <a:endParaRPr lang="en-GB" sz="1400" b="1" dirty="0">
+            <a:endParaRPr lang="en-GB" sz="1400" b="1">
               <a:latin typeface="+mj-lt"/>
             </a:endParaRPr>
           </a:p>
@@ -11140,7 +11176,7 @@
               </a:spcAft>
             </a:pPr>
             <a:r>
-              <a:rPr kumimoji="0" lang="de-DE" sz="1100" b="1" i="0" u="none" strike="noStrike" cap="none" normalizeH="0" baseline="0" dirty="0">
+              <a:rPr kumimoji="0" lang="de-DE" sz="1100" b="1" i="0" u="none" strike="noStrike" cap="none" normalizeH="0" baseline="0">
                 <a:ln>
                   <a:noFill/>
                 </a:ln>
@@ -11152,7 +11188,7 @@
                 <a:ea typeface="ＭＳ Ｐゴシック" pitchFamily="34" charset="-128"/>
                 <a:cs typeface="Courier New" pitchFamily="49" charset="0"/>
               </a:rPr>
-              <a:t>RTE_Device.h</a:t>
+              <a:t>Driver Configuration File</a:t>
             </a:r>
           </a:p>
         </p:txBody>
@@ -11211,7 +11247,7 @@
               <a:tabLst/>
             </a:pPr>
             <a:r>
-              <a:rPr kumimoji="0" lang="de-DE" sz="1100" b="1" i="0" u="none" strike="noStrike" cap="none" normalizeH="0" baseline="0" dirty="0">
+              <a:rPr kumimoji="0" lang="de-DE" sz="1100" b="1" i="0" u="none" strike="noStrike" cap="none" normalizeH="0" baseline="0">
                 <a:ln>
                   <a:noFill/>
                 </a:ln>
@@ -11322,7 +11358,7 @@
               </a:spcAft>
             </a:pPr>
             <a:r>
-              <a:rPr lang="de-DE" sz="1600" b="1" dirty="0">
+              <a:rPr lang="de-DE" sz="1600" b="1">
                 <a:solidFill>
                   <a:schemeClr val="bg1"/>
                 </a:solidFill>
@@ -11330,7 +11366,7 @@
               </a:rPr>
               <a:t>USB Controller 1</a:t>
             </a:r>
-            <a:endParaRPr lang="en-GB" sz="1600" b="1" dirty="0">
+            <a:endParaRPr lang="en-GB" sz="1600" b="1">
               <a:solidFill>
                 <a:schemeClr val="bg1"/>
               </a:solidFill>
@@ -11404,7 +11440,7 @@
               </a:spcAft>
             </a:pPr>
             <a:r>
-              <a:rPr lang="de-DE" sz="1600" b="1" dirty="0">
+              <a:rPr lang="de-DE" sz="1600" b="1">
                 <a:solidFill>
                   <a:srgbClr val="FFFFFF"/>
                 </a:solidFill>
@@ -11439,12 +11475,12 @@
           <a:lstStyle/>
           <a:p>
             <a:r>
-              <a:rPr lang="de-DE" sz="1400" b="1" dirty="0">
+              <a:rPr lang="de-DE" sz="1400" b="1">
                 <a:latin typeface="+mj-lt"/>
               </a:rPr>
               <a:t>USB Host</a:t>
             </a:r>
-            <a:endParaRPr lang="en-GB" sz="1400" b="1" dirty="0">
+            <a:endParaRPr lang="en-GB" sz="1400" b="1">
               <a:latin typeface="+mj-lt"/>
             </a:endParaRPr>
           </a:p>
@@ -11500,7 +11536,7 @@
               </a:spcAft>
             </a:pPr>
             <a:r>
-              <a:rPr lang="de-DE" sz="1600" b="1" dirty="0">
+              <a:rPr lang="de-DE" sz="1600" b="1">
                 <a:solidFill>
                   <a:schemeClr val="bg1"/>
                 </a:solidFill>
@@ -11577,7 +11613,7 @@
               </a:spcAft>
             </a:pPr>
             <a:r>
-              <a:rPr lang="de-DE" sz="1600" b="1" dirty="0">
+              <a:rPr lang="de-DE" sz="1600" b="1">
                 <a:solidFill>
                   <a:srgbClr val="FFFFFF"/>
                 </a:solidFill>
@@ -11654,7 +11690,7 @@
               </a:spcAft>
             </a:pPr>
             <a:r>
-              <a:rPr lang="de-DE" sz="1400" b="1" dirty="0">
+              <a:rPr lang="de-DE" sz="1400" b="1">
                 <a:solidFill>
                   <a:srgbClr val="FFFFFF"/>
                 </a:solidFill>
@@ -11731,7 +11767,7 @@
               </a:spcAft>
             </a:pPr>
             <a:r>
-              <a:rPr lang="de-DE" sz="1400" b="1" dirty="0">
+              <a:rPr lang="de-DE" sz="1400" b="1">
                 <a:solidFill>
                   <a:srgbClr val="FFFFFF"/>
                 </a:solidFill>
@@ -11808,7 +11844,7 @@
               </a:spcAft>
             </a:pPr>
             <a:r>
-              <a:rPr lang="de-DE" sz="1300" b="1" dirty="0">
+              <a:rPr lang="de-DE" sz="1300" b="1">
                 <a:solidFill>
                   <a:srgbClr val="FFFFFF"/>
                 </a:solidFill>
@@ -11828,7 +11864,7 @@
               </a:spcAft>
             </a:pPr>
             <a:r>
-              <a:rPr lang="de-DE" sz="1300" b="1" dirty="0">
+              <a:rPr lang="de-DE" sz="1300" b="1">
                 <a:solidFill>
                   <a:srgbClr val="FFFFFF"/>
                 </a:solidFill>
@@ -11885,7 +11921,7 @@
                 <a:spcPct val="0"/>
               </a:spcAft>
             </a:pPr>
-            <a:endParaRPr lang="en-GB" sz="1100" b="1" dirty="0">
+            <a:endParaRPr lang="en-GB" sz="1100" b="1">
               <a:solidFill>
                 <a:srgbClr val="000000"/>
               </a:solidFill>
@@ -11920,7 +11956,7 @@
           <a:p>
             <a:pPr algn="ctr"/>
             <a:r>
-              <a:rPr lang="de-DE" sz="900" b="1" dirty="0">
+              <a:rPr lang="de-DE" sz="900" b="1">
                 <a:solidFill>
                   <a:srgbClr val="000000"/>
                 </a:solidFill>
@@ -11934,7 +11970,7 @@
           <a:p>
             <a:pPr algn="ctr"/>
             <a:r>
-              <a:rPr lang="de-DE" sz="900" b="1" dirty="0">
+              <a:rPr lang="de-DE" sz="900" b="1">
                 <a:solidFill>
                   <a:srgbClr val="000000"/>
                 </a:solidFill>
@@ -11944,7 +11980,7 @@
               </a:rPr>
               <a:t>File</a:t>
             </a:r>
-            <a:endParaRPr lang="en-GB" sz="900" dirty="0">
+            <a:endParaRPr lang="en-GB" sz="900">
               <a:latin typeface="+mj-lt"/>
             </a:endParaRPr>
           </a:p>
@@ -12006,7 +12042,7 @@
               <a:buNone/>
               <a:tabLst/>
             </a:pPr>
-            <a:endParaRPr kumimoji="0" lang="en-GB" sz="1100" b="1" i="0" u="none" strike="noStrike" cap="none" normalizeH="0" baseline="0" dirty="0">
+            <a:endParaRPr kumimoji="0" lang="en-GB" sz="1100" b="1" i="0" u="none" strike="noStrike" cap="none" normalizeH="0" baseline="0">
               <a:ln>
                 <a:noFill/>
               </a:ln>
@@ -12045,7 +12081,7 @@
           <a:p>
             <a:pPr algn="ctr"/>
             <a:r>
-              <a:rPr lang="de-DE" sz="900" b="1" dirty="0">
+              <a:rPr lang="de-DE" sz="900" b="1">
                 <a:solidFill>
                   <a:srgbClr val="000000"/>
                 </a:solidFill>
@@ -12059,7 +12095,7 @@
           <a:p>
             <a:pPr algn="ctr"/>
             <a:r>
-              <a:rPr lang="de-DE" sz="900" b="1" dirty="0">
+              <a:rPr lang="de-DE" sz="900" b="1">
                 <a:solidFill>
                   <a:srgbClr val="000000"/>
                 </a:solidFill>
@@ -12069,7 +12105,7 @@
               </a:rPr>
               <a:t>Template</a:t>
             </a:r>
-            <a:endParaRPr lang="en-GB" sz="900" dirty="0">
+            <a:endParaRPr lang="en-GB" sz="900">
               <a:latin typeface="+mj-lt"/>
             </a:endParaRPr>
           </a:p>
@@ -12129,7 +12165,7 @@
               <a:tabLst/>
             </a:pPr>
             <a:r>
-              <a:rPr kumimoji="0" lang="de-DE" sz="1100" b="1" i="0" u="none" strike="noStrike" cap="none" normalizeH="0" baseline="0" dirty="0">
+              <a:rPr kumimoji="0" lang="de-DE" sz="1100" b="1" i="0" u="none" strike="noStrike" cap="none" normalizeH="0" baseline="0">
                 <a:ln>
                   <a:noFill/>
                 </a:ln>
@@ -12227,7 +12263,7 @@
               </a:spcAft>
             </a:pPr>
             <a:r>
-              <a:rPr lang="de-DE" sz="1100" b="1" dirty="0">
+              <a:rPr lang="de-DE" sz="1100" b="1">
                 <a:solidFill>
                   <a:srgbClr val="000000"/>
                 </a:solidFill>
@@ -12237,7 +12273,7 @@
               </a:rPr>
               <a:t>USBH_User_CustomClass.c</a:t>
             </a:r>
-            <a:endParaRPr kumimoji="0" lang="de-DE" sz="1100" b="1" i="0" u="none" strike="noStrike" cap="none" normalizeH="0" baseline="0" dirty="0">
+            <a:endParaRPr kumimoji="0" lang="de-DE" sz="1100" b="1" i="0" u="none" strike="noStrike" cap="none" normalizeH="0" baseline="0">
               <a:ln>
                 <a:noFill/>
               </a:ln>
@@ -12338,7 +12374,7 @@
               <a:tabLst/>
             </a:pPr>
             <a:r>
-              <a:rPr kumimoji="0" lang="de-DE" sz="1100" b="1" i="0" u="none" strike="noStrike" cap="none" normalizeH="0" baseline="0" dirty="0">
+              <a:rPr kumimoji="0" lang="de-DE" sz="1100" b="1" i="0" u="none" strike="noStrike" cap="none" normalizeH="0" baseline="0">
                 <a:ln>
                   <a:noFill/>
                 </a:ln>
@@ -12436,7 +12472,7 @@
               </a:spcAft>
             </a:pPr>
             <a:r>
-              <a:rPr lang="de-DE" sz="1100" b="1" dirty="0">
+              <a:rPr lang="de-DE" sz="1100" b="1">
                 <a:solidFill>
                   <a:srgbClr val="000000"/>
                 </a:solidFill>
@@ -12446,7 +12482,7 @@
               </a:rPr>
               <a:t>USBH_MSC.c</a:t>
             </a:r>
-            <a:endParaRPr kumimoji="0" lang="de-DE" sz="1100" b="1" i="0" u="none" strike="noStrike" cap="none" normalizeH="0" baseline="0" dirty="0">
+            <a:endParaRPr kumimoji="0" lang="de-DE" sz="1100" b="1" i="0" u="none" strike="noStrike" cap="none" normalizeH="0" baseline="0">
               <a:ln>
                 <a:noFill/>
               </a:ln>
@@ -12558,7 +12594,7 @@
               </a:spcAft>
             </a:pPr>
             <a:r>
-              <a:rPr lang="de-DE" sz="1400" b="1" dirty="0">
+              <a:rPr lang="de-DE" sz="1400" b="1">
                 <a:solidFill>
                   <a:srgbClr val="FFFFFF"/>
                 </a:solidFill>
@@ -12624,7 +12660,7 @@
               <a:tabLst/>
             </a:pPr>
             <a:r>
-              <a:rPr kumimoji="0" lang="de-DE" sz="1100" b="1" i="0" u="none" strike="noStrike" cap="none" normalizeH="0" baseline="0" dirty="0">
+              <a:rPr kumimoji="0" lang="de-DE" sz="1100" b="1" i="0" u="none" strike="noStrike" cap="none" normalizeH="0" baseline="0">
                 <a:ln>
                   <a:noFill/>
                 </a:ln>
@@ -12769,7 +12805,7 @@
               <a:tabLst/>
             </a:pPr>
             <a:r>
-              <a:rPr kumimoji="0" lang="de-DE" sz="2400" b="1" i="0" u="none" strike="noStrike" cap="none" normalizeH="0" baseline="0" dirty="0">
+              <a:rPr kumimoji="0" lang="de-DE" sz="2400" b="1" i="0" u="none" strike="noStrike" cap="none" normalizeH="0" baseline="0">
                 <a:ln>
                   <a:noFill/>
                 </a:ln>
@@ -12782,7 +12818,7 @@
               </a:rPr>
               <a:t>USB Host</a:t>
             </a:r>
-            <a:endParaRPr kumimoji="0" lang="en-GB" sz="2400" b="1" i="0" u="none" strike="noStrike" cap="none" normalizeH="0" baseline="0" dirty="0">
+            <a:endParaRPr kumimoji="0" lang="en-GB" sz="2400" b="1" i="0" u="none" strike="noStrike" cap="none" normalizeH="0" baseline="0">
               <a:ln>
                 <a:noFill/>
               </a:ln>
@@ -12851,7 +12887,7 @@
               <a:tabLst/>
             </a:pPr>
             <a:r>
-              <a:rPr kumimoji="0" lang="de-DE" sz="1300" b="1" i="0" u="none" strike="noStrike" cap="none" normalizeH="0" baseline="0" dirty="0">
+              <a:rPr kumimoji="0" lang="de-DE" sz="1300" b="1" i="0" u="none" strike="noStrike" cap="none" normalizeH="0" baseline="0">
                 <a:ln>
                   <a:noFill/>
                 </a:ln>
@@ -12864,7 +12900,7 @@
               </a:rPr>
               <a:t>USB Middleware</a:t>
             </a:r>
-            <a:endParaRPr kumimoji="0" lang="en-GB" sz="1300" b="1" i="0" u="none" strike="noStrike" cap="none" normalizeH="0" baseline="0" dirty="0">
+            <a:endParaRPr kumimoji="0" lang="en-GB" sz="1300" b="1" i="0" u="none" strike="noStrike" cap="none" normalizeH="0" baseline="0">
               <a:ln>
                 <a:noFill/>
               </a:ln>
@@ -12944,7 +12980,7 @@
               <a:tabLst/>
             </a:pPr>
             <a:r>
-              <a:rPr kumimoji="0" lang="de-DE" sz="2400" b="1" i="0" u="none" strike="noStrike" cap="none" normalizeH="0" baseline="0" dirty="0">
+              <a:rPr kumimoji="0" lang="de-DE" sz="2400" b="1" i="0" u="none" strike="noStrike" cap="none" normalizeH="0" baseline="0">
                 <a:ln>
                   <a:noFill/>
                 </a:ln>
@@ -12957,7 +12993,7 @@
               </a:rPr>
               <a:t>USB Device</a:t>
             </a:r>
-            <a:endParaRPr kumimoji="0" lang="en-GB" sz="2400" b="1" i="0" u="none" strike="noStrike" cap="none" normalizeH="0" baseline="0" dirty="0">
+            <a:endParaRPr kumimoji="0" lang="en-GB" sz="2400" b="1" i="0" u="none" strike="noStrike" cap="none" normalizeH="0" baseline="0">
               <a:ln>
                 <a:noFill/>
               </a:ln>
@@ -13026,7 +13062,7 @@
               <a:tabLst/>
             </a:pPr>
             <a:r>
-              <a:rPr kumimoji="0" lang="de-DE" sz="1300" b="1" i="0" u="none" strike="noStrike" cap="none" normalizeH="0" baseline="0" dirty="0">
+              <a:rPr kumimoji="0" lang="de-DE" sz="1300" b="1" i="0" u="none" strike="noStrike" cap="none" normalizeH="0" baseline="0">
                 <a:ln>
                   <a:noFill/>
                 </a:ln>
@@ -13040,7 +13076,7 @@
               <a:t>Hardware</a:t>
             </a:r>
             <a:r>
-              <a:rPr kumimoji="0" lang="de-DE" sz="1300" b="1" i="0" u="none" strike="noStrike" cap="none" normalizeH="0" dirty="0">
+              <a:rPr kumimoji="0" lang="de-DE" sz="1300" b="1" i="0" u="none" strike="noStrike" cap="none" normalizeH="0">
                 <a:ln>
                   <a:noFill/>
                 </a:ln>
@@ -13053,7 +13089,7 @@
               </a:rPr>
               <a:t> Dependent</a:t>
             </a:r>
-            <a:endParaRPr kumimoji="0" lang="en-GB" sz="1300" b="1" i="0" u="none" strike="noStrike" cap="none" normalizeH="0" baseline="0" dirty="0">
+            <a:endParaRPr kumimoji="0" lang="en-GB" sz="1300" b="1" i="0" u="none" strike="noStrike" cap="none" normalizeH="0" baseline="0">
               <a:ln>
                 <a:noFill/>
               </a:ln>
@@ -13112,7 +13148,7 @@
               </a:spcAft>
             </a:pPr>
             <a:r>
-              <a:rPr lang="de-DE" sz="1600" b="1" dirty="0">
+              <a:rPr lang="de-DE" sz="1600" b="1">
                 <a:solidFill>
                   <a:schemeClr val="bg1"/>
                 </a:solidFill>
@@ -13392,7 +13428,7 @@
               </a:lnSpc>
             </a:pPr>
             <a:r>
-              <a:rPr lang="de-DE" sz="1400" dirty="0">
+              <a:rPr lang="de-DE" sz="1400">
                 <a:latin typeface="+mj-lt"/>
               </a:rPr>
               <a:t>Control Transfers</a:t>
@@ -13405,12 +13441,12 @@
               </a:lnSpc>
             </a:pPr>
             <a:r>
-              <a:rPr lang="de-DE" sz="1400" dirty="0">
+              <a:rPr lang="de-DE" sz="1400">
                 <a:latin typeface="+mj-lt"/>
               </a:rPr>
               <a:t>Message Pipes</a:t>
             </a:r>
-            <a:endParaRPr lang="en-GB" sz="1400" dirty="0">
+            <a:endParaRPr lang="en-GB" sz="1400">
               <a:latin typeface="+mj-lt"/>
             </a:endParaRPr>
           </a:p>
@@ -13448,7 +13484,7 @@
               </a:lnSpc>
             </a:pPr>
             <a:r>
-              <a:rPr lang="de-DE" sz="1400" dirty="0">
+              <a:rPr lang="de-DE" sz="1400">
                 <a:latin typeface="+mj-lt"/>
               </a:rPr>
               <a:t>Interrupt Transfers</a:t>
@@ -13461,12 +13497,12 @@
               </a:lnSpc>
             </a:pPr>
             <a:r>
-              <a:rPr lang="de-DE" sz="1400" dirty="0">
+              <a:rPr lang="de-DE" sz="1400">
                 <a:latin typeface="+mj-lt"/>
               </a:rPr>
               <a:t>Stream Pipes</a:t>
             </a:r>
-            <a:endParaRPr lang="en-GB" sz="1400" dirty="0">
+            <a:endParaRPr lang="en-GB" sz="1400">
               <a:latin typeface="+mj-lt"/>
             </a:endParaRPr>
           </a:p>
@@ -13504,7 +13540,7 @@
               </a:lnSpc>
             </a:pPr>
             <a:r>
-              <a:rPr lang="de-DE" sz="1400" dirty="0">
+              <a:rPr lang="de-DE" sz="1400">
                 <a:latin typeface="+mj-lt"/>
               </a:rPr>
               <a:t> Bulk Transfers</a:t>
@@ -13517,12 +13553,12 @@
               </a:lnSpc>
             </a:pPr>
             <a:r>
-              <a:rPr lang="de-DE" sz="1400" dirty="0">
+              <a:rPr lang="de-DE" sz="1400">
                 <a:latin typeface="+mj-lt"/>
               </a:rPr>
               <a:t>Stream Pipes</a:t>
             </a:r>
-            <a:endParaRPr lang="en-GB" sz="1400" dirty="0">
+            <a:endParaRPr lang="en-GB" sz="1400">
               <a:latin typeface="+mj-lt"/>
             </a:endParaRPr>
           </a:p>
@@ -13583,7 +13619,7 @@
               <a:tabLst/>
             </a:pPr>
             <a:r>
-              <a:rPr kumimoji="0" lang="de-DE" sz="1300" b="1" i="0" u="none" strike="noStrike" cap="none" normalizeH="0" baseline="0" dirty="0">
+              <a:rPr kumimoji="0" lang="de-DE" sz="1300" b="1" i="0" u="none" strike="noStrike" cap="none" normalizeH="0" baseline="0">
                 <a:ln>
                   <a:noFill/>
                 </a:ln>
@@ -13596,7 +13632,7 @@
               </a:rPr>
               <a:t>USB Middleware</a:t>
             </a:r>
-            <a:endParaRPr kumimoji="0" lang="en-GB" sz="1300" b="1" i="0" u="none" strike="noStrike" cap="none" normalizeH="0" baseline="0" dirty="0">
+            <a:endParaRPr kumimoji="0" lang="en-GB" sz="1300" b="1" i="0" u="none" strike="noStrike" cap="none" normalizeH="0" baseline="0">
               <a:ln>
                 <a:noFill/>
               </a:ln>
@@ -13915,7 +13951,7 @@
               <a:tabLst/>
             </a:pPr>
             <a:r>
-              <a:rPr kumimoji="0" lang="de-DE" sz="1600" b="1" i="0" u="none" strike="noStrike" cap="none" normalizeH="0" baseline="0" dirty="0">
+              <a:rPr kumimoji="0" lang="de-DE" sz="1600" b="1" i="0" u="none" strike="noStrike" cap="none" normalizeH="0" baseline="0">
                 <a:ln>
                   <a:noFill/>
                 </a:ln>
@@ -13929,7 +13965,7 @@
               <a:t>Device Functionality</a:t>
             </a:r>
             <a:r>
-              <a:rPr kumimoji="0" lang="de-DE" sz="1600" b="1" i="0" u="none" strike="noStrike" cap="none" normalizeH="0" dirty="0">
+              <a:rPr kumimoji="0" lang="de-DE" sz="1600" b="1" i="0" u="none" strike="noStrike" cap="none" normalizeH="0">
                 <a:ln>
                   <a:noFill/>
                 </a:ln>
@@ -13942,7 +13978,7 @@
               </a:rPr>
               <a:t> 1</a:t>
             </a:r>
-            <a:endParaRPr kumimoji="0" lang="de-DE" sz="1600" b="1" i="0" u="none" strike="noStrike" cap="none" normalizeH="0" baseline="0" dirty="0">
+            <a:endParaRPr kumimoji="0" lang="de-DE" sz="1600" b="1" i="0" u="none" strike="noStrike" cap="none" normalizeH="0" baseline="0">
               <a:ln>
                 <a:noFill/>
               </a:ln>
@@ -13972,7 +14008,7 @@
               <a:tabLst/>
             </a:pPr>
             <a:r>
-              <a:rPr lang="de-DE" sz="1600" b="1" dirty="0">
+              <a:rPr lang="de-DE" sz="1600" b="1">
                 <a:solidFill>
                   <a:schemeClr val="bg1"/>
                 </a:solidFill>
@@ -13981,7 +14017,7 @@
               </a:rPr>
               <a:t>(e.g. HID Class)</a:t>
             </a:r>
-            <a:endParaRPr kumimoji="0" lang="de-DE" sz="1600" b="1" i="0" u="none" strike="noStrike" cap="none" normalizeH="0" baseline="0" dirty="0">
+            <a:endParaRPr kumimoji="0" lang="de-DE" sz="1600" b="1" i="0" u="none" strike="noStrike" cap="none" normalizeH="0" baseline="0">
               <a:ln>
                 <a:noFill/>
               </a:ln>
@@ -14068,7 +14104,7 @@
               <a:tabLst/>
             </a:pPr>
             <a:r>
-              <a:rPr kumimoji="0" lang="de-DE" sz="1600" b="1" i="0" u="none" strike="noStrike" cap="none" normalizeH="0" baseline="0" dirty="0">
+              <a:rPr kumimoji="0" lang="de-DE" sz="1600" b="1" i="0" u="none" strike="noStrike" cap="none" normalizeH="0" baseline="0">
                 <a:ln>
                   <a:noFill/>
                 </a:ln>
@@ -14100,7 +14136,7 @@
               <a:tabLst/>
             </a:pPr>
             <a:r>
-              <a:rPr lang="de-DE" sz="1600" b="1" dirty="0">
+              <a:rPr lang="de-DE" sz="1600" b="1">
                 <a:solidFill>
                   <a:schemeClr val="bg1"/>
                 </a:solidFill>
@@ -14109,7 +14145,7 @@
               </a:rPr>
               <a:t>(e.g. MSC)</a:t>
             </a:r>
-            <a:endParaRPr kumimoji="0" lang="de-DE" sz="1600" b="1" i="0" u="none" strike="noStrike" cap="none" normalizeH="0" baseline="0" dirty="0">
+            <a:endParaRPr kumimoji="0" lang="de-DE" sz="1600" b="1" i="0" u="none" strike="noStrike" cap="none" normalizeH="0" baseline="0">
               <a:ln>
                 <a:noFill/>
               </a:ln>
@@ -14155,7 +14191,7 @@
               </a:lnSpc>
             </a:pPr>
             <a:r>
-              <a:rPr lang="de-DE" sz="1400" dirty="0">
+              <a:rPr lang="de-DE" sz="1400">
                 <a:latin typeface="+mj-lt"/>
               </a:rPr>
               <a:t>Interrupt Transfers</a:t>
@@ -14168,12 +14204,12 @@
               </a:lnSpc>
             </a:pPr>
             <a:r>
-              <a:rPr lang="de-DE" sz="1400" dirty="0">
+              <a:rPr lang="de-DE" sz="1400">
                 <a:latin typeface="+mj-lt"/>
               </a:rPr>
               <a:t>Stream Pipe</a:t>
             </a:r>
-            <a:endParaRPr lang="en-GB" sz="1400" dirty="0">
+            <a:endParaRPr lang="en-GB" sz="1400">
               <a:latin typeface="+mj-lt"/>
             </a:endParaRPr>
           </a:p>
@@ -14269,7 +14305,7 @@
               </a:lnSpc>
             </a:pPr>
             <a:r>
-              <a:rPr lang="de-DE" sz="1400" dirty="0">
+              <a:rPr lang="de-DE" sz="1400">
                 <a:latin typeface="+mj-lt"/>
               </a:rPr>
               <a:t> Bulk Transfers</a:t>
@@ -14282,12 +14318,12 @@
               </a:lnSpc>
             </a:pPr>
             <a:r>
-              <a:rPr lang="de-DE" sz="1400" dirty="0">
+              <a:rPr lang="de-DE" sz="1400">
                 <a:latin typeface="+mj-lt"/>
               </a:rPr>
               <a:t>Stream Pipes</a:t>
             </a:r>
-            <a:endParaRPr lang="en-GB" sz="1400" dirty="0">
+            <a:endParaRPr lang="en-GB" sz="1400">
               <a:latin typeface="+mj-lt"/>
             </a:endParaRPr>
           </a:p>
@@ -14424,7 +14460,7 @@
               <a:tabLst/>
             </a:pPr>
             <a:r>
-              <a:rPr kumimoji="0" lang="de-DE" sz="1600" b="1" i="0" u="none" strike="noStrike" cap="none" normalizeH="0" baseline="0" dirty="0">
+              <a:rPr kumimoji="0" lang="de-DE" sz="1600" b="1" i="0" u="none" strike="noStrike" cap="none" normalizeH="0" baseline="0">
                 <a:ln>
                   <a:noFill/>
                 </a:ln>
@@ -14501,7 +14537,7 @@
               </a:lnSpc>
             </a:pPr>
             <a:r>
-              <a:rPr lang="de-DE" sz="1400" dirty="0">
+              <a:rPr lang="de-DE" sz="1400">
                 <a:latin typeface="+mj-lt"/>
               </a:rPr>
               <a:t>Isochronous Transfers</a:t>
@@ -14514,12 +14550,12 @@
               </a:lnSpc>
             </a:pPr>
             <a:r>
-              <a:rPr lang="de-DE" sz="1400" dirty="0">
+              <a:rPr lang="de-DE" sz="1400">
                 <a:latin typeface="+mj-lt"/>
               </a:rPr>
               <a:t>Stream Pipe</a:t>
             </a:r>
-            <a:endParaRPr lang="en-GB" sz="1400" dirty="0">
+            <a:endParaRPr lang="en-GB" sz="1400">
               <a:latin typeface="+mj-lt"/>
             </a:endParaRPr>
           </a:p>
@@ -14627,7 +14663,7 @@
               <a:tabLst/>
             </a:pPr>
             <a:r>
-              <a:rPr kumimoji="0" lang="de-DE" sz="1600" b="1" i="0" u="none" strike="noStrike" cap="none" normalizeH="0" baseline="0" dirty="0">
+              <a:rPr kumimoji="0" lang="de-DE" sz="1600" b="1" i="0" u="none" strike="noStrike" cap="none" normalizeH="0" baseline="0">
                 <a:ln>
                   <a:noFill/>
                 </a:ln>
@@ -14641,7 +14677,7 @@
               <a:t>Device Functionality</a:t>
             </a:r>
             <a:r>
-              <a:rPr kumimoji="0" lang="de-DE" sz="1600" b="1" i="0" u="none" strike="noStrike" cap="none" normalizeH="0" dirty="0">
+              <a:rPr kumimoji="0" lang="de-DE" sz="1600" b="1" i="0" u="none" strike="noStrike" cap="none" normalizeH="0">
                 <a:ln>
                   <a:noFill/>
                 </a:ln>
@@ -14654,7 +14690,7 @@
               </a:rPr>
               <a:t> 4</a:t>
             </a:r>
-            <a:endParaRPr kumimoji="0" lang="de-DE" sz="1600" b="1" i="0" u="none" strike="noStrike" cap="none" normalizeH="0" baseline="0" dirty="0">
+            <a:endParaRPr kumimoji="0" lang="de-DE" sz="1600" b="1" i="0" u="none" strike="noStrike" cap="none" normalizeH="0" baseline="0">
               <a:ln>
                 <a:noFill/>
               </a:ln>
@@ -14684,7 +14720,7 @@
               <a:tabLst/>
             </a:pPr>
             <a:r>
-              <a:rPr lang="de-DE" sz="1600" b="1" dirty="0">
+              <a:rPr lang="de-DE" sz="1600" b="1">
                 <a:solidFill>
                   <a:schemeClr val="bg1"/>
                 </a:solidFill>
@@ -14693,7 +14729,7 @@
               </a:rPr>
               <a:t>(e.g. ADC Class)</a:t>
             </a:r>
-            <a:endParaRPr kumimoji="0" lang="de-DE" sz="1600" b="1" i="0" u="none" strike="noStrike" cap="none" normalizeH="0" baseline="0" dirty="0">
+            <a:endParaRPr kumimoji="0" lang="de-DE" sz="1600" b="1" i="0" u="none" strike="noStrike" cap="none" normalizeH="0" baseline="0">
               <a:ln>
                 <a:noFill/>
               </a:ln>
@@ -14780,7 +14816,7 @@
               <a:tabLst/>
             </a:pPr>
             <a:r>
-              <a:rPr kumimoji="0" lang="de-DE" sz="1600" b="1" i="0" u="none" strike="noStrike" cap="none" normalizeH="0" baseline="0" dirty="0">
+              <a:rPr kumimoji="0" lang="de-DE" sz="1600" b="1" i="0" u="none" strike="noStrike" cap="none" normalizeH="0" baseline="0">
                 <a:ln>
                   <a:noFill/>
                 </a:ln>
@@ -14812,7 +14848,7 @@
               <a:tabLst/>
             </a:pPr>
             <a:r>
-              <a:rPr lang="de-DE" sz="1600" b="1" dirty="0">
+              <a:rPr lang="de-DE" sz="1600" b="1">
                 <a:solidFill>
                   <a:schemeClr val="bg1"/>
                 </a:solidFill>
@@ -14821,7 +14857,7 @@
               </a:rPr>
               <a:t>(e.g. CDC)</a:t>
             </a:r>
-            <a:endParaRPr kumimoji="0" lang="de-DE" sz="1600" b="1" i="0" u="none" strike="noStrike" cap="none" normalizeH="0" baseline="0" dirty="0">
+            <a:endParaRPr kumimoji="0" lang="de-DE" sz="1600" b="1" i="0" u="none" strike="noStrike" cap="none" normalizeH="0" baseline="0">
               <a:ln>
                 <a:noFill/>
               </a:ln>
@@ -14867,12 +14903,12 @@
               </a:lnSpc>
             </a:pPr>
             <a:r>
-              <a:rPr lang="de-DE" sz="1400" dirty="0">
+              <a:rPr lang="de-DE" sz="1400">
                 <a:latin typeface="+mj-lt"/>
               </a:rPr>
               <a:t> Stream Pipes</a:t>
             </a:r>
-            <a:endParaRPr lang="en-GB" sz="1400" dirty="0">
+            <a:endParaRPr lang="en-GB" sz="1400">
               <a:latin typeface="+mj-lt"/>
             </a:endParaRPr>
           </a:p>
@@ -14980,7 +15016,7 @@
               <a:tabLst/>
             </a:pPr>
             <a:r>
-              <a:rPr kumimoji="0" lang="de-DE" sz="1600" b="1" i="0" u="none" strike="noStrike" cap="none" normalizeH="0" baseline="0" dirty="0">
+              <a:rPr kumimoji="0" lang="de-DE" sz="1600" b="1" i="0" u="none" strike="noStrike" cap="none" normalizeH="0" baseline="0">
                 <a:ln>
                   <a:noFill/>
                 </a:ln>
@@ -14994,7 +15030,7 @@
               <a:t>USB</a:t>
             </a:r>
             <a:r>
-              <a:rPr kumimoji="0" lang="de-DE" sz="1600" b="1" i="0" u="none" strike="noStrike" cap="none" normalizeH="0" dirty="0">
+              <a:rPr kumimoji="0" lang="de-DE" sz="1600" b="1" i="0" u="none" strike="noStrike" cap="none" normalizeH="0">
                 <a:ln>
                   <a:noFill/>
                 </a:ln>
@@ -15007,7 +15043,7 @@
               </a:rPr>
               <a:t> Device</a:t>
             </a:r>
-            <a:endParaRPr kumimoji="0" lang="de-DE" sz="1600" b="1" i="0" u="none" strike="noStrike" cap="none" normalizeH="0" baseline="0" dirty="0">
+            <a:endParaRPr kumimoji="0" lang="de-DE" sz="1600" b="1" i="0" u="none" strike="noStrike" cap="none" normalizeH="0" baseline="0">
               <a:ln>
                 <a:noFill/>
               </a:ln>
@@ -15115,7 +15151,7 @@
               </a:spcAft>
             </a:pPr>
             <a:r>
-              <a:rPr lang="de-DE" sz="1400" b="1" dirty="0">
+              <a:rPr lang="de-DE" sz="1400" b="1">
                 <a:solidFill>
                   <a:schemeClr val="bg1"/>
                 </a:solidFill>
@@ -15125,7 +15161,7 @@
               <a:t>Control </a:t>
             </a:r>
             <a:r>
-              <a:rPr lang="en-GB" sz="1400" b="1" dirty="0">
+              <a:rPr lang="en-GB" sz="1400" b="1">
                 <a:solidFill>
                   <a:schemeClr val="bg1"/>
                 </a:solidFill>
@@ -15135,7 +15171,7 @@
               <a:t>OUT </a:t>
             </a:r>
             <a:r>
-              <a:rPr lang="de-DE" sz="1400" b="1" dirty="0">
+              <a:rPr lang="de-DE" sz="1400" b="1">
                 <a:solidFill>
                   <a:schemeClr val="bg1"/>
                 </a:solidFill>
@@ -15145,7 +15181,7 @@
               <a:t>Endpoint</a:t>
             </a:r>
             <a:r>
-              <a:rPr lang="en-GB" sz="1400" b="1" dirty="0">
+              <a:rPr lang="en-GB" sz="1400" b="1">
                 <a:solidFill>
                   <a:schemeClr val="bg1"/>
                 </a:solidFill>
@@ -15154,7 +15190,7 @@
               </a:rPr>
               <a:t> 0</a:t>
             </a:r>
-            <a:endParaRPr lang="de-DE" sz="1400" b="1" dirty="0">
+            <a:endParaRPr lang="de-DE" sz="1400" b="1">
               <a:solidFill>
                 <a:schemeClr val="bg1"/>
               </a:solidFill>
@@ -15237,7 +15273,7 @@
               <a:tabLst/>
             </a:pPr>
             <a:r>
-              <a:rPr lang="de-DE" sz="1400" b="1" dirty="0">
+              <a:rPr lang="de-DE" sz="1400" b="1">
                 <a:solidFill>
                   <a:schemeClr val="bg1"/>
                 </a:solidFill>
@@ -15247,7 +15283,7 @@
               <a:t>Interrupt IN Endpoint</a:t>
             </a:r>
             <a:r>
-              <a:rPr lang="en-GB" sz="1400" b="1" dirty="0">
+              <a:rPr lang="en-GB" sz="1400" b="1">
                 <a:solidFill>
                   <a:schemeClr val="bg1"/>
                 </a:solidFill>
@@ -15256,7 +15292,7 @@
               </a:rPr>
               <a:t> 1</a:t>
             </a:r>
-            <a:endParaRPr lang="de-DE" sz="1400" b="1" dirty="0">
+            <a:endParaRPr lang="de-DE" sz="1400" b="1">
               <a:solidFill>
                 <a:schemeClr val="bg1"/>
               </a:solidFill>
@@ -15339,7 +15375,7 @@
               <a:tabLst/>
             </a:pPr>
             <a:r>
-              <a:rPr lang="de-DE" sz="1400" b="1" dirty="0">
+              <a:rPr lang="de-DE" sz="1400" b="1">
                 <a:solidFill>
                   <a:schemeClr val="bg1"/>
                 </a:solidFill>
@@ -15424,7 +15460,7 @@
               <a:tabLst/>
             </a:pPr>
             <a:r>
-              <a:rPr lang="de-DE" sz="1400" b="1" dirty="0">
+              <a:rPr lang="de-DE" sz="1400" b="1">
                 <a:solidFill>
                   <a:schemeClr val="bg1"/>
                 </a:solidFill>
@@ -15434,7 +15470,7 @@
               <a:t>Bulk IN Endpoint</a:t>
             </a:r>
             <a:r>
-              <a:rPr lang="en-GB" sz="1400" b="1" dirty="0">
+              <a:rPr lang="en-GB" sz="1400" b="1">
                 <a:solidFill>
                   <a:schemeClr val="bg1"/>
                 </a:solidFill>
@@ -15443,7 +15479,7 @@
               </a:rPr>
               <a:t> 2</a:t>
             </a:r>
-            <a:endParaRPr lang="de-DE" sz="1400" b="1" dirty="0">
+            <a:endParaRPr lang="de-DE" sz="1400" b="1">
               <a:solidFill>
                 <a:schemeClr val="bg1"/>
               </a:solidFill>
@@ -15526,7 +15562,7 @@
               <a:tabLst/>
             </a:pPr>
             <a:r>
-              <a:rPr lang="de-DE" sz="1400" b="1" dirty="0">
+              <a:rPr lang="de-DE" sz="1400" b="1">
                 <a:solidFill>
                   <a:schemeClr val="bg1"/>
                 </a:solidFill>
@@ -15536,7 +15572,7 @@
               <a:t>Bulk OUT Endpoint</a:t>
             </a:r>
             <a:r>
-              <a:rPr lang="en-GB" sz="1400" b="1" dirty="0">
+              <a:rPr lang="en-GB" sz="1400" b="1">
                 <a:solidFill>
                   <a:schemeClr val="bg1"/>
                 </a:solidFill>
@@ -15545,7 +15581,7 @@
               </a:rPr>
               <a:t> 2</a:t>
             </a:r>
-            <a:endParaRPr lang="de-DE" sz="1400" b="1" dirty="0">
+            <a:endParaRPr lang="de-DE" sz="1400" b="1">
               <a:solidFill>
                 <a:schemeClr val="bg1"/>
               </a:solidFill>
@@ -15579,7 +15615,7 @@
           <a:p>
             <a:pPr algn="ctr"/>
             <a:r>
-              <a:rPr lang="de-DE" sz="2400" b="1" dirty="0">
+              <a:rPr lang="de-DE" sz="2400" b="1">
                 <a:solidFill>
                   <a:srgbClr val="A10608"/>
                 </a:solidFill>
@@ -15587,7 +15623,7 @@
               </a:rPr>
               <a:t>...</a:t>
             </a:r>
-            <a:endParaRPr lang="en-GB" sz="2400" b="1" dirty="0">
+            <a:endParaRPr lang="en-GB" sz="2400" b="1">
               <a:solidFill>
                 <a:srgbClr val="A10608"/>
               </a:solidFill>
@@ -15669,7 +15705,7 @@
               <a:tabLst/>
             </a:pPr>
             <a:r>
-              <a:rPr lang="de-DE" sz="1400" b="1" dirty="0">
+              <a:rPr lang="de-DE" sz="1400" b="1">
                 <a:solidFill>
                   <a:schemeClr val="bg1"/>
                 </a:solidFill>
@@ -15679,7 +15715,7 @@
               <a:t>Interrupt IN Endpoint</a:t>
             </a:r>
             <a:r>
-              <a:rPr lang="en-GB" sz="1400" b="1" dirty="0">
+              <a:rPr lang="en-GB" sz="1400" b="1">
                 <a:solidFill>
                   <a:schemeClr val="bg1"/>
                 </a:solidFill>
@@ -15688,7 +15724,7 @@
               </a:rPr>
               <a:t> 3</a:t>
             </a:r>
-            <a:endParaRPr lang="de-DE" sz="1400" b="1" dirty="0">
+            <a:endParaRPr lang="de-DE" sz="1400" b="1">
               <a:solidFill>
                 <a:schemeClr val="bg1"/>
               </a:solidFill>
@@ -15771,7 +15807,7 @@
               <a:tabLst/>
             </a:pPr>
             <a:r>
-              <a:rPr lang="de-DE" sz="1400" b="1" dirty="0">
+              <a:rPr lang="de-DE" sz="1400" b="1">
                 <a:solidFill>
                   <a:schemeClr val="bg1"/>
                 </a:solidFill>
@@ -15781,7 +15817,7 @@
               <a:t>Bulk IN Endpoint</a:t>
             </a:r>
             <a:r>
-              <a:rPr lang="en-GB" sz="1400" b="1" dirty="0">
+              <a:rPr lang="en-GB" sz="1400" b="1">
                 <a:solidFill>
                   <a:schemeClr val="bg1"/>
                 </a:solidFill>
@@ -15790,7 +15826,7 @@
               </a:rPr>
               <a:t> 4</a:t>
             </a:r>
-            <a:endParaRPr lang="de-DE" sz="1400" b="1" dirty="0">
+            <a:endParaRPr lang="de-DE" sz="1400" b="1">
               <a:solidFill>
                 <a:schemeClr val="bg1"/>
               </a:solidFill>
@@ -15873,7 +15909,7 @@
               <a:tabLst/>
             </a:pPr>
             <a:r>
-              <a:rPr lang="de-DE" sz="1400" b="1" dirty="0">
+              <a:rPr lang="de-DE" sz="1400" b="1">
                 <a:solidFill>
                   <a:schemeClr val="bg1"/>
                 </a:solidFill>
@@ -15883,7 +15919,7 @@
               <a:t>Bulk OUT Endpoint</a:t>
             </a:r>
             <a:r>
-              <a:rPr lang="en-GB" sz="1400" b="1" dirty="0">
+              <a:rPr lang="en-GB" sz="1400" b="1">
                 <a:solidFill>
                   <a:schemeClr val="bg1"/>
                 </a:solidFill>
@@ -15892,7 +15928,7 @@
               </a:rPr>
               <a:t> 4</a:t>
             </a:r>
-            <a:endParaRPr lang="de-DE" sz="1400" b="1" dirty="0">
+            <a:endParaRPr lang="de-DE" sz="1400" b="1">
               <a:solidFill>
                 <a:schemeClr val="bg1"/>
               </a:solidFill>
@@ -15975,7 +16011,7 @@
               <a:tabLst/>
             </a:pPr>
             <a:r>
-              <a:rPr lang="de-DE" sz="1400" b="1" dirty="0">
+              <a:rPr lang="de-DE" sz="1400" b="1">
                 <a:solidFill>
                   <a:schemeClr val="bg1"/>
                 </a:solidFill>
@@ -15985,7 +16021,7 @@
               <a:t>Isochronous OUT Endpoint</a:t>
             </a:r>
             <a:r>
-              <a:rPr lang="en-GB" sz="1400" b="1" dirty="0">
+              <a:rPr lang="en-GB" sz="1400" b="1">
                 <a:solidFill>
                   <a:schemeClr val="bg1"/>
                 </a:solidFill>
@@ -15994,7 +16030,7 @@
               </a:rPr>
               <a:t> 5</a:t>
             </a:r>
-            <a:endParaRPr lang="de-DE" sz="1400" b="1" dirty="0">
+            <a:endParaRPr lang="de-DE" sz="1400" b="1">
               <a:solidFill>
                 <a:schemeClr val="bg1"/>
               </a:solidFill>
@@ -16077,7 +16113,7 @@
               <a:tabLst/>
             </a:pPr>
             <a:r>
-              <a:rPr lang="de-DE" sz="1400" b="1" dirty="0">
+              <a:rPr lang="de-DE" sz="1400" b="1">
                 <a:solidFill>
                   <a:schemeClr val="bg1"/>
                 </a:solidFill>
@@ -16087,7 +16123,7 @@
               <a:t>IN Endpoint</a:t>
             </a:r>
             <a:r>
-              <a:rPr lang="en-GB" sz="1400" b="1" dirty="0">
+              <a:rPr lang="en-GB" sz="1400" b="1">
                 <a:solidFill>
                   <a:schemeClr val="bg1"/>
                 </a:solidFill>
@@ -16096,7 +16132,7 @@
               </a:rPr>
               <a:t> 15</a:t>
             </a:r>
-            <a:endParaRPr lang="de-DE" sz="1400" b="1" dirty="0">
+            <a:endParaRPr lang="de-DE" sz="1400" b="1">
               <a:solidFill>
                 <a:schemeClr val="bg1"/>
               </a:solidFill>
@@ -16179,7 +16215,7 @@
               <a:tabLst/>
             </a:pPr>
             <a:r>
-              <a:rPr lang="de-DE" sz="1400" b="1" dirty="0">
+              <a:rPr lang="de-DE" sz="1400" b="1">
                 <a:solidFill>
                   <a:schemeClr val="bg1"/>
                 </a:solidFill>
@@ -16189,7 +16225,7 @@
               <a:t>OUT Endpoint</a:t>
             </a:r>
             <a:r>
-              <a:rPr lang="en-GB" sz="1400" b="1" dirty="0">
+              <a:rPr lang="en-GB" sz="1400" b="1">
                 <a:solidFill>
                   <a:schemeClr val="bg1"/>
                 </a:solidFill>
@@ -16198,7 +16234,7 @@
               </a:rPr>
               <a:t> 15</a:t>
             </a:r>
-            <a:endParaRPr lang="de-DE" sz="1400" b="1" dirty="0">
+            <a:endParaRPr lang="de-DE" sz="1400" b="1">
               <a:solidFill>
                 <a:schemeClr val="bg1"/>
               </a:solidFill>
@@ -16281,7 +16317,7 @@
               <a:tabLst/>
             </a:pPr>
             <a:r>
-              <a:rPr lang="de-DE" sz="1400" b="1" dirty="0">
+              <a:rPr lang="de-DE" sz="1400" b="1">
                 <a:solidFill>
                   <a:schemeClr val="bg1"/>
                 </a:solidFill>
@@ -16291,7 +16327,7 @@
               <a:t>Control IN Endpoint</a:t>
             </a:r>
             <a:r>
-              <a:rPr lang="en-GB" sz="1400" b="1" dirty="0">
+              <a:rPr lang="en-GB" sz="1400" b="1">
                 <a:solidFill>
                   <a:schemeClr val="bg1"/>
                 </a:solidFill>
@@ -16300,7 +16336,7 @@
               </a:rPr>
               <a:t> 0</a:t>
             </a:r>
-            <a:endParaRPr lang="de-DE" sz="1400" b="1" dirty="0">
+            <a:endParaRPr lang="de-DE" sz="1400" b="1">
               <a:solidFill>
                 <a:schemeClr val="bg1"/>
               </a:solidFill>
@@ -16355,7 +16391,7 @@
               </a:spcAft>
             </a:pPr>
             <a:r>
-              <a:rPr lang="de-DE" sz="1600" b="1" dirty="0">
+              <a:rPr lang="de-DE" sz="1600" b="1">
                 <a:solidFill>
                   <a:schemeClr val="bg1"/>
                 </a:solidFill>
@@ -16412,7 +16448,7 @@
               </a:spcAft>
             </a:pPr>
             <a:r>
-              <a:rPr lang="de-DE" sz="1600" b="1" dirty="0">
+              <a:rPr lang="de-DE" sz="1600" b="1">
                 <a:solidFill>
                   <a:schemeClr val="bg1"/>
                 </a:solidFill>
@@ -16469,7 +16505,7 @@
               </a:spcAft>
             </a:pPr>
             <a:r>
-              <a:rPr lang="de-DE" sz="1600" b="1" dirty="0">
+              <a:rPr lang="de-DE" sz="1600" b="1">
                 <a:solidFill>
                   <a:schemeClr val="bg1"/>
                 </a:solidFill>
@@ -16526,7 +16562,7 @@
               </a:spcAft>
             </a:pPr>
             <a:r>
-              <a:rPr lang="de-DE" sz="1600" b="1" dirty="0">
+              <a:rPr lang="de-DE" sz="1600" b="1">
                 <a:solidFill>
                   <a:schemeClr val="bg1"/>
                 </a:solidFill>
@@ -16583,7 +16619,7 @@
               </a:spcAft>
             </a:pPr>
             <a:r>
-              <a:rPr lang="de-DE" sz="1600" b="1" dirty="0">
+              <a:rPr lang="de-DE" sz="1600" b="1">
                 <a:solidFill>
                   <a:schemeClr val="bg1"/>
                 </a:solidFill>

</xml_diff>

<commit_message>
Documentation: update USB component documentation
</commit_message>
<xml_diff>
--- a/Documentation/Doxygen/USB/src/USB_New_Style.pptx
+++ b/Documentation/Doxygen/USB/src/USB_New_Style.pptx
@@ -270,7 +270,7 @@
             <a:fld id="{E72D30EF-8F20-0B47-8B5D-39A8BC29E860}" type="datetimeFigureOut">
               <a:rPr lang="en-US" smtClean="0"/>
               <a:pPr/>
-              <a:t>20-May-24</a:t>
+              <a:t>26-Sep-24</a:t>
             </a:fld>
             <a:endParaRPr lang="en-US"/>
           </a:p>
@@ -438,7 +438,7 @@
             <a:fld id="{77EDD36E-1E02-F241-9611-1F1D9EAAD326}" type="datetimeFigureOut">
               <a:rPr lang="en-US" smtClean="0"/>
               <a:pPr/>
-              <a:t>20-May-24</a:t>
+              <a:t>26-Sep-24</a:t>
             </a:fld>
             <a:endParaRPr lang="en-US"/>
           </a:p>
@@ -7818,7 +7818,7 @@
         </p:nvSpPr>
         <p:spPr bwMode="auto">
           <a:xfrm>
-            <a:off x="2222528" y="2564904"/>
+            <a:off x="3431126" y="2779589"/>
             <a:ext cx="4536000" cy="1620000"/>
           </a:xfrm>
           <a:prstGeom prst="roundRect">
@@ -7884,7 +7884,7 @@
         </p:nvSpPr>
         <p:spPr bwMode="auto">
           <a:xfrm>
-            <a:off x="2291627" y="2636912"/>
+            <a:off x="3500225" y="2851597"/>
             <a:ext cx="972000" cy="360000"/>
           </a:xfrm>
           <a:prstGeom prst="roundRect">
@@ -7961,7 +7961,7 @@
         </p:nvSpPr>
         <p:spPr bwMode="auto">
           <a:xfrm>
-            <a:off x="2292121" y="3737007"/>
+            <a:off x="3500719" y="3951692"/>
             <a:ext cx="2052000" cy="360000"/>
           </a:xfrm>
           <a:prstGeom prst="roundRect">
@@ -8023,7 +8023,7 @@
         </p:nvSpPr>
         <p:spPr bwMode="auto">
           <a:xfrm>
-            <a:off x="2291627" y="4265800"/>
+            <a:off x="3500225" y="4480485"/>
             <a:ext cx="2052000" cy="360000"/>
           </a:xfrm>
           <a:prstGeom prst="roundRect">
@@ -8102,7 +8102,7 @@
         </p:nvSpPr>
         <p:spPr bwMode="auto">
           <a:xfrm>
-            <a:off x="3371627" y="2636912"/>
+            <a:off x="4580225" y="2851597"/>
             <a:ext cx="972000" cy="360000"/>
           </a:xfrm>
           <a:prstGeom prst="roundRect">
@@ -8179,8 +8179,8 @@
         </p:nvSpPr>
         <p:spPr bwMode="auto">
           <a:xfrm>
-            <a:off x="359694" y="2858263"/>
-            <a:ext cx="1476000" cy="692874"/>
+            <a:off x="1475641" y="3072948"/>
+            <a:ext cx="1568651" cy="692874"/>
           </a:xfrm>
           <a:prstGeom prst="foldedCorner">
             <a:avLst/>
@@ -8237,7 +8237,7 @@
                 <a:ea typeface="ＭＳ Ｐゴシック" pitchFamily="34" charset="-128"/>
                 <a:cs typeface="Courier New" pitchFamily="49" charset="0"/>
               </a:rPr>
-              <a:t>USBD_Config_0.c</a:t>
+              <a:t>USBD_Config_0.h</a:t>
             </a:r>
           </a:p>
         </p:txBody>
@@ -8250,7 +8250,7 @@
         </p:nvSpPr>
         <p:spPr>
           <a:xfrm>
-            <a:off x="6732240" y="2696636"/>
+            <a:off x="7940838" y="2911321"/>
             <a:ext cx="1800200" cy="307777"/>
           </a:xfrm>
           <a:prstGeom prst="rect">
@@ -8284,7 +8284,7 @@
         </p:nvSpPr>
         <p:spPr>
           <a:xfrm>
-            <a:off x="6732240" y="3763118"/>
+            <a:off x="7940838" y="3977803"/>
             <a:ext cx="1800200" cy="307777"/>
           </a:xfrm>
           <a:prstGeom prst="rect">
@@ -8318,7 +8318,7 @@
         </p:nvSpPr>
         <p:spPr>
           <a:xfrm>
-            <a:off x="6732240" y="4291911"/>
+            <a:off x="7940838" y="4506596"/>
             <a:ext cx="1511356" cy="307777"/>
           </a:xfrm>
           <a:prstGeom prst="rect">
@@ -8354,7 +8354,7 @@
         </p:nvCxnSpPr>
         <p:spPr bwMode="auto">
           <a:xfrm>
-            <a:off x="2777627" y="2996912"/>
+            <a:off x="3986225" y="3211597"/>
             <a:ext cx="0" cy="272180"/>
           </a:xfrm>
           <a:prstGeom prst="straightConnector1">
@@ -8385,7 +8385,7 @@
         </p:nvCxnSpPr>
         <p:spPr bwMode="auto">
           <a:xfrm>
-            <a:off x="3857627" y="2996912"/>
+            <a:off x="5066225" y="3211597"/>
             <a:ext cx="0" cy="272180"/>
           </a:xfrm>
           <a:prstGeom prst="straightConnector1">
@@ -8410,6 +8410,7 @@
         <p:nvCxnSpPr>
           <p:cNvPr id="15" name="Straight Arrow Connector 14"/>
           <p:cNvCxnSpPr>
+            <a:cxnSpLocks/>
             <a:stCxn id="9" idx="3"/>
             <a:endCxn id="31" idx="1"/>
           </p:cNvCxnSpPr>
@@ -8417,7 +8418,7 @@
         </p:nvCxnSpPr>
         <p:spPr bwMode="auto">
           <a:xfrm>
-            <a:off x="1835694" y="3204700"/>
+            <a:off x="3044292" y="3419385"/>
             <a:ext cx="455933" cy="244392"/>
           </a:xfrm>
           <a:prstGeom prst="straightConnector1">
@@ -8442,6 +8443,7 @@
         <p:nvCxnSpPr>
           <p:cNvPr id="16" name="Straight Arrow Connector 15"/>
           <p:cNvCxnSpPr>
+            <a:cxnSpLocks/>
             <a:stCxn id="17" idx="3"/>
             <a:endCxn id="6" idx="1"/>
           </p:cNvCxnSpPr>
@@ -8449,7 +8451,7 @@
         </p:nvCxnSpPr>
         <p:spPr bwMode="auto">
           <a:xfrm flipV="1">
-            <a:off x="1835696" y="3917007"/>
+            <a:off x="3044294" y="4131692"/>
             <a:ext cx="456425" cy="173668"/>
           </a:xfrm>
           <a:prstGeom prst="straightConnector1">
@@ -8478,8 +8480,8 @@
         </p:nvSpPr>
         <p:spPr bwMode="auto">
           <a:xfrm>
-            <a:off x="359696" y="3744238"/>
-            <a:ext cx="1476000" cy="692874"/>
+            <a:off x="1475641" y="3958923"/>
+            <a:ext cx="1568653" cy="692874"/>
           </a:xfrm>
           <a:prstGeom prst="foldedCorner">
             <a:avLst/>
@@ -8541,7 +8543,7 @@
         </p:nvSpPr>
         <p:spPr bwMode="auto">
           <a:xfrm>
-            <a:off x="2267944" y="1511990"/>
+            <a:off x="3476542" y="1726675"/>
             <a:ext cx="1800000" cy="692874"/>
           </a:xfrm>
           <a:prstGeom prst="foldedCorner">
@@ -8612,7 +8614,7 @@
         </p:nvSpPr>
         <p:spPr bwMode="auto">
           <a:xfrm>
-            <a:off x="4248144" y="1511990"/>
+            <a:off x="5456742" y="1726675"/>
             <a:ext cx="1620000" cy="692874"/>
           </a:xfrm>
           <a:prstGeom prst="foldedCorner">
@@ -8689,7 +8691,7 @@
         </p:nvCxnSpPr>
         <p:spPr bwMode="auto">
           <a:xfrm flipH="1">
-            <a:off x="3857627" y="2204864"/>
+            <a:off x="5066225" y="2419549"/>
             <a:ext cx="1200517" cy="432048"/>
           </a:xfrm>
           <a:prstGeom prst="line">
@@ -8721,7 +8723,7 @@
         </p:nvCxnSpPr>
         <p:spPr bwMode="auto">
           <a:xfrm>
-            <a:off x="3167944" y="2204864"/>
+            <a:off x="4376542" y="2419549"/>
             <a:ext cx="689683" cy="432048"/>
           </a:xfrm>
           <a:prstGeom prst="line">
@@ -8750,7 +8752,7 @@
         </p:nvSpPr>
         <p:spPr bwMode="auto">
           <a:xfrm>
-            <a:off x="4400925" y="3212976"/>
+            <a:off x="5609523" y="3427661"/>
             <a:ext cx="2160000" cy="1476000"/>
           </a:xfrm>
           <a:prstGeom prst="roundRect">
@@ -8820,7 +8822,7 @@
         </p:nvCxnSpPr>
         <p:spPr bwMode="auto">
           <a:xfrm>
-            <a:off x="4931236" y="3002684"/>
+            <a:off x="6139834" y="3217369"/>
             <a:ext cx="0" cy="560361"/>
           </a:xfrm>
           <a:prstGeom prst="straightConnector1">
@@ -8851,7 +8853,7 @@
         </p:nvSpPr>
         <p:spPr bwMode="auto">
           <a:xfrm>
-            <a:off x="4445236" y="2642684"/>
+            <a:off x="5653834" y="2857369"/>
             <a:ext cx="972000" cy="360000"/>
           </a:xfrm>
           <a:prstGeom prst="roundRect">
@@ -8928,7 +8930,7 @@
         </p:nvSpPr>
         <p:spPr bwMode="auto">
           <a:xfrm>
-            <a:off x="4444745" y="3269092"/>
+            <a:off x="5653343" y="3483777"/>
             <a:ext cx="2052491" cy="360000"/>
           </a:xfrm>
           <a:prstGeom prst="roundRect">
@@ -9005,7 +9007,7 @@
         </p:nvSpPr>
         <p:spPr>
           <a:xfrm>
-            <a:off x="6732240" y="3295203"/>
+            <a:off x="7940838" y="3509888"/>
             <a:ext cx="1224136" cy="307777"/>
           </a:xfrm>
           <a:prstGeom prst="rect">
@@ -9039,7 +9041,7 @@
         </p:nvSpPr>
         <p:spPr bwMode="auto">
           <a:xfrm>
-            <a:off x="4444743" y="3737006"/>
+            <a:off x="5653341" y="3951691"/>
             <a:ext cx="2052493" cy="360000"/>
           </a:xfrm>
           <a:prstGeom prst="roundRect">
@@ -9103,7 +9105,7 @@
         </p:nvCxnSpPr>
         <p:spPr bwMode="auto">
           <a:xfrm flipH="1">
-            <a:off x="4116388" y="3004413"/>
+            <a:off x="5324986" y="3219098"/>
             <a:ext cx="1858848" cy="264679"/>
           </a:xfrm>
           <a:prstGeom prst="straightConnector1">
@@ -9132,7 +9134,7 @@
         </p:nvSpPr>
         <p:spPr bwMode="auto">
           <a:xfrm>
-            <a:off x="5525236" y="2644413"/>
+            <a:off x="6733834" y="2859098"/>
             <a:ext cx="900000" cy="360000"/>
           </a:xfrm>
           <a:prstGeom prst="roundRect">
@@ -9209,7 +9211,7 @@
         </p:nvSpPr>
         <p:spPr bwMode="auto">
           <a:xfrm>
-            <a:off x="2291627" y="3269092"/>
+            <a:off x="3500225" y="3483777"/>
             <a:ext cx="2052000" cy="360000"/>
           </a:xfrm>
           <a:prstGeom prst="roundRect">
@@ -9286,7 +9288,7 @@
         </p:nvSpPr>
         <p:spPr bwMode="auto">
           <a:xfrm>
-            <a:off x="6624308" y="1511990"/>
+            <a:off x="7832906" y="1726675"/>
             <a:ext cx="720000" cy="432048"/>
           </a:xfrm>
           <a:prstGeom prst="foldedCorner">
@@ -9342,7 +9344,7 @@
         </p:nvSpPr>
         <p:spPr>
           <a:xfrm>
-            <a:off x="6511279" y="1944038"/>
+            <a:off x="7719877" y="2158723"/>
             <a:ext cx="946057" cy="369332"/>
           </a:xfrm>
           <a:prstGeom prst="rect">
@@ -9396,7 +9398,7 @@
         </p:nvSpPr>
         <p:spPr bwMode="auto">
           <a:xfrm>
-            <a:off x="7619450" y="1511990"/>
+            <a:off x="8828048" y="1726675"/>
             <a:ext cx="720000" cy="432000"/>
           </a:xfrm>
           <a:prstGeom prst="foldedCorner">
@@ -9467,7 +9469,7 @@
         </p:nvSpPr>
         <p:spPr>
           <a:xfrm>
-            <a:off x="7598576" y="1943722"/>
+            <a:off x="8807174" y="2158407"/>
             <a:ext cx="761747" cy="369332"/>
           </a:xfrm>
           <a:prstGeom prst="rect">
@@ -9521,8 +9523,8 @@
         </p:nvSpPr>
         <p:spPr bwMode="auto">
           <a:xfrm>
-            <a:off x="359693" y="2003762"/>
-            <a:ext cx="1764035" cy="692874"/>
+            <a:off x="1475641" y="2218447"/>
+            <a:ext cx="1883344" cy="692874"/>
           </a:xfrm>
           <a:prstGeom prst="foldedCorner">
             <a:avLst/>
@@ -9570,7 +9572,7 @@
               <a:tabLst/>
             </a:pPr>
             <a:r>
-              <a:rPr kumimoji="0" lang="de-DE" sz="1000" b="1" i="0" u="none" strike="noStrike" cap="none" normalizeH="0" baseline="0">
+              <a:rPr kumimoji="0" lang="de-DE" sz="1100" b="1" i="0" u="none" strike="noStrike" cap="none" normalizeH="0" baseline="0">
                 <a:ln>
                   <a:noFill/>
                 </a:ln>
@@ -9591,6 +9593,7 @@
         <p:nvCxnSpPr>
           <p:cNvPr id="37" name="Straight Arrow Connector 36"/>
           <p:cNvCxnSpPr>
+            <a:cxnSpLocks/>
             <a:stCxn id="36" idx="3"/>
             <a:endCxn id="31" idx="1"/>
           </p:cNvCxnSpPr>
@@ -9598,8 +9601,8 @@
         </p:nvCxnSpPr>
         <p:spPr bwMode="auto">
           <a:xfrm>
-            <a:off x="2123728" y="2350199"/>
-            <a:ext cx="167899" cy="1098893"/>
+            <a:off x="3358985" y="2564884"/>
+            <a:ext cx="141240" cy="1098893"/>
           </a:xfrm>
           <a:prstGeom prst="straightConnector1">
             <a:avLst/>
@@ -9627,7 +9630,7 @@
         </p:nvSpPr>
         <p:spPr bwMode="auto">
           <a:xfrm>
-            <a:off x="4445236" y="4265800"/>
+            <a:off x="5653834" y="4480485"/>
             <a:ext cx="2052000" cy="360000"/>
           </a:xfrm>
           <a:prstGeom prst="roundRect">
@@ -10694,7 +10697,7 @@
         </p:nvSpPr>
         <p:spPr bwMode="auto">
           <a:xfrm>
-            <a:off x="2222528" y="2564904"/>
+            <a:off x="3431125" y="2672936"/>
             <a:ext cx="4536000" cy="1505991"/>
           </a:xfrm>
           <a:prstGeom prst="roundRect">
@@ -10760,7 +10763,7 @@
         </p:nvSpPr>
         <p:spPr bwMode="auto">
           <a:xfrm>
-            <a:off x="2292121" y="3608883"/>
+            <a:off x="3500718" y="3716915"/>
             <a:ext cx="2052000" cy="360000"/>
           </a:xfrm>
           <a:prstGeom prst="roundRect">
@@ -10822,7 +10825,7 @@
         </p:nvSpPr>
         <p:spPr bwMode="auto">
           <a:xfrm>
-            <a:off x="2291627" y="4137676"/>
+            <a:off x="3500224" y="4245708"/>
             <a:ext cx="2052000" cy="360000"/>
           </a:xfrm>
           <a:prstGeom prst="roundRect">
@@ -10901,7 +10904,7 @@
         </p:nvSpPr>
         <p:spPr bwMode="auto">
           <a:xfrm>
-            <a:off x="330578" y="2930271"/>
+            <a:off x="1539175" y="3038303"/>
             <a:ext cx="1505118" cy="692874"/>
           </a:xfrm>
           <a:prstGeom prst="foldedCorner">
@@ -10959,7 +10962,7 @@
                 <a:ea typeface="ＭＳ Ｐゴシック" pitchFamily="34" charset="-128"/>
                 <a:cs typeface="Courier New" pitchFamily="49" charset="0"/>
               </a:rPr>
-              <a:t>USBH_Config_0.c</a:t>
+              <a:t>USBH_Config_0.h</a:t>
             </a:r>
           </a:p>
         </p:txBody>
@@ -10972,7 +10975,7 @@
         </p:nvSpPr>
         <p:spPr>
           <a:xfrm>
-            <a:off x="6732240" y="2555302"/>
+            <a:off x="7940837" y="2663334"/>
             <a:ext cx="1800200" cy="523220"/>
           </a:xfrm>
           <a:prstGeom prst="rect">
@@ -11006,7 +11009,7 @@
         </p:nvSpPr>
         <p:spPr>
           <a:xfrm>
-            <a:off x="6732240" y="3763118"/>
+            <a:off x="7940837" y="3871150"/>
             <a:ext cx="1800200" cy="307777"/>
           </a:xfrm>
           <a:prstGeom prst="rect">
@@ -11040,7 +11043,7 @@
         </p:nvSpPr>
         <p:spPr>
           <a:xfrm>
-            <a:off x="6732240" y="4291911"/>
+            <a:off x="7940837" y="4399943"/>
             <a:ext cx="1511356" cy="307777"/>
           </a:xfrm>
           <a:prstGeom prst="rect">
@@ -11077,7 +11080,7 @@
         </p:nvCxnSpPr>
         <p:spPr bwMode="auto">
           <a:xfrm>
-            <a:off x="1835696" y="3276708"/>
+            <a:off x="3044293" y="3384740"/>
             <a:ext cx="455931" cy="44260"/>
           </a:xfrm>
           <a:prstGeom prst="straightConnector1">
@@ -11109,7 +11112,7 @@
         </p:nvCxnSpPr>
         <p:spPr bwMode="auto">
           <a:xfrm flipV="1">
-            <a:off x="1835696" y="3788883"/>
+            <a:off x="3044293" y="3896915"/>
             <a:ext cx="456425" cy="373800"/>
           </a:xfrm>
           <a:prstGeom prst="straightConnector1">
@@ -11138,7 +11141,7 @@
         </p:nvSpPr>
         <p:spPr bwMode="auto">
           <a:xfrm>
-            <a:off x="330580" y="3816246"/>
+            <a:off x="1539177" y="3924278"/>
             <a:ext cx="1505116" cy="692874"/>
           </a:xfrm>
           <a:prstGeom prst="foldedCorner">
@@ -11201,7 +11204,7 @@
         </p:nvSpPr>
         <p:spPr bwMode="auto">
           <a:xfrm>
-            <a:off x="330580" y="2363911"/>
+            <a:off x="1539177" y="2471943"/>
             <a:ext cx="1620000" cy="360000"/>
           </a:xfrm>
           <a:prstGeom prst="foldedCorner">
@@ -11275,7 +11278,7 @@
         </p:nvCxnSpPr>
         <p:spPr bwMode="auto">
           <a:xfrm>
-            <a:off x="1950580" y="2543911"/>
+            <a:off x="3159177" y="2651943"/>
             <a:ext cx="341047" cy="273001"/>
           </a:xfrm>
           <a:prstGeom prst="line">
@@ -11304,7 +11307,7 @@
         </p:nvSpPr>
         <p:spPr bwMode="auto">
           <a:xfrm>
-            <a:off x="4445236" y="4137676"/>
+            <a:off x="5653833" y="4245708"/>
             <a:ext cx="2052000" cy="360000"/>
           </a:xfrm>
           <a:prstGeom prst="roundRect">
@@ -11383,7 +11386,7 @@
         </p:nvSpPr>
         <p:spPr bwMode="auto">
           <a:xfrm>
-            <a:off x="4444745" y="3140968"/>
+            <a:off x="5653342" y="3249000"/>
             <a:ext cx="2052491" cy="360000"/>
           </a:xfrm>
           <a:prstGeom prst="roundRect">
@@ -11460,7 +11463,7 @@
         </p:nvSpPr>
         <p:spPr>
           <a:xfrm>
-            <a:off x="6732240" y="3295203"/>
+            <a:off x="7940837" y="3403235"/>
             <a:ext cx="1224136" cy="307777"/>
           </a:xfrm>
           <a:prstGeom prst="rect">
@@ -11494,7 +11497,7 @@
         </p:nvSpPr>
         <p:spPr bwMode="auto">
           <a:xfrm>
-            <a:off x="4444743" y="3608882"/>
+            <a:off x="5653340" y="3716914"/>
             <a:ext cx="2052493" cy="360000"/>
           </a:xfrm>
           <a:prstGeom prst="roundRect">
@@ -11556,7 +11559,7 @@
         </p:nvSpPr>
         <p:spPr bwMode="auto">
           <a:xfrm>
-            <a:off x="2291627" y="3140968"/>
+            <a:off x="3500224" y="3249000"/>
             <a:ext cx="2052000" cy="360000"/>
           </a:xfrm>
           <a:prstGeom prst="roundRect">
@@ -11633,7 +11636,7 @@
         </p:nvSpPr>
         <p:spPr bwMode="auto">
           <a:xfrm>
-            <a:off x="2291627" y="2636912"/>
+            <a:off x="3500224" y="2744944"/>
             <a:ext cx="972000" cy="360000"/>
           </a:xfrm>
           <a:prstGeom prst="roundRect">
@@ -11710,7 +11713,7 @@
         </p:nvSpPr>
         <p:spPr bwMode="auto">
           <a:xfrm>
-            <a:off x="4431392" y="2636912"/>
+            <a:off x="5639989" y="2744944"/>
             <a:ext cx="972000" cy="360000"/>
           </a:xfrm>
           <a:prstGeom prst="roundRect">
@@ -11787,7 +11790,7 @@
         </p:nvSpPr>
         <p:spPr bwMode="auto">
           <a:xfrm>
-            <a:off x="5508104" y="2636912"/>
+            <a:off x="6716701" y="2744944"/>
             <a:ext cx="972000" cy="360000"/>
           </a:xfrm>
           <a:prstGeom prst="roundRect">
@@ -11884,7 +11887,7 @@
         </p:nvSpPr>
         <p:spPr bwMode="auto">
           <a:xfrm>
-            <a:off x="6653620" y="4725144"/>
+            <a:off x="7862217" y="4833176"/>
             <a:ext cx="720000" cy="432048"/>
           </a:xfrm>
           <a:prstGeom prst="foldedCorner">
@@ -11940,7 +11943,7 @@
         </p:nvSpPr>
         <p:spPr>
           <a:xfrm>
-            <a:off x="6516351" y="5154951"/>
+            <a:off x="7724948" y="5262983"/>
             <a:ext cx="995143" cy="369332"/>
           </a:xfrm>
           <a:prstGeom prst="rect">
@@ -11994,7 +11997,7 @@
         </p:nvSpPr>
         <p:spPr bwMode="auto">
           <a:xfrm>
-            <a:off x="7648762" y="4725144"/>
+            <a:off x="8857359" y="4833176"/>
             <a:ext cx="720000" cy="432000"/>
           </a:xfrm>
           <a:prstGeom prst="foldedCorner">
@@ -12065,7 +12068,7 @@
         </p:nvSpPr>
         <p:spPr>
           <a:xfrm>
-            <a:off x="7627888" y="5156876"/>
+            <a:off x="8836485" y="5264908"/>
             <a:ext cx="761747" cy="369332"/>
           </a:xfrm>
           <a:prstGeom prst="rect">
@@ -12119,7 +12122,7 @@
         </p:nvSpPr>
         <p:spPr bwMode="auto">
           <a:xfrm>
-            <a:off x="5820147" y="1487025"/>
+            <a:off x="7028744" y="1595057"/>
             <a:ext cx="2304000" cy="360000"/>
           </a:xfrm>
           <a:prstGeom prst="foldedCorner">
@@ -12193,7 +12196,7 @@
         </p:nvCxnSpPr>
         <p:spPr bwMode="auto">
           <a:xfrm flipH="1">
-            <a:off x="5994104" y="1847025"/>
+            <a:off x="7202701" y="1955057"/>
             <a:ext cx="978043" cy="789887"/>
           </a:xfrm>
           <a:prstGeom prst="line">
@@ -12222,7 +12225,7 @@
         </p:nvSpPr>
         <p:spPr bwMode="auto">
           <a:xfrm>
-            <a:off x="5820147" y="1988839"/>
+            <a:off x="7028744" y="2096871"/>
             <a:ext cx="2304000" cy="360000"/>
           </a:xfrm>
           <a:prstGeom prst="foldedCorner">
@@ -12299,7 +12302,7 @@
         </p:nvCxnSpPr>
         <p:spPr bwMode="auto">
           <a:xfrm flipH="1">
-            <a:off x="5994104" y="2348839"/>
+            <a:off x="7202701" y="2456871"/>
             <a:ext cx="978043" cy="288073"/>
           </a:xfrm>
           <a:prstGeom prst="line">
@@ -12328,7 +12331,7 @@
         </p:nvSpPr>
         <p:spPr bwMode="auto">
           <a:xfrm>
-            <a:off x="3995936" y="1487025"/>
+            <a:off x="5204533" y="1595057"/>
             <a:ext cx="1620000" cy="360000"/>
           </a:xfrm>
           <a:prstGeom prst="foldedCorner">
@@ -12402,7 +12405,7 @@
         </p:nvCxnSpPr>
         <p:spPr bwMode="auto">
           <a:xfrm>
-            <a:off x="4805936" y="1847025"/>
+            <a:off x="6014533" y="1955057"/>
             <a:ext cx="111456" cy="789887"/>
           </a:xfrm>
           <a:prstGeom prst="line">
@@ -12431,7 +12434,7 @@
         </p:nvSpPr>
         <p:spPr bwMode="auto">
           <a:xfrm>
-            <a:off x="3995936" y="1988839"/>
+            <a:off x="5204533" y="2096871"/>
             <a:ext cx="1620000" cy="360000"/>
           </a:xfrm>
           <a:prstGeom prst="foldedCorner">
@@ -12508,7 +12511,7 @@
         </p:nvCxnSpPr>
         <p:spPr bwMode="auto">
           <a:xfrm>
-            <a:off x="4805936" y="2348839"/>
+            <a:off x="6014533" y="2456871"/>
             <a:ext cx="111456" cy="288073"/>
           </a:xfrm>
           <a:prstGeom prst="line">
@@ -12537,7 +12540,7 @@
         </p:nvSpPr>
         <p:spPr bwMode="auto">
           <a:xfrm>
-            <a:off x="3370328" y="2636912"/>
+            <a:off x="4578925" y="2744944"/>
             <a:ext cx="972000" cy="360000"/>
           </a:xfrm>
           <a:prstGeom prst="roundRect">
@@ -12614,7 +12617,7 @@
         </p:nvSpPr>
         <p:spPr bwMode="auto">
           <a:xfrm>
-            <a:off x="2222528" y="1487025"/>
+            <a:off x="3431125" y="1595057"/>
             <a:ext cx="1620000" cy="360000"/>
           </a:xfrm>
           <a:prstGeom prst="foldedCorner">
@@ -12688,7 +12691,7 @@
         </p:nvCxnSpPr>
         <p:spPr bwMode="auto">
           <a:xfrm>
-            <a:off x="3032528" y="1847025"/>
+            <a:off x="4241125" y="1955057"/>
             <a:ext cx="823800" cy="789887"/>
           </a:xfrm>
           <a:prstGeom prst="line">

</xml_diff>

<commit_message>
Documentation: update USB component documentation (#55)
</commit_message>
<xml_diff>
--- a/Documentation/Doxygen/USB/src/USB_New_Style.pptx
+++ b/Documentation/Doxygen/USB/src/USB_New_Style.pptx
@@ -270,7 +270,7 @@
             <a:fld id="{E72D30EF-8F20-0B47-8B5D-39A8BC29E860}" type="datetimeFigureOut">
               <a:rPr lang="en-US" smtClean="0"/>
               <a:pPr/>
-              <a:t>20-May-24</a:t>
+              <a:t>26-Sep-24</a:t>
             </a:fld>
             <a:endParaRPr lang="en-US"/>
           </a:p>
@@ -438,7 +438,7 @@
             <a:fld id="{77EDD36E-1E02-F241-9611-1F1D9EAAD326}" type="datetimeFigureOut">
               <a:rPr lang="en-US" smtClean="0"/>
               <a:pPr/>
-              <a:t>20-May-24</a:t>
+              <a:t>26-Sep-24</a:t>
             </a:fld>
             <a:endParaRPr lang="en-US"/>
           </a:p>
@@ -7818,7 +7818,7 @@
         </p:nvSpPr>
         <p:spPr bwMode="auto">
           <a:xfrm>
-            <a:off x="2222528" y="2564904"/>
+            <a:off x="3431126" y="2779589"/>
             <a:ext cx="4536000" cy="1620000"/>
           </a:xfrm>
           <a:prstGeom prst="roundRect">
@@ -7884,7 +7884,7 @@
         </p:nvSpPr>
         <p:spPr bwMode="auto">
           <a:xfrm>
-            <a:off x="2291627" y="2636912"/>
+            <a:off x="3500225" y="2851597"/>
             <a:ext cx="972000" cy="360000"/>
           </a:xfrm>
           <a:prstGeom prst="roundRect">
@@ -7961,7 +7961,7 @@
         </p:nvSpPr>
         <p:spPr bwMode="auto">
           <a:xfrm>
-            <a:off x="2292121" y="3737007"/>
+            <a:off x="3500719" y="3951692"/>
             <a:ext cx="2052000" cy="360000"/>
           </a:xfrm>
           <a:prstGeom prst="roundRect">
@@ -8023,7 +8023,7 @@
         </p:nvSpPr>
         <p:spPr bwMode="auto">
           <a:xfrm>
-            <a:off x="2291627" y="4265800"/>
+            <a:off x="3500225" y="4480485"/>
             <a:ext cx="2052000" cy="360000"/>
           </a:xfrm>
           <a:prstGeom prst="roundRect">
@@ -8102,7 +8102,7 @@
         </p:nvSpPr>
         <p:spPr bwMode="auto">
           <a:xfrm>
-            <a:off x="3371627" y="2636912"/>
+            <a:off x="4580225" y="2851597"/>
             <a:ext cx="972000" cy="360000"/>
           </a:xfrm>
           <a:prstGeom prst="roundRect">
@@ -8179,8 +8179,8 @@
         </p:nvSpPr>
         <p:spPr bwMode="auto">
           <a:xfrm>
-            <a:off x="359694" y="2858263"/>
-            <a:ext cx="1476000" cy="692874"/>
+            <a:off x="1475641" y="3072948"/>
+            <a:ext cx="1568651" cy="692874"/>
           </a:xfrm>
           <a:prstGeom prst="foldedCorner">
             <a:avLst/>
@@ -8237,7 +8237,7 @@
                 <a:ea typeface="ＭＳ Ｐゴシック" pitchFamily="34" charset="-128"/>
                 <a:cs typeface="Courier New" pitchFamily="49" charset="0"/>
               </a:rPr>
-              <a:t>USBD_Config_0.c</a:t>
+              <a:t>USBD_Config_0.h</a:t>
             </a:r>
           </a:p>
         </p:txBody>
@@ -8250,7 +8250,7 @@
         </p:nvSpPr>
         <p:spPr>
           <a:xfrm>
-            <a:off x="6732240" y="2696636"/>
+            <a:off x="7940838" y="2911321"/>
             <a:ext cx="1800200" cy="307777"/>
           </a:xfrm>
           <a:prstGeom prst="rect">
@@ -8284,7 +8284,7 @@
         </p:nvSpPr>
         <p:spPr>
           <a:xfrm>
-            <a:off x="6732240" y="3763118"/>
+            <a:off x="7940838" y="3977803"/>
             <a:ext cx="1800200" cy="307777"/>
           </a:xfrm>
           <a:prstGeom prst="rect">
@@ -8318,7 +8318,7 @@
         </p:nvSpPr>
         <p:spPr>
           <a:xfrm>
-            <a:off x="6732240" y="4291911"/>
+            <a:off x="7940838" y="4506596"/>
             <a:ext cx="1511356" cy="307777"/>
           </a:xfrm>
           <a:prstGeom prst="rect">
@@ -8354,7 +8354,7 @@
         </p:nvCxnSpPr>
         <p:spPr bwMode="auto">
           <a:xfrm>
-            <a:off x="2777627" y="2996912"/>
+            <a:off x="3986225" y="3211597"/>
             <a:ext cx="0" cy="272180"/>
           </a:xfrm>
           <a:prstGeom prst="straightConnector1">
@@ -8385,7 +8385,7 @@
         </p:nvCxnSpPr>
         <p:spPr bwMode="auto">
           <a:xfrm>
-            <a:off x="3857627" y="2996912"/>
+            <a:off x="5066225" y="3211597"/>
             <a:ext cx="0" cy="272180"/>
           </a:xfrm>
           <a:prstGeom prst="straightConnector1">
@@ -8410,6 +8410,7 @@
         <p:nvCxnSpPr>
           <p:cNvPr id="15" name="Straight Arrow Connector 14"/>
           <p:cNvCxnSpPr>
+            <a:cxnSpLocks/>
             <a:stCxn id="9" idx="3"/>
             <a:endCxn id="31" idx="1"/>
           </p:cNvCxnSpPr>
@@ -8417,7 +8418,7 @@
         </p:nvCxnSpPr>
         <p:spPr bwMode="auto">
           <a:xfrm>
-            <a:off x="1835694" y="3204700"/>
+            <a:off x="3044292" y="3419385"/>
             <a:ext cx="455933" cy="244392"/>
           </a:xfrm>
           <a:prstGeom prst="straightConnector1">
@@ -8442,6 +8443,7 @@
         <p:nvCxnSpPr>
           <p:cNvPr id="16" name="Straight Arrow Connector 15"/>
           <p:cNvCxnSpPr>
+            <a:cxnSpLocks/>
             <a:stCxn id="17" idx="3"/>
             <a:endCxn id="6" idx="1"/>
           </p:cNvCxnSpPr>
@@ -8449,7 +8451,7 @@
         </p:nvCxnSpPr>
         <p:spPr bwMode="auto">
           <a:xfrm flipV="1">
-            <a:off x="1835696" y="3917007"/>
+            <a:off x="3044294" y="4131692"/>
             <a:ext cx="456425" cy="173668"/>
           </a:xfrm>
           <a:prstGeom prst="straightConnector1">
@@ -8478,8 +8480,8 @@
         </p:nvSpPr>
         <p:spPr bwMode="auto">
           <a:xfrm>
-            <a:off x="359696" y="3744238"/>
-            <a:ext cx="1476000" cy="692874"/>
+            <a:off x="1475641" y="3958923"/>
+            <a:ext cx="1568653" cy="692874"/>
           </a:xfrm>
           <a:prstGeom prst="foldedCorner">
             <a:avLst/>
@@ -8541,7 +8543,7 @@
         </p:nvSpPr>
         <p:spPr bwMode="auto">
           <a:xfrm>
-            <a:off x="2267944" y="1511990"/>
+            <a:off x="3476542" y="1726675"/>
             <a:ext cx="1800000" cy="692874"/>
           </a:xfrm>
           <a:prstGeom prst="foldedCorner">
@@ -8612,7 +8614,7 @@
         </p:nvSpPr>
         <p:spPr bwMode="auto">
           <a:xfrm>
-            <a:off x="4248144" y="1511990"/>
+            <a:off x="5456742" y="1726675"/>
             <a:ext cx="1620000" cy="692874"/>
           </a:xfrm>
           <a:prstGeom prst="foldedCorner">
@@ -8689,7 +8691,7 @@
         </p:nvCxnSpPr>
         <p:spPr bwMode="auto">
           <a:xfrm flipH="1">
-            <a:off x="3857627" y="2204864"/>
+            <a:off x="5066225" y="2419549"/>
             <a:ext cx="1200517" cy="432048"/>
           </a:xfrm>
           <a:prstGeom prst="line">
@@ -8721,7 +8723,7 @@
         </p:nvCxnSpPr>
         <p:spPr bwMode="auto">
           <a:xfrm>
-            <a:off x="3167944" y="2204864"/>
+            <a:off x="4376542" y="2419549"/>
             <a:ext cx="689683" cy="432048"/>
           </a:xfrm>
           <a:prstGeom prst="line">
@@ -8750,7 +8752,7 @@
         </p:nvSpPr>
         <p:spPr bwMode="auto">
           <a:xfrm>
-            <a:off x="4400925" y="3212976"/>
+            <a:off x="5609523" y="3427661"/>
             <a:ext cx="2160000" cy="1476000"/>
           </a:xfrm>
           <a:prstGeom prst="roundRect">
@@ -8820,7 +8822,7 @@
         </p:nvCxnSpPr>
         <p:spPr bwMode="auto">
           <a:xfrm>
-            <a:off x="4931236" y="3002684"/>
+            <a:off x="6139834" y="3217369"/>
             <a:ext cx="0" cy="560361"/>
           </a:xfrm>
           <a:prstGeom prst="straightConnector1">
@@ -8851,7 +8853,7 @@
         </p:nvSpPr>
         <p:spPr bwMode="auto">
           <a:xfrm>
-            <a:off x="4445236" y="2642684"/>
+            <a:off x="5653834" y="2857369"/>
             <a:ext cx="972000" cy="360000"/>
           </a:xfrm>
           <a:prstGeom prst="roundRect">
@@ -8928,7 +8930,7 @@
         </p:nvSpPr>
         <p:spPr bwMode="auto">
           <a:xfrm>
-            <a:off x="4444745" y="3269092"/>
+            <a:off x="5653343" y="3483777"/>
             <a:ext cx="2052491" cy="360000"/>
           </a:xfrm>
           <a:prstGeom prst="roundRect">
@@ -9005,7 +9007,7 @@
         </p:nvSpPr>
         <p:spPr>
           <a:xfrm>
-            <a:off x="6732240" y="3295203"/>
+            <a:off x="7940838" y="3509888"/>
             <a:ext cx="1224136" cy="307777"/>
           </a:xfrm>
           <a:prstGeom prst="rect">
@@ -9039,7 +9041,7 @@
         </p:nvSpPr>
         <p:spPr bwMode="auto">
           <a:xfrm>
-            <a:off x="4444743" y="3737006"/>
+            <a:off x="5653341" y="3951691"/>
             <a:ext cx="2052493" cy="360000"/>
           </a:xfrm>
           <a:prstGeom prst="roundRect">
@@ -9103,7 +9105,7 @@
         </p:nvCxnSpPr>
         <p:spPr bwMode="auto">
           <a:xfrm flipH="1">
-            <a:off x="4116388" y="3004413"/>
+            <a:off x="5324986" y="3219098"/>
             <a:ext cx="1858848" cy="264679"/>
           </a:xfrm>
           <a:prstGeom prst="straightConnector1">
@@ -9132,7 +9134,7 @@
         </p:nvSpPr>
         <p:spPr bwMode="auto">
           <a:xfrm>
-            <a:off x="5525236" y="2644413"/>
+            <a:off x="6733834" y="2859098"/>
             <a:ext cx="900000" cy="360000"/>
           </a:xfrm>
           <a:prstGeom prst="roundRect">
@@ -9209,7 +9211,7 @@
         </p:nvSpPr>
         <p:spPr bwMode="auto">
           <a:xfrm>
-            <a:off x="2291627" y="3269092"/>
+            <a:off x="3500225" y="3483777"/>
             <a:ext cx="2052000" cy="360000"/>
           </a:xfrm>
           <a:prstGeom prst="roundRect">
@@ -9286,7 +9288,7 @@
         </p:nvSpPr>
         <p:spPr bwMode="auto">
           <a:xfrm>
-            <a:off x="6624308" y="1511990"/>
+            <a:off x="7832906" y="1726675"/>
             <a:ext cx="720000" cy="432048"/>
           </a:xfrm>
           <a:prstGeom prst="foldedCorner">
@@ -9342,7 +9344,7 @@
         </p:nvSpPr>
         <p:spPr>
           <a:xfrm>
-            <a:off x="6511279" y="1944038"/>
+            <a:off x="7719877" y="2158723"/>
             <a:ext cx="946057" cy="369332"/>
           </a:xfrm>
           <a:prstGeom prst="rect">
@@ -9396,7 +9398,7 @@
         </p:nvSpPr>
         <p:spPr bwMode="auto">
           <a:xfrm>
-            <a:off x="7619450" y="1511990"/>
+            <a:off x="8828048" y="1726675"/>
             <a:ext cx="720000" cy="432000"/>
           </a:xfrm>
           <a:prstGeom prst="foldedCorner">
@@ -9467,7 +9469,7 @@
         </p:nvSpPr>
         <p:spPr>
           <a:xfrm>
-            <a:off x="7598576" y="1943722"/>
+            <a:off x="8807174" y="2158407"/>
             <a:ext cx="761747" cy="369332"/>
           </a:xfrm>
           <a:prstGeom prst="rect">
@@ -9521,8 +9523,8 @@
         </p:nvSpPr>
         <p:spPr bwMode="auto">
           <a:xfrm>
-            <a:off x="359693" y="2003762"/>
-            <a:ext cx="1764035" cy="692874"/>
+            <a:off x="1475641" y="2218447"/>
+            <a:ext cx="1883344" cy="692874"/>
           </a:xfrm>
           <a:prstGeom prst="foldedCorner">
             <a:avLst/>
@@ -9570,7 +9572,7 @@
               <a:tabLst/>
             </a:pPr>
             <a:r>
-              <a:rPr kumimoji="0" lang="de-DE" sz="1000" b="1" i="0" u="none" strike="noStrike" cap="none" normalizeH="0" baseline="0">
+              <a:rPr kumimoji="0" lang="de-DE" sz="1100" b="1" i="0" u="none" strike="noStrike" cap="none" normalizeH="0" baseline="0">
                 <a:ln>
                   <a:noFill/>
                 </a:ln>
@@ -9591,6 +9593,7 @@
         <p:nvCxnSpPr>
           <p:cNvPr id="37" name="Straight Arrow Connector 36"/>
           <p:cNvCxnSpPr>
+            <a:cxnSpLocks/>
             <a:stCxn id="36" idx="3"/>
             <a:endCxn id="31" idx="1"/>
           </p:cNvCxnSpPr>
@@ -9598,8 +9601,8 @@
         </p:nvCxnSpPr>
         <p:spPr bwMode="auto">
           <a:xfrm>
-            <a:off x="2123728" y="2350199"/>
-            <a:ext cx="167899" cy="1098893"/>
+            <a:off x="3358985" y="2564884"/>
+            <a:ext cx="141240" cy="1098893"/>
           </a:xfrm>
           <a:prstGeom prst="straightConnector1">
             <a:avLst/>
@@ -9627,7 +9630,7 @@
         </p:nvSpPr>
         <p:spPr bwMode="auto">
           <a:xfrm>
-            <a:off x="4445236" y="4265800"/>
+            <a:off x="5653834" y="4480485"/>
             <a:ext cx="2052000" cy="360000"/>
           </a:xfrm>
           <a:prstGeom prst="roundRect">
@@ -10694,7 +10697,7 @@
         </p:nvSpPr>
         <p:spPr bwMode="auto">
           <a:xfrm>
-            <a:off x="2222528" y="2564904"/>
+            <a:off x="3431125" y="2672936"/>
             <a:ext cx="4536000" cy="1505991"/>
           </a:xfrm>
           <a:prstGeom prst="roundRect">
@@ -10760,7 +10763,7 @@
         </p:nvSpPr>
         <p:spPr bwMode="auto">
           <a:xfrm>
-            <a:off x="2292121" y="3608883"/>
+            <a:off x="3500718" y="3716915"/>
             <a:ext cx="2052000" cy="360000"/>
           </a:xfrm>
           <a:prstGeom prst="roundRect">
@@ -10822,7 +10825,7 @@
         </p:nvSpPr>
         <p:spPr bwMode="auto">
           <a:xfrm>
-            <a:off x="2291627" y="4137676"/>
+            <a:off x="3500224" y="4245708"/>
             <a:ext cx="2052000" cy="360000"/>
           </a:xfrm>
           <a:prstGeom prst="roundRect">
@@ -10901,7 +10904,7 @@
         </p:nvSpPr>
         <p:spPr bwMode="auto">
           <a:xfrm>
-            <a:off x="330578" y="2930271"/>
+            <a:off x="1539175" y="3038303"/>
             <a:ext cx="1505118" cy="692874"/>
           </a:xfrm>
           <a:prstGeom prst="foldedCorner">
@@ -10959,7 +10962,7 @@
                 <a:ea typeface="ＭＳ Ｐゴシック" pitchFamily="34" charset="-128"/>
                 <a:cs typeface="Courier New" pitchFamily="49" charset="0"/>
               </a:rPr>
-              <a:t>USBH_Config_0.c</a:t>
+              <a:t>USBH_Config_0.h</a:t>
             </a:r>
           </a:p>
         </p:txBody>
@@ -10972,7 +10975,7 @@
         </p:nvSpPr>
         <p:spPr>
           <a:xfrm>
-            <a:off x="6732240" y="2555302"/>
+            <a:off x="7940837" y="2663334"/>
             <a:ext cx="1800200" cy="523220"/>
           </a:xfrm>
           <a:prstGeom prst="rect">
@@ -11006,7 +11009,7 @@
         </p:nvSpPr>
         <p:spPr>
           <a:xfrm>
-            <a:off x="6732240" y="3763118"/>
+            <a:off x="7940837" y="3871150"/>
             <a:ext cx="1800200" cy="307777"/>
           </a:xfrm>
           <a:prstGeom prst="rect">
@@ -11040,7 +11043,7 @@
         </p:nvSpPr>
         <p:spPr>
           <a:xfrm>
-            <a:off x="6732240" y="4291911"/>
+            <a:off x="7940837" y="4399943"/>
             <a:ext cx="1511356" cy="307777"/>
           </a:xfrm>
           <a:prstGeom prst="rect">
@@ -11077,7 +11080,7 @@
         </p:nvCxnSpPr>
         <p:spPr bwMode="auto">
           <a:xfrm>
-            <a:off x="1835696" y="3276708"/>
+            <a:off x="3044293" y="3384740"/>
             <a:ext cx="455931" cy="44260"/>
           </a:xfrm>
           <a:prstGeom prst="straightConnector1">
@@ -11109,7 +11112,7 @@
         </p:nvCxnSpPr>
         <p:spPr bwMode="auto">
           <a:xfrm flipV="1">
-            <a:off x="1835696" y="3788883"/>
+            <a:off x="3044293" y="3896915"/>
             <a:ext cx="456425" cy="373800"/>
           </a:xfrm>
           <a:prstGeom prst="straightConnector1">
@@ -11138,7 +11141,7 @@
         </p:nvSpPr>
         <p:spPr bwMode="auto">
           <a:xfrm>
-            <a:off x="330580" y="3816246"/>
+            <a:off x="1539177" y="3924278"/>
             <a:ext cx="1505116" cy="692874"/>
           </a:xfrm>
           <a:prstGeom prst="foldedCorner">
@@ -11201,7 +11204,7 @@
         </p:nvSpPr>
         <p:spPr bwMode="auto">
           <a:xfrm>
-            <a:off x="330580" y="2363911"/>
+            <a:off x="1539177" y="2471943"/>
             <a:ext cx="1620000" cy="360000"/>
           </a:xfrm>
           <a:prstGeom prst="foldedCorner">
@@ -11275,7 +11278,7 @@
         </p:nvCxnSpPr>
         <p:spPr bwMode="auto">
           <a:xfrm>
-            <a:off x="1950580" y="2543911"/>
+            <a:off x="3159177" y="2651943"/>
             <a:ext cx="341047" cy="273001"/>
           </a:xfrm>
           <a:prstGeom prst="line">
@@ -11304,7 +11307,7 @@
         </p:nvSpPr>
         <p:spPr bwMode="auto">
           <a:xfrm>
-            <a:off x="4445236" y="4137676"/>
+            <a:off x="5653833" y="4245708"/>
             <a:ext cx="2052000" cy="360000"/>
           </a:xfrm>
           <a:prstGeom prst="roundRect">
@@ -11383,7 +11386,7 @@
         </p:nvSpPr>
         <p:spPr bwMode="auto">
           <a:xfrm>
-            <a:off x="4444745" y="3140968"/>
+            <a:off x="5653342" y="3249000"/>
             <a:ext cx="2052491" cy="360000"/>
           </a:xfrm>
           <a:prstGeom prst="roundRect">
@@ -11460,7 +11463,7 @@
         </p:nvSpPr>
         <p:spPr>
           <a:xfrm>
-            <a:off x="6732240" y="3295203"/>
+            <a:off x="7940837" y="3403235"/>
             <a:ext cx="1224136" cy="307777"/>
           </a:xfrm>
           <a:prstGeom prst="rect">
@@ -11494,7 +11497,7 @@
         </p:nvSpPr>
         <p:spPr bwMode="auto">
           <a:xfrm>
-            <a:off x="4444743" y="3608882"/>
+            <a:off x="5653340" y="3716914"/>
             <a:ext cx="2052493" cy="360000"/>
           </a:xfrm>
           <a:prstGeom prst="roundRect">
@@ -11556,7 +11559,7 @@
         </p:nvSpPr>
         <p:spPr bwMode="auto">
           <a:xfrm>
-            <a:off x="2291627" y="3140968"/>
+            <a:off x="3500224" y="3249000"/>
             <a:ext cx="2052000" cy="360000"/>
           </a:xfrm>
           <a:prstGeom prst="roundRect">
@@ -11633,7 +11636,7 @@
         </p:nvSpPr>
         <p:spPr bwMode="auto">
           <a:xfrm>
-            <a:off x="2291627" y="2636912"/>
+            <a:off x="3500224" y="2744944"/>
             <a:ext cx="972000" cy="360000"/>
           </a:xfrm>
           <a:prstGeom prst="roundRect">
@@ -11710,7 +11713,7 @@
         </p:nvSpPr>
         <p:spPr bwMode="auto">
           <a:xfrm>
-            <a:off x="4431392" y="2636912"/>
+            <a:off x="5639989" y="2744944"/>
             <a:ext cx="972000" cy="360000"/>
           </a:xfrm>
           <a:prstGeom prst="roundRect">
@@ -11787,7 +11790,7 @@
         </p:nvSpPr>
         <p:spPr bwMode="auto">
           <a:xfrm>
-            <a:off x="5508104" y="2636912"/>
+            <a:off x="6716701" y="2744944"/>
             <a:ext cx="972000" cy="360000"/>
           </a:xfrm>
           <a:prstGeom prst="roundRect">
@@ -11884,7 +11887,7 @@
         </p:nvSpPr>
         <p:spPr bwMode="auto">
           <a:xfrm>
-            <a:off x="6653620" y="4725144"/>
+            <a:off x="7862217" y="4833176"/>
             <a:ext cx="720000" cy="432048"/>
           </a:xfrm>
           <a:prstGeom prst="foldedCorner">
@@ -11940,7 +11943,7 @@
         </p:nvSpPr>
         <p:spPr>
           <a:xfrm>
-            <a:off x="6516351" y="5154951"/>
+            <a:off x="7724948" y="5262983"/>
             <a:ext cx="995143" cy="369332"/>
           </a:xfrm>
           <a:prstGeom prst="rect">
@@ -11994,7 +11997,7 @@
         </p:nvSpPr>
         <p:spPr bwMode="auto">
           <a:xfrm>
-            <a:off x="7648762" y="4725144"/>
+            <a:off x="8857359" y="4833176"/>
             <a:ext cx="720000" cy="432000"/>
           </a:xfrm>
           <a:prstGeom prst="foldedCorner">
@@ -12065,7 +12068,7 @@
         </p:nvSpPr>
         <p:spPr>
           <a:xfrm>
-            <a:off x="7627888" y="5156876"/>
+            <a:off x="8836485" y="5264908"/>
             <a:ext cx="761747" cy="369332"/>
           </a:xfrm>
           <a:prstGeom prst="rect">
@@ -12119,7 +12122,7 @@
         </p:nvSpPr>
         <p:spPr bwMode="auto">
           <a:xfrm>
-            <a:off x="5820147" y="1487025"/>
+            <a:off x="7028744" y="1595057"/>
             <a:ext cx="2304000" cy="360000"/>
           </a:xfrm>
           <a:prstGeom prst="foldedCorner">
@@ -12193,7 +12196,7 @@
         </p:nvCxnSpPr>
         <p:spPr bwMode="auto">
           <a:xfrm flipH="1">
-            <a:off x="5994104" y="1847025"/>
+            <a:off x="7202701" y="1955057"/>
             <a:ext cx="978043" cy="789887"/>
           </a:xfrm>
           <a:prstGeom prst="line">
@@ -12222,7 +12225,7 @@
         </p:nvSpPr>
         <p:spPr bwMode="auto">
           <a:xfrm>
-            <a:off x="5820147" y="1988839"/>
+            <a:off x="7028744" y="2096871"/>
             <a:ext cx="2304000" cy="360000"/>
           </a:xfrm>
           <a:prstGeom prst="foldedCorner">
@@ -12299,7 +12302,7 @@
         </p:nvCxnSpPr>
         <p:spPr bwMode="auto">
           <a:xfrm flipH="1">
-            <a:off x="5994104" y="2348839"/>
+            <a:off x="7202701" y="2456871"/>
             <a:ext cx="978043" cy="288073"/>
           </a:xfrm>
           <a:prstGeom prst="line">
@@ -12328,7 +12331,7 @@
         </p:nvSpPr>
         <p:spPr bwMode="auto">
           <a:xfrm>
-            <a:off x="3995936" y="1487025"/>
+            <a:off x="5204533" y="1595057"/>
             <a:ext cx="1620000" cy="360000"/>
           </a:xfrm>
           <a:prstGeom prst="foldedCorner">
@@ -12402,7 +12405,7 @@
         </p:nvCxnSpPr>
         <p:spPr bwMode="auto">
           <a:xfrm>
-            <a:off x="4805936" y="1847025"/>
+            <a:off x="6014533" y="1955057"/>
             <a:ext cx="111456" cy="789887"/>
           </a:xfrm>
           <a:prstGeom prst="line">
@@ -12431,7 +12434,7 @@
         </p:nvSpPr>
         <p:spPr bwMode="auto">
           <a:xfrm>
-            <a:off x="3995936" y="1988839"/>
+            <a:off x="5204533" y="2096871"/>
             <a:ext cx="1620000" cy="360000"/>
           </a:xfrm>
           <a:prstGeom prst="foldedCorner">
@@ -12508,7 +12511,7 @@
         </p:nvCxnSpPr>
         <p:spPr bwMode="auto">
           <a:xfrm>
-            <a:off x="4805936" y="2348839"/>
+            <a:off x="6014533" y="2456871"/>
             <a:ext cx="111456" cy="288073"/>
           </a:xfrm>
           <a:prstGeom prst="line">
@@ -12537,7 +12540,7 @@
         </p:nvSpPr>
         <p:spPr bwMode="auto">
           <a:xfrm>
-            <a:off x="3370328" y="2636912"/>
+            <a:off x="4578925" y="2744944"/>
             <a:ext cx="972000" cy="360000"/>
           </a:xfrm>
           <a:prstGeom prst="roundRect">
@@ -12614,7 +12617,7 @@
         </p:nvSpPr>
         <p:spPr bwMode="auto">
           <a:xfrm>
-            <a:off x="2222528" y="1487025"/>
+            <a:off x="3431125" y="1595057"/>
             <a:ext cx="1620000" cy="360000"/>
           </a:xfrm>
           <a:prstGeom prst="foldedCorner">
@@ -12688,7 +12691,7 @@
         </p:nvCxnSpPr>
         <p:spPr bwMode="auto">
           <a:xfrm>
-            <a:off x="3032528" y="1847025"/>
+            <a:off x="4241125" y="1955057"/>
             <a:ext cx="823800" cy="789887"/>
           </a:xfrm>
           <a:prstGeom prst="line">

</xml_diff>